<commit_message>
Added figures for tree shape vs. r
</commit_message>
<xml_diff>
--- a/figures/FOR_PAPER/model_figures.pptx
+++ b/figures/FOR_PAPER/model_figures.pptx
@@ -6,6 +6,9 @@
   </p:sldMasterIdLst>
   <p:sldIdLst>
     <p:sldId id="256" r:id="rId2"/>
+    <p:sldId id="257" r:id="rId3"/>
+    <p:sldId id="258" r:id="rId4"/>
+    <p:sldId id="259" r:id="rId5"/>
   </p:sldIdLst>
   <p:sldSz cx="12192000" cy="6858000"/>
   <p:notesSz cx="6858000" cy="9144000"/>
@@ -104,6 +107,27 @@
       </a:defRPr>
     </a:lvl9pPr>
   </p:defaultTextStyle>
+  <p:extLst>
+    <p:ext uri="{521415D9-36F7-43E2-AB2F-B90AF26B5E84}">
+      <p14:sectionLst xmlns:p14="http://schemas.microsoft.com/office/powerpoint/2010/main">
+        <p14:section name="(a) Description of Model" id="{04DC9BD1-A2C3-534D-8F45-BAAC49A8EE85}">
+          <p14:sldIdLst>
+            <p14:sldId id="256"/>
+          </p14:sldIdLst>
+        </p14:section>
+        <p14:section name="(b) Shape of Tree vs. r" id="{C8F95527-17A6-4D4C-9E93-CA638BE65346}">
+          <p14:sldIdLst>
+            <p14:sldId id="257"/>
+            <p14:sldId id="258"/>
+            <p14:sldId id="259"/>
+          </p14:sldIdLst>
+        </p14:section>
+      </p14:sectionLst>
+    </p:ext>
+    <p:ext uri="{EFAFB233-063F-42B5-8137-9DF3F51BA10A}">
+      <p15:sldGuideLst xmlns:p15="http://schemas.microsoft.com/office/powerpoint/2012/main"/>
+    </p:ext>
+  </p:extLst>
 </p:presentation>
 </file>
 
@@ -238,7 +262,7 @@
           <a:p>
             <a:fld id="{14AB990E-AD98-CD44-AFF8-DD4A87834CE8}" type="datetimeFigureOut">
               <a:rPr lang="en-US" smtClean="0"/>
-              <a:t>10/21/16</a:t>
+              <a:t>10/22/16</a:t>
             </a:fld>
             <a:endParaRPr lang="en-US"/>
           </a:p>
@@ -408,7 +432,7 @@
           <a:p>
             <a:fld id="{14AB990E-AD98-CD44-AFF8-DD4A87834CE8}" type="datetimeFigureOut">
               <a:rPr lang="en-US" smtClean="0"/>
-              <a:t>10/21/16</a:t>
+              <a:t>10/22/16</a:t>
             </a:fld>
             <a:endParaRPr lang="en-US"/>
           </a:p>
@@ -588,7 +612,7 @@
           <a:p>
             <a:fld id="{14AB990E-AD98-CD44-AFF8-DD4A87834CE8}" type="datetimeFigureOut">
               <a:rPr lang="en-US" smtClean="0"/>
-              <a:t>10/21/16</a:t>
+              <a:t>10/22/16</a:t>
             </a:fld>
             <a:endParaRPr lang="en-US"/>
           </a:p>
@@ -758,7 +782,7 @@
           <a:p>
             <a:fld id="{14AB990E-AD98-CD44-AFF8-DD4A87834CE8}" type="datetimeFigureOut">
               <a:rPr lang="en-US" smtClean="0"/>
-              <a:t>10/21/16</a:t>
+              <a:t>10/22/16</a:t>
             </a:fld>
             <a:endParaRPr lang="en-US"/>
           </a:p>
@@ -1004,7 +1028,7 @@
           <a:p>
             <a:fld id="{14AB990E-AD98-CD44-AFF8-DD4A87834CE8}" type="datetimeFigureOut">
               <a:rPr lang="en-US" smtClean="0"/>
-              <a:t>10/21/16</a:t>
+              <a:t>10/22/16</a:t>
             </a:fld>
             <a:endParaRPr lang="en-US"/>
           </a:p>
@@ -1236,7 +1260,7 @@
           <a:p>
             <a:fld id="{14AB990E-AD98-CD44-AFF8-DD4A87834CE8}" type="datetimeFigureOut">
               <a:rPr lang="en-US" smtClean="0"/>
-              <a:t>10/21/16</a:t>
+              <a:t>10/22/16</a:t>
             </a:fld>
             <a:endParaRPr lang="en-US"/>
           </a:p>
@@ -1603,7 +1627,7 @@
           <a:p>
             <a:fld id="{14AB990E-AD98-CD44-AFF8-DD4A87834CE8}" type="datetimeFigureOut">
               <a:rPr lang="en-US" smtClean="0"/>
-              <a:t>10/21/16</a:t>
+              <a:t>10/22/16</a:t>
             </a:fld>
             <a:endParaRPr lang="en-US"/>
           </a:p>
@@ -1721,7 +1745,7 @@
           <a:p>
             <a:fld id="{14AB990E-AD98-CD44-AFF8-DD4A87834CE8}" type="datetimeFigureOut">
               <a:rPr lang="en-US" smtClean="0"/>
-              <a:t>10/21/16</a:t>
+              <a:t>10/22/16</a:t>
             </a:fld>
             <a:endParaRPr lang="en-US"/>
           </a:p>
@@ -1816,7 +1840,7 @@
           <a:p>
             <a:fld id="{14AB990E-AD98-CD44-AFF8-DD4A87834CE8}" type="datetimeFigureOut">
               <a:rPr lang="en-US" smtClean="0"/>
-              <a:t>10/21/16</a:t>
+              <a:t>10/22/16</a:t>
             </a:fld>
             <a:endParaRPr lang="en-US"/>
           </a:p>
@@ -2093,7 +2117,7 @@
           <a:p>
             <a:fld id="{14AB990E-AD98-CD44-AFF8-DD4A87834CE8}" type="datetimeFigureOut">
               <a:rPr lang="en-US" smtClean="0"/>
-              <a:t>10/21/16</a:t>
+              <a:t>10/22/16</a:t>
             </a:fld>
             <a:endParaRPr lang="en-US"/>
           </a:p>
@@ -2346,7 +2370,7 @@
           <a:p>
             <a:fld id="{14AB990E-AD98-CD44-AFF8-DD4A87834CE8}" type="datetimeFigureOut">
               <a:rPr lang="en-US" smtClean="0"/>
-              <a:t>10/21/16</a:t>
+              <a:t>10/22/16</a:t>
             </a:fld>
             <a:endParaRPr lang="en-US"/>
           </a:p>
@@ -2559,7 +2583,7 @@
           <a:p>
             <a:fld id="{14AB990E-AD98-CD44-AFF8-DD4A87834CE8}" type="datetimeFigureOut">
               <a:rPr lang="en-US" smtClean="0"/>
-              <a:t>10/21/16</a:t>
+              <a:t>10/22/16</a:t>
             </a:fld>
             <a:endParaRPr lang="en-US"/>
           </a:p>
@@ -3319,8 +3343,8 @@
           </a:fontRef>
         </p:style>
       </p:cxnSp>
-      <mc:AlternateContent xmlns:mc="http://schemas.openxmlformats.org/markup-compatibility/2006">
-        <mc:Choice xmlns:a14="http://schemas.microsoft.com/office/drawing/2010/main" Requires="a14">
+      <mc:AlternateContent xmlns:mc="http://schemas.openxmlformats.org/markup-compatibility/2006" xmlns:a14="http://schemas.microsoft.com/office/drawing/2010/main">
+        <mc:Choice Requires="a14">
           <p:sp>
             <p:nvSpPr>
               <p:cNvPr id="31" name="TextBox 30"/>
@@ -3343,6 +3367,7 @@
               </a:bodyPr>
               <a:lstStyle/>
               <a:p>
+                <a:pPr/>
                 <a14:m>
                   <m:oMathPara xmlns:m="http://schemas.openxmlformats.org/officeDocument/2006/math">
                     <m:oMathParaPr>
@@ -3395,7 +3420,7 @@
             </p:txBody>
           </p:sp>
         </mc:Choice>
-        <mc:Fallback>
+        <mc:Fallback xmlns="">
           <p:sp>
             <p:nvSpPr>
               <p:cNvPr id="31" name="TextBox 30"/>
@@ -3434,8 +3459,8 @@
           </p:sp>
         </mc:Fallback>
       </mc:AlternateContent>
-      <mc:AlternateContent xmlns:mc="http://schemas.openxmlformats.org/markup-compatibility/2006">
-        <mc:Choice xmlns:a14="http://schemas.microsoft.com/office/drawing/2010/main" Requires="a14">
+      <mc:AlternateContent xmlns:mc="http://schemas.openxmlformats.org/markup-compatibility/2006" xmlns:a14="http://schemas.microsoft.com/office/drawing/2010/main">
+        <mc:Choice Requires="a14">
           <p:sp>
             <p:nvSpPr>
               <p:cNvPr id="32" name="TextBox 31"/>
@@ -3458,6 +3483,7 @@
               </a:bodyPr>
               <a:lstStyle/>
               <a:p>
+                <a:pPr/>
                 <a14:m>
                   <m:oMathPara xmlns:m="http://schemas.openxmlformats.org/officeDocument/2006/math">
                     <m:oMathParaPr>
@@ -3510,7 +3536,7 @@
             </p:txBody>
           </p:sp>
         </mc:Choice>
-        <mc:Fallback>
+        <mc:Fallback xmlns="">
           <p:sp>
             <p:nvSpPr>
               <p:cNvPr id="32" name="TextBox 31"/>
@@ -3586,8 +3612,8 @@
           </a:fontRef>
         </p:style>
       </p:cxnSp>
-      <mc:AlternateContent xmlns:mc="http://schemas.openxmlformats.org/markup-compatibility/2006">
-        <mc:Choice xmlns:a14="http://schemas.microsoft.com/office/drawing/2010/main" Requires="a14">
+      <mc:AlternateContent xmlns:mc="http://schemas.openxmlformats.org/markup-compatibility/2006" xmlns:a14="http://schemas.microsoft.com/office/drawing/2010/main">
+        <mc:Choice Requires="a14">
           <p:sp>
             <p:nvSpPr>
               <p:cNvPr id="37" name="TextBox 36"/>
@@ -3610,6 +3636,7 @@
               </a:bodyPr>
               <a:lstStyle/>
               <a:p>
+                <a:pPr/>
                 <a14:m>
                   <m:oMathPara xmlns:m="http://schemas.openxmlformats.org/officeDocument/2006/math">
                     <m:oMathParaPr>
@@ -3630,7 +3657,7 @@
             </p:txBody>
           </p:sp>
         </mc:Choice>
-        <mc:Fallback>
+        <mc:Fallback xmlns="">
           <p:sp>
             <p:nvSpPr>
               <p:cNvPr id="37" name="TextBox 36"/>
@@ -3830,8 +3857,8 @@
           </a:fontRef>
         </p:style>
       </p:cxnSp>
-      <mc:AlternateContent xmlns:mc="http://schemas.openxmlformats.org/markup-compatibility/2006">
-        <mc:Choice xmlns:a14="http://schemas.microsoft.com/office/drawing/2010/main" Requires="a14">
+      <mc:AlternateContent xmlns:mc="http://schemas.openxmlformats.org/markup-compatibility/2006" xmlns:a14="http://schemas.microsoft.com/office/drawing/2010/main">
+        <mc:Choice Requires="a14">
           <p:sp>
             <p:nvSpPr>
               <p:cNvPr id="44" name="TextBox 43"/>
@@ -3854,6 +3881,7 @@
               </a:bodyPr>
               <a:lstStyle/>
               <a:p>
+                <a:pPr/>
                 <a14:m>
                   <m:oMathPara xmlns:m="http://schemas.openxmlformats.org/officeDocument/2006/math">
                     <m:oMathParaPr>
@@ -3893,7 +3921,7 @@
             </p:txBody>
           </p:sp>
         </mc:Choice>
-        <mc:Fallback>
+        <mc:Fallback xmlns="">
           <p:sp>
             <p:nvSpPr>
               <p:cNvPr id="44" name="TextBox 43"/>
@@ -3969,8 +3997,8 @@
           </a:fontRef>
         </p:style>
       </p:cxnSp>
-      <mc:AlternateContent xmlns:mc="http://schemas.openxmlformats.org/markup-compatibility/2006">
-        <mc:Choice xmlns:a14="http://schemas.microsoft.com/office/drawing/2010/main" Requires="a14">
+      <mc:AlternateContent xmlns:mc="http://schemas.openxmlformats.org/markup-compatibility/2006" xmlns:a14="http://schemas.microsoft.com/office/drawing/2010/main">
+        <mc:Choice Requires="a14">
           <p:sp>
             <p:nvSpPr>
               <p:cNvPr id="46" name="TextBox 45"/>
@@ -3993,6 +4021,7 @@
               </a:bodyPr>
               <a:lstStyle/>
               <a:p>
+                <a:pPr/>
                 <a14:m>
                   <m:oMathPara xmlns:m="http://schemas.openxmlformats.org/officeDocument/2006/math">
                     <m:oMathParaPr>
@@ -4032,7 +4061,7 @@
             </p:txBody>
           </p:sp>
         </mc:Choice>
-        <mc:Fallback>
+        <mc:Fallback xmlns="">
           <p:sp>
             <p:nvSpPr>
               <p:cNvPr id="46" name="TextBox 45"/>
@@ -4108,8 +4137,8 @@
           </a:fontRef>
         </p:style>
       </p:cxnSp>
-      <mc:AlternateContent xmlns:mc="http://schemas.openxmlformats.org/markup-compatibility/2006">
-        <mc:Choice xmlns:a14="http://schemas.microsoft.com/office/drawing/2010/main" Requires="a14">
+      <mc:AlternateContent xmlns:mc="http://schemas.openxmlformats.org/markup-compatibility/2006" xmlns:a14="http://schemas.microsoft.com/office/drawing/2010/main">
+        <mc:Choice Requires="a14">
           <p:sp>
             <p:nvSpPr>
               <p:cNvPr id="48" name="TextBox 47"/>
@@ -4132,6 +4161,7 @@
               </a:bodyPr>
               <a:lstStyle/>
               <a:p>
+                <a:pPr/>
                 <a14:m>
                   <m:oMathPara xmlns:m="http://schemas.openxmlformats.org/officeDocument/2006/math">
                     <m:oMathParaPr>
@@ -4171,7 +4201,7 @@
             </p:txBody>
           </p:sp>
         </mc:Choice>
-        <mc:Fallback>
+        <mc:Fallback xmlns="">
           <p:sp>
             <p:nvSpPr>
               <p:cNvPr id="48" name="TextBox 47"/>
@@ -4247,8 +4277,8 @@
           </a:fontRef>
         </p:style>
       </p:cxnSp>
-      <mc:AlternateContent xmlns:mc="http://schemas.openxmlformats.org/markup-compatibility/2006">
-        <mc:Choice xmlns:a14="http://schemas.microsoft.com/office/drawing/2010/main" Requires="a14">
+      <mc:AlternateContent xmlns:mc="http://schemas.openxmlformats.org/markup-compatibility/2006" xmlns:a14="http://schemas.microsoft.com/office/drawing/2010/main">
+        <mc:Choice Requires="a14">
           <p:sp>
             <p:nvSpPr>
               <p:cNvPr id="53" name="TextBox 52"/>
@@ -4271,6 +4301,7 @@
               </a:bodyPr>
               <a:lstStyle/>
               <a:p>
+                <a:pPr/>
                 <a14:m>
                   <m:oMathPara xmlns:m="http://schemas.openxmlformats.org/officeDocument/2006/math">
                     <m:oMathParaPr>
@@ -4310,7 +4341,7 @@
             </p:txBody>
           </p:sp>
         </mc:Choice>
-        <mc:Fallback>
+        <mc:Fallback xmlns="">
           <p:sp>
             <p:nvSpPr>
               <p:cNvPr id="53" name="TextBox 52"/>
@@ -4353,6 +4384,1279 @@
     <p:extLst>
       <p:ext uri="{BB962C8B-B14F-4D97-AF65-F5344CB8AC3E}">
         <p14:creationId xmlns:p14="http://schemas.microsoft.com/office/powerpoint/2010/main" val="2137609512"/>
+      </p:ext>
+    </p:extLst>
+  </p:cSld>
+  <p:clrMapOvr>
+    <a:masterClrMapping/>
+  </p:clrMapOvr>
+</p:sld>
+</file>
+
+<file path=ppt/slides/slide2.xml><?xml version="1.0" encoding="utf-8"?>
+<p:sld xmlns:a="http://schemas.openxmlformats.org/drawingml/2006/main" xmlns:r="http://schemas.openxmlformats.org/officeDocument/2006/relationships" xmlns:p="http://schemas.openxmlformats.org/presentationml/2006/main">
+  <p:cSld>
+    <p:spTree>
+      <p:nvGrpSpPr>
+        <p:cNvPr id="1" name=""/>
+        <p:cNvGrpSpPr/>
+        <p:nvPr/>
+      </p:nvGrpSpPr>
+      <p:grpSpPr>
+        <a:xfrm>
+          <a:off x="0" y="0"/>
+          <a:ext cx="0" cy="0"/>
+          <a:chOff x="0" y="0"/>
+          <a:chExt cx="0" cy="0"/>
+        </a:xfrm>
+      </p:grpSpPr>
+      <p:cxnSp>
+        <p:nvCxnSpPr>
+          <p:cNvPr id="7" name="Straight Connector 6"/>
+          <p:cNvCxnSpPr/>
+          <p:nvPr/>
+        </p:nvCxnSpPr>
+        <p:spPr>
+          <a:xfrm flipV="1">
+            <a:off x="2984939" y="1408387"/>
+            <a:ext cx="2932386" cy="2932386"/>
+          </a:xfrm>
+          <a:prstGeom prst="line">
+            <a:avLst/>
+          </a:prstGeom>
+          <a:ln w="50800">
+            <a:solidFill>
+              <a:schemeClr val="tx1"/>
+            </a:solidFill>
+          </a:ln>
+        </p:spPr>
+        <p:style>
+          <a:lnRef idx="1">
+            <a:schemeClr val="accent1"/>
+          </a:lnRef>
+          <a:fillRef idx="0">
+            <a:schemeClr val="accent1"/>
+          </a:fillRef>
+          <a:effectRef idx="0">
+            <a:schemeClr val="accent1"/>
+          </a:effectRef>
+          <a:fontRef idx="minor">
+            <a:schemeClr val="tx1"/>
+          </a:fontRef>
+        </p:style>
+      </p:cxnSp>
+      <p:cxnSp>
+        <p:nvCxnSpPr>
+          <p:cNvPr id="8" name="Straight Connector 7"/>
+          <p:cNvCxnSpPr/>
+          <p:nvPr/>
+        </p:nvCxnSpPr>
+        <p:spPr>
+          <a:xfrm>
+            <a:off x="5917325" y="1408387"/>
+            <a:ext cx="2932386" cy="2932386"/>
+          </a:xfrm>
+          <a:prstGeom prst="line">
+            <a:avLst/>
+          </a:prstGeom>
+          <a:ln w="50800">
+            <a:solidFill>
+              <a:schemeClr val="tx1"/>
+            </a:solidFill>
+          </a:ln>
+        </p:spPr>
+        <p:style>
+          <a:lnRef idx="1">
+            <a:schemeClr val="accent1"/>
+          </a:lnRef>
+          <a:fillRef idx="0">
+            <a:schemeClr val="accent1"/>
+          </a:fillRef>
+          <a:effectRef idx="0">
+            <a:schemeClr val="accent1"/>
+          </a:effectRef>
+          <a:fontRef idx="minor">
+            <a:schemeClr val="tx1"/>
+          </a:fontRef>
+        </p:style>
+      </p:cxnSp>
+      <p:cxnSp>
+        <p:nvCxnSpPr>
+          <p:cNvPr id="10" name="Straight Connector 9"/>
+          <p:cNvCxnSpPr/>
+          <p:nvPr/>
+        </p:nvCxnSpPr>
+        <p:spPr>
+          <a:xfrm flipV="1">
+            <a:off x="3620696" y="1716640"/>
+            <a:ext cx="2627995" cy="2627994"/>
+          </a:xfrm>
+          <a:prstGeom prst="line">
+            <a:avLst/>
+          </a:prstGeom>
+          <a:ln w="50800">
+            <a:solidFill>
+              <a:schemeClr val="tx1"/>
+            </a:solidFill>
+          </a:ln>
+        </p:spPr>
+        <p:style>
+          <a:lnRef idx="1">
+            <a:schemeClr val="accent1"/>
+          </a:lnRef>
+          <a:fillRef idx="0">
+            <a:schemeClr val="accent1"/>
+          </a:fillRef>
+          <a:effectRef idx="0">
+            <a:schemeClr val="accent1"/>
+          </a:effectRef>
+          <a:fontRef idx="minor">
+            <a:schemeClr val="tx1"/>
+          </a:fontRef>
+        </p:style>
+      </p:cxnSp>
+      <p:cxnSp>
+        <p:nvCxnSpPr>
+          <p:cNvPr id="12" name="Straight Connector 11"/>
+          <p:cNvCxnSpPr/>
+          <p:nvPr/>
+        </p:nvCxnSpPr>
+        <p:spPr>
+          <a:xfrm flipV="1">
+            <a:off x="5071730" y="2453833"/>
+            <a:ext cx="1891219" cy="1891221"/>
+          </a:xfrm>
+          <a:prstGeom prst="line">
+            <a:avLst/>
+          </a:prstGeom>
+          <a:ln w="50800">
+            <a:solidFill>
+              <a:schemeClr val="tx1"/>
+            </a:solidFill>
+          </a:ln>
+        </p:spPr>
+        <p:style>
+          <a:lnRef idx="1">
+            <a:schemeClr val="accent1"/>
+          </a:lnRef>
+          <a:fillRef idx="0">
+            <a:schemeClr val="accent1"/>
+          </a:fillRef>
+          <a:effectRef idx="0">
+            <a:schemeClr val="accent1"/>
+          </a:effectRef>
+          <a:fontRef idx="minor">
+            <a:schemeClr val="tx1"/>
+          </a:fontRef>
+        </p:style>
+      </p:cxnSp>
+      <p:cxnSp>
+        <p:nvCxnSpPr>
+          <p:cNvPr id="14" name="Straight Connector 13"/>
+          <p:cNvCxnSpPr/>
+          <p:nvPr/>
+        </p:nvCxnSpPr>
+        <p:spPr>
+          <a:xfrm flipV="1">
+            <a:off x="6399335" y="3112407"/>
+            <a:ext cx="1225188" cy="1225188"/>
+          </a:xfrm>
+          <a:prstGeom prst="line">
+            <a:avLst/>
+          </a:prstGeom>
+          <a:ln w="50800">
+            <a:solidFill>
+              <a:schemeClr val="tx1"/>
+            </a:solidFill>
+          </a:ln>
+        </p:spPr>
+        <p:style>
+          <a:lnRef idx="1">
+            <a:schemeClr val="accent1"/>
+          </a:lnRef>
+          <a:fillRef idx="0">
+            <a:schemeClr val="accent1"/>
+          </a:fillRef>
+          <a:effectRef idx="0">
+            <a:schemeClr val="accent1"/>
+          </a:effectRef>
+          <a:fontRef idx="minor">
+            <a:schemeClr val="tx1"/>
+          </a:fontRef>
+        </p:style>
+      </p:cxnSp>
+      <p:cxnSp>
+        <p:nvCxnSpPr>
+          <p:cNvPr id="16" name="Straight Connector 15"/>
+          <p:cNvCxnSpPr/>
+          <p:nvPr/>
+        </p:nvCxnSpPr>
+        <p:spPr>
+          <a:xfrm flipV="1">
+            <a:off x="7599592" y="3725003"/>
+            <a:ext cx="622126" cy="622124"/>
+          </a:xfrm>
+          <a:prstGeom prst="line">
+            <a:avLst/>
+          </a:prstGeom>
+          <a:ln w="50800">
+            <a:solidFill>
+              <a:schemeClr val="tx1"/>
+            </a:solidFill>
+          </a:ln>
+        </p:spPr>
+        <p:style>
+          <a:lnRef idx="1">
+            <a:schemeClr val="accent1"/>
+          </a:lnRef>
+          <a:fillRef idx="0">
+            <a:schemeClr val="accent1"/>
+          </a:fillRef>
+          <a:effectRef idx="0">
+            <a:schemeClr val="accent1"/>
+          </a:effectRef>
+          <a:fontRef idx="minor">
+            <a:schemeClr val="tx1"/>
+          </a:fontRef>
+        </p:style>
+      </p:cxnSp>
+      <mc:AlternateContent xmlns:mc="http://schemas.openxmlformats.org/markup-compatibility/2006">
+        <mc:Choice xmlns:a14="http://schemas.microsoft.com/office/drawing/2010/main" Requires="a14">
+          <p:sp>
+            <p:nvSpPr>
+              <p:cNvPr id="21" name="TextBox 20"/>
+              <p:cNvSpPr txBox="1"/>
+              <p:nvPr/>
+            </p:nvSpPr>
+            <p:spPr>
+              <a:xfrm>
+                <a:off x="5521510" y="4360061"/>
+                <a:ext cx="791627" cy="369332"/>
+              </a:xfrm>
+              <a:prstGeom prst="rect">
+                <a:avLst/>
+              </a:prstGeom>
+              <a:noFill/>
+            </p:spPr>
+            <p:txBody>
+              <a:bodyPr wrap="none" lIns="0" tIns="0" rIns="0" bIns="0" rtlCol="0">
+                <a:spAutoFit/>
+              </a:bodyPr>
+              <a:lstStyle/>
+              <a:p>
+                <a14:m>
+                  <m:oMathPara xmlns:m="http://schemas.openxmlformats.org/officeDocument/2006/math">
+                    <m:oMathParaPr>
+                      <m:jc m:val="centerGroup"/>
+                    </m:oMathParaPr>
+                    <m:oMath xmlns:m="http://schemas.openxmlformats.org/officeDocument/2006/math">
+                      <m:r>
+                        <a:rPr lang="en-US" sz="2400" b="0" i="1" smtClean="0">
+                          <a:latin typeface="Cambria Math" charset="0"/>
+                        </a:rPr>
+                        <m:t>𝑟</m:t>
+                      </m:r>
+                      <m:r>
+                        <a:rPr lang="en-US" sz="2400" b="0" i="1" smtClean="0">
+                          <a:latin typeface="Cambria Math" charset="0"/>
+                        </a:rPr>
+                        <m:t>=0</m:t>
+                      </m:r>
+                    </m:oMath>
+                  </m:oMathPara>
+                </a14:m>
+                <a:endParaRPr lang="en-US" sz="2400" dirty="0"/>
+              </a:p>
+            </p:txBody>
+          </p:sp>
+        </mc:Choice>
+        <mc:Fallback>
+          <p:sp>
+            <p:nvSpPr>
+              <p:cNvPr id="21" name="TextBox 20"/>
+              <p:cNvSpPr txBox="1">
+                <a:spLocks noRot="1" noChangeAspect="1" noMove="1" noResize="1" noEditPoints="1" noAdjustHandles="1" noChangeArrowheads="1" noChangeShapeType="1" noTextEdit="1"/>
+              </p:cNvSpPr>
+              <p:nvPr/>
+            </p:nvSpPr>
+            <p:spPr>
+              <a:xfrm>
+                <a:off x="5521510" y="4360061"/>
+                <a:ext cx="791627" cy="369332"/>
+              </a:xfrm>
+              <a:prstGeom prst="rect">
+                <a:avLst/>
+              </a:prstGeom>
+              <a:blipFill rotWithShape="0">
+                <a:blip r:embed="rId2"/>
+                <a:stretch>
+                  <a:fillRect l="-5385" r="-8462" b="-6557"/>
+                </a:stretch>
+              </a:blipFill>
+            </p:spPr>
+            <p:txBody>
+              <a:bodyPr/>
+              <a:lstStyle/>
+              <a:p>
+                <a:r>
+                  <a:rPr lang="en-US">
+                    <a:noFill/>
+                  </a:rPr>
+                  <a:t> </a:t>
+                </a:r>
+              </a:p>
+            </p:txBody>
+          </p:sp>
+        </mc:Fallback>
+      </mc:AlternateContent>
+      <p:cxnSp>
+        <p:nvCxnSpPr>
+          <p:cNvPr id="26" name="Straight Connector 25"/>
+          <p:cNvCxnSpPr/>
+          <p:nvPr/>
+        </p:nvCxnSpPr>
+        <p:spPr>
+          <a:xfrm flipV="1">
+            <a:off x="5768585" y="2814054"/>
+            <a:ext cx="1529719" cy="1529718"/>
+          </a:xfrm>
+          <a:prstGeom prst="line">
+            <a:avLst/>
+          </a:prstGeom>
+          <a:ln w="50800">
+            <a:solidFill>
+              <a:schemeClr val="tx1"/>
+            </a:solidFill>
+          </a:ln>
+        </p:spPr>
+        <p:style>
+          <a:lnRef idx="1">
+            <a:schemeClr val="accent1"/>
+          </a:lnRef>
+          <a:fillRef idx="0">
+            <a:schemeClr val="accent1"/>
+          </a:fillRef>
+          <a:effectRef idx="0">
+            <a:schemeClr val="accent1"/>
+          </a:effectRef>
+          <a:fontRef idx="minor">
+            <a:schemeClr val="tx1"/>
+          </a:fontRef>
+        </p:style>
+      </p:cxnSp>
+      <p:cxnSp>
+        <p:nvCxnSpPr>
+          <p:cNvPr id="30" name="Straight Connector 29"/>
+          <p:cNvCxnSpPr/>
+          <p:nvPr/>
+        </p:nvCxnSpPr>
+        <p:spPr>
+          <a:xfrm flipV="1">
+            <a:off x="6949780" y="3399443"/>
+            <a:ext cx="948052" cy="948052"/>
+          </a:xfrm>
+          <a:prstGeom prst="line">
+            <a:avLst/>
+          </a:prstGeom>
+          <a:ln w="50800">
+            <a:solidFill>
+              <a:schemeClr val="tx1"/>
+            </a:solidFill>
+          </a:ln>
+        </p:spPr>
+        <p:style>
+          <a:lnRef idx="1">
+            <a:schemeClr val="accent1"/>
+          </a:lnRef>
+          <a:fillRef idx="0">
+            <a:schemeClr val="accent1"/>
+          </a:fillRef>
+          <a:effectRef idx="0">
+            <a:schemeClr val="accent1"/>
+          </a:effectRef>
+          <a:fontRef idx="minor">
+            <a:schemeClr val="tx1"/>
+          </a:fontRef>
+        </p:style>
+      </p:cxnSp>
+      <p:cxnSp>
+        <p:nvCxnSpPr>
+          <p:cNvPr id="33" name="Straight Connector 32"/>
+          <p:cNvCxnSpPr/>
+          <p:nvPr/>
+        </p:nvCxnSpPr>
+        <p:spPr>
+          <a:xfrm flipV="1">
+            <a:off x="4334174" y="2077943"/>
+            <a:ext cx="2256898" cy="2256897"/>
+          </a:xfrm>
+          <a:prstGeom prst="line">
+            <a:avLst/>
+          </a:prstGeom>
+          <a:ln w="50800">
+            <a:solidFill>
+              <a:schemeClr val="tx1"/>
+            </a:solidFill>
+          </a:ln>
+        </p:spPr>
+        <p:style>
+          <a:lnRef idx="1">
+            <a:schemeClr val="accent1"/>
+          </a:lnRef>
+          <a:fillRef idx="0">
+            <a:schemeClr val="accent1"/>
+          </a:fillRef>
+          <a:effectRef idx="0">
+            <a:schemeClr val="accent1"/>
+          </a:effectRef>
+          <a:fontRef idx="minor">
+            <a:schemeClr val="tx1"/>
+          </a:fontRef>
+        </p:style>
+      </p:cxnSp>
+    </p:spTree>
+    <p:extLst>
+      <p:ext uri="{BB962C8B-B14F-4D97-AF65-F5344CB8AC3E}">
+        <p14:creationId xmlns:p14="http://schemas.microsoft.com/office/powerpoint/2010/main" val="655817872"/>
+      </p:ext>
+    </p:extLst>
+  </p:cSld>
+  <p:clrMapOvr>
+    <a:masterClrMapping/>
+  </p:clrMapOvr>
+</p:sld>
+</file>
+
+<file path=ppt/slides/slide3.xml><?xml version="1.0" encoding="utf-8"?>
+<p:sld xmlns:a="http://schemas.openxmlformats.org/drawingml/2006/main" xmlns:r="http://schemas.openxmlformats.org/officeDocument/2006/relationships" xmlns:p="http://schemas.openxmlformats.org/presentationml/2006/main">
+  <p:cSld>
+    <p:spTree>
+      <p:nvGrpSpPr>
+        <p:cNvPr id="1" name=""/>
+        <p:cNvGrpSpPr/>
+        <p:nvPr/>
+      </p:nvGrpSpPr>
+      <p:grpSpPr>
+        <a:xfrm>
+          <a:off x="0" y="0"/>
+          <a:ext cx="0" cy="0"/>
+          <a:chOff x="0" y="0"/>
+          <a:chExt cx="0" cy="0"/>
+        </a:xfrm>
+      </p:grpSpPr>
+      <p:cxnSp>
+        <p:nvCxnSpPr>
+          <p:cNvPr id="7" name="Straight Connector 6"/>
+          <p:cNvCxnSpPr/>
+          <p:nvPr/>
+        </p:nvCxnSpPr>
+        <p:spPr>
+          <a:xfrm flipV="1">
+            <a:off x="2984939" y="1408387"/>
+            <a:ext cx="2932386" cy="2932386"/>
+          </a:xfrm>
+          <a:prstGeom prst="line">
+            <a:avLst/>
+          </a:prstGeom>
+          <a:ln w="50800">
+            <a:solidFill>
+              <a:schemeClr val="tx1"/>
+            </a:solidFill>
+          </a:ln>
+        </p:spPr>
+        <p:style>
+          <a:lnRef idx="1">
+            <a:schemeClr val="accent1"/>
+          </a:lnRef>
+          <a:fillRef idx="0">
+            <a:schemeClr val="accent1"/>
+          </a:fillRef>
+          <a:effectRef idx="0">
+            <a:schemeClr val="accent1"/>
+          </a:effectRef>
+          <a:fontRef idx="minor">
+            <a:schemeClr val="tx1"/>
+          </a:fontRef>
+        </p:style>
+      </p:cxnSp>
+      <p:cxnSp>
+        <p:nvCxnSpPr>
+          <p:cNvPr id="8" name="Straight Connector 7"/>
+          <p:cNvCxnSpPr/>
+          <p:nvPr/>
+        </p:nvCxnSpPr>
+        <p:spPr>
+          <a:xfrm>
+            <a:off x="5917325" y="1408387"/>
+            <a:ext cx="2932386" cy="2932386"/>
+          </a:xfrm>
+          <a:prstGeom prst="line">
+            <a:avLst/>
+          </a:prstGeom>
+          <a:ln w="50800">
+            <a:solidFill>
+              <a:schemeClr val="tx1"/>
+            </a:solidFill>
+          </a:ln>
+        </p:spPr>
+        <p:style>
+          <a:lnRef idx="1">
+            <a:schemeClr val="accent1"/>
+          </a:lnRef>
+          <a:fillRef idx="0">
+            <a:schemeClr val="accent1"/>
+          </a:fillRef>
+          <a:effectRef idx="0">
+            <a:schemeClr val="accent1"/>
+          </a:effectRef>
+          <a:fontRef idx="minor">
+            <a:schemeClr val="tx1"/>
+          </a:fontRef>
+        </p:style>
+      </p:cxnSp>
+      <p:cxnSp>
+        <p:nvCxnSpPr>
+          <p:cNvPr id="14" name="Straight Connector 13"/>
+          <p:cNvCxnSpPr/>
+          <p:nvPr/>
+        </p:nvCxnSpPr>
+        <p:spPr>
+          <a:xfrm flipV="1">
+            <a:off x="6399335" y="3112407"/>
+            <a:ext cx="1225188" cy="1225188"/>
+          </a:xfrm>
+          <a:prstGeom prst="line">
+            <a:avLst/>
+          </a:prstGeom>
+          <a:ln w="50800">
+            <a:solidFill>
+              <a:schemeClr val="tx1"/>
+            </a:solidFill>
+          </a:ln>
+        </p:spPr>
+        <p:style>
+          <a:lnRef idx="1">
+            <a:schemeClr val="accent1"/>
+          </a:lnRef>
+          <a:fillRef idx="0">
+            <a:schemeClr val="accent1"/>
+          </a:fillRef>
+          <a:effectRef idx="0">
+            <a:schemeClr val="accent1"/>
+          </a:effectRef>
+          <a:fontRef idx="minor">
+            <a:schemeClr val="tx1"/>
+          </a:fontRef>
+        </p:style>
+      </p:cxnSp>
+      <p:cxnSp>
+        <p:nvCxnSpPr>
+          <p:cNvPr id="16" name="Straight Connector 15"/>
+          <p:cNvCxnSpPr/>
+          <p:nvPr/>
+        </p:nvCxnSpPr>
+        <p:spPr>
+          <a:xfrm flipV="1">
+            <a:off x="7599592" y="3725003"/>
+            <a:ext cx="622126" cy="622124"/>
+          </a:xfrm>
+          <a:prstGeom prst="line">
+            <a:avLst/>
+          </a:prstGeom>
+          <a:ln w="50800">
+            <a:solidFill>
+              <a:schemeClr val="tx1"/>
+            </a:solidFill>
+          </a:ln>
+        </p:spPr>
+        <p:style>
+          <a:lnRef idx="1">
+            <a:schemeClr val="accent1"/>
+          </a:lnRef>
+          <a:fillRef idx="0">
+            <a:schemeClr val="accent1"/>
+          </a:fillRef>
+          <a:effectRef idx="0">
+            <a:schemeClr val="accent1"/>
+          </a:effectRef>
+          <a:fontRef idx="minor">
+            <a:schemeClr val="tx1"/>
+          </a:fontRef>
+        </p:style>
+      </p:cxnSp>
+      <p:cxnSp>
+        <p:nvCxnSpPr>
+          <p:cNvPr id="26" name="Straight Connector 25"/>
+          <p:cNvCxnSpPr/>
+          <p:nvPr/>
+        </p:nvCxnSpPr>
+        <p:spPr>
+          <a:xfrm flipV="1">
+            <a:off x="5768585" y="2814054"/>
+            <a:ext cx="1529719" cy="1529718"/>
+          </a:xfrm>
+          <a:prstGeom prst="line">
+            <a:avLst/>
+          </a:prstGeom>
+          <a:ln w="50800">
+            <a:solidFill>
+              <a:schemeClr val="tx1"/>
+            </a:solidFill>
+          </a:ln>
+        </p:spPr>
+        <p:style>
+          <a:lnRef idx="1">
+            <a:schemeClr val="accent1"/>
+          </a:lnRef>
+          <a:fillRef idx="0">
+            <a:schemeClr val="accent1"/>
+          </a:fillRef>
+          <a:effectRef idx="0">
+            <a:schemeClr val="accent1"/>
+          </a:effectRef>
+          <a:fontRef idx="minor">
+            <a:schemeClr val="tx1"/>
+          </a:fontRef>
+        </p:style>
+      </p:cxnSp>
+      <p:cxnSp>
+        <p:nvCxnSpPr>
+          <p:cNvPr id="30" name="Straight Connector 29"/>
+          <p:cNvCxnSpPr/>
+          <p:nvPr/>
+        </p:nvCxnSpPr>
+        <p:spPr>
+          <a:xfrm flipV="1">
+            <a:off x="6949780" y="3399443"/>
+            <a:ext cx="948052" cy="948052"/>
+          </a:xfrm>
+          <a:prstGeom prst="line">
+            <a:avLst/>
+          </a:prstGeom>
+          <a:ln w="50800">
+            <a:solidFill>
+              <a:schemeClr val="tx1"/>
+            </a:solidFill>
+          </a:ln>
+        </p:spPr>
+        <p:style>
+          <a:lnRef idx="1">
+            <a:schemeClr val="accent1"/>
+          </a:lnRef>
+          <a:fillRef idx="0">
+            <a:schemeClr val="accent1"/>
+          </a:fillRef>
+          <a:effectRef idx="0">
+            <a:schemeClr val="accent1"/>
+          </a:effectRef>
+          <a:fontRef idx="minor">
+            <a:schemeClr val="tx1"/>
+          </a:fontRef>
+        </p:style>
+      </p:cxnSp>
+      <p:cxnSp>
+        <p:nvCxnSpPr>
+          <p:cNvPr id="33" name="Straight Connector 32"/>
+          <p:cNvCxnSpPr/>
+          <p:nvPr/>
+        </p:nvCxnSpPr>
+        <p:spPr>
+          <a:xfrm flipV="1">
+            <a:off x="4778467" y="2287831"/>
+            <a:ext cx="2044197" cy="2044195"/>
+          </a:xfrm>
+          <a:prstGeom prst="line">
+            <a:avLst/>
+          </a:prstGeom>
+          <a:ln w="50800">
+            <a:solidFill>
+              <a:schemeClr val="tx1"/>
+            </a:solidFill>
+          </a:ln>
+        </p:spPr>
+        <p:style>
+          <a:lnRef idx="1">
+            <a:schemeClr val="accent1"/>
+          </a:lnRef>
+          <a:fillRef idx="0">
+            <a:schemeClr val="accent1"/>
+          </a:fillRef>
+          <a:effectRef idx="0">
+            <a:schemeClr val="accent1"/>
+          </a:effectRef>
+          <a:fontRef idx="minor">
+            <a:schemeClr val="tx1"/>
+          </a:fontRef>
+        </p:style>
+      </p:cxnSp>
+      <mc:AlternateContent xmlns:mc="http://schemas.openxmlformats.org/markup-compatibility/2006">
+        <mc:Choice xmlns:a14="http://schemas.microsoft.com/office/drawing/2010/main" Requires="a14">
+          <p:sp>
+            <p:nvSpPr>
+              <p:cNvPr id="13" name="TextBox 12"/>
+              <p:cNvSpPr txBox="1"/>
+              <p:nvPr/>
+            </p:nvSpPr>
+            <p:spPr>
+              <a:xfrm>
+                <a:off x="5213221" y="4360061"/>
+                <a:ext cx="1408206" cy="369332"/>
+              </a:xfrm>
+              <a:prstGeom prst="rect">
+                <a:avLst/>
+              </a:prstGeom>
+              <a:noFill/>
+            </p:spPr>
+            <p:txBody>
+              <a:bodyPr wrap="none" lIns="0" tIns="0" rIns="0" bIns="0" rtlCol="0">
+                <a:spAutoFit/>
+              </a:bodyPr>
+              <a:lstStyle/>
+              <a:p>
+                <a14:m>
+                  <m:oMathPara xmlns:m="http://schemas.openxmlformats.org/officeDocument/2006/math">
+                    <m:oMathParaPr>
+                      <m:jc m:val="centerGroup"/>
+                    </m:oMathParaPr>
+                    <m:oMath xmlns:m="http://schemas.openxmlformats.org/officeDocument/2006/math">
+                      <m:r>
+                        <a:rPr lang="en-US" sz="2400" b="0" i="1" smtClean="0">
+                          <a:latin typeface="Cambria Math" charset="0"/>
+                        </a:rPr>
+                        <m:t>0&lt;</m:t>
+                      </m:r>
+                      <m:r>
+                        <a:rPr lang="en-US" sz="2400" b="0" i="1" smtClean="0">
+                          <a:latin typeface="Cambria Math" charset="0"/>
+                        </a:rPr>
+                        <m:t>𝑟</m:t>
+                      </m:r>
+                      <m:r>
+                        <a:rPr lang="en-US" sz="2400" b="0" i="1" smtClean="0">
+                          <a:latin typeface="Cambria Math" charset="0"/>
+                        </a:rPr>
+                        <m:t>≪1</m:t>
+                      </m:r>
+                    </m:oMath>
+                  </m:oMathPara>
+                </a14:m>
+                <a:endParaRPr lang="en-US" sz="2400" dirty="0"/>
+              </a:p>
+            </p:txBody>
+          </p:sp>
+        </mc:Choice>
+        <mc:Fallback>
+          <p:sp>
+            <p:nvSpPr>
+              <p:cNvPr id="13" name="TextBox 12"/>
+              <p:cNvSpPr txBox="1">
+                <a:spLocks noRot="1" noChangeAspect="1" noMove="1" noResize="1" noEditPoints="1" noAdjustHandles="1" noChangeArrowheads="1" noChangeShapeType="1" noTextEdit="1"/>
+              </p:cNvSpPr>
+              <p:nvPr/>
+            </p:nvSpPr>
+            <p:spPr>
+              <a:xfrm>
+                <a:off x="5213221" y="4360061"/>
+                <a:ext cx="1408206" cy="369332"/>
+              </a:xfrm>
+              <a:prstGeom prst="rect">
+                <a:avLst/>
+              </a:prstGeom>
+              <a:blipFill rotWithShape="0">
+                <a:blip r:embed="rId2"/>
+                <a:stretch>
+                  <a:fillRect l="-4329" r="-5195" b="-6557"/>
+                </a:stretch>
+              </a:blipFill>
+            </p:spPr>
+            <p:txBody>
+              <a:bodyPr/>
+              <a:lstStyle/>
+              <a:p>
+                <a:r>
+                  <a:rPr lang="en-US">
+                    <a:noFill/>
+                  </a:rPr>
+                  <a:t> </a:t>
+                </a:r>
+              </a:p>
+            </p:txBody>
+          </p:sp>
+        </mc:Fallback>
+      </mc:AlternateContent>
+      <p:cxnSp>
+        <p:nvCxnSpPr>
+          <p:cNvPr id="15" name="Straight Connector 14"/>
+          <p:cNvCxnSpPr/>
+          <p:nvPr/>
+        </p:nvCxnSpPr>
+        <p:spPr>
+          <a:xfrm>
+            <a:off x="3790301" y="3561326"/>
+            <a:ext cx="781699" cy="781699"/>
+          </a:xfrm>
+          <a:prstGeom prst="line">
+            <a:avLst/>
+          </a:prstGeom>
+          <a:ln w="50800">
+            <a:solidFill>
+              <a:schemeClr val="tx1"/>
+            </a:solidFill>
+          </a:ln>
+        </p:spPr>
+        <p:style>
+          <a:lnRef idx="1">
+            <a:schemeClr val="accent1"/>
+          </a:lnRef>
+          <a:fillRef idx="0">
+            <a:schemeClr val="accent1"/>
+          </a:fillRef>
+          <a:effectRef idx="0">
+            <a:schemeClr val="accent1"/>
+          </a:effectRef>
+          <a:fontRef idx="minor">
+            <a:schemeClr val="tx1"/>
+          </a:fontRef>
+        </p:style>
+      </p:cxnSp>
+    </p:spTree>
+    <p:extLst>
+      <p:ext uri="{BB962C8B-B14F-4D97-AF65-F5344CB8AC3E}">
+        <p14:creationId xmlns:p14="http://schemas.microsoft.com/office/powerpoint/2010/main" val="913119626"/>
+      </p:ext>
+    </p:extLst>
+  </p:cSld>
+  <p:clrMapOvr>
+    <a:masterClrMapping/>
+  </p:clrMapOvr>
+</p:sld>
+</file>
+
+<file path=ppt/slides/slide4.xml><?xml version="1.0" encoding="utf-8"?>
+<p:sld xmlns:a="http://schemas.openxmlformats.org/drawingml/2006/main" xmlns:r="http://schemas.openxmlformats.org/officeDocument/2006/relationships" xmlns:p="http://schemas.openxmlformats.org/presentationml/2006/main">
+  <p:cSld>
+    <p:spTree>
+      <p:nvGrpSpPr>
+        <p:cNvPr id="1" name=""/>
+        <p:cNvGrpSpPr/>
+        <p:nvPr/>
+      </p:nvGrpSpPr>
+      <p:grpSpPr>
+        <a:xfrm>
+          <a:off x="0" y="0"/>
+          <a:ext cx="0" cy="0"/>
+          <a:chOff x="0" y="0"/>
+          <a:chExt cx="0" cy="0"/>
+        </a:xfrm>
+      </p:grpSpPr>
+      <p:cxnSp>
+        <p:nvCxnSpPr>
+          <p:cNvPr id="7" name="Straight Connector 6"/>
+          <p:cNvCxnSpPr/>
+          <p:nvPr/>
+        </p:nvCxnSpPr>
+        <p:spPr>
+          <a:xfrm flipV="1">
+            <a:off x="2984939" y="1408387"/>
+            <a:ext cx="2932386" cy="2932386"/>
+          </a:xfrm>
+          <a:prstGeom prst="line">
+            <a:avLst/>
+          </a:prstGeom>
+          <a:ln w="50800">
+            <a:solidFill>
+              <a:schemeClr val="tx1"/>
+            </a:solidFill>
+          </a:ln>
+        </p:spPr>
+        <p:style>
+          <a:lnRef idx="1">
+            <a:schemeClr val="accent1"/>
+          </a:lnRef>
+          <a:fillRef idx="0">
+            <a:schemeClr val="accent1"/>
+          </a:fillRef>
+          <a:effectRef idx="0">
+            <a:schemeClr val="accent1"/>
+          </a:effectRef>
+          <a:fontRef idx="minor">
+            <a:schemeClr val="tx1"/>
+          </a:fontRef>
+        </p:style>
+      </p:cxnSp>
+      <p:cxnSp>
+        <p:nvCxnSpPr>
+          <p:cNvPr id="8" name="Straight Connector 7"/>
+          <p:cNvCxnSpPr/>
+          <p:nvPr/>
+        </p:nvCxnSpPr>
+        <p:spPr>
+          <a:xfrm>
+            <a:off x="5917325" y="1408387"/>
+            <a:ext cx="2932386" cy="2932386"/>
+          </a:xfrm>
+          <a:prstGeom prst="line">
+            <a:avLst/>
+          </a:prstGeom>
+          <a:ln w="50800">
+            <a:solidFill>
+              <a:schemeClr val="tx1"/>
+            </a:solidFill>
+          </a:ln>
+        </p:spPr>
+        <p:style>
+          <a:lnRef idx="1">
+            <a:schemeClr val="accent1"/>
+          </a:lnRef>
+          <a:fillRef idx="0">
+            <a:schemeClr val="accent1"/>
+          </a:fillRef>
+          <a:effectRef idx="0">
+            <a:schemeClr val="accent1"/>
+          </a:effectRef>
+          <a:fontRef idx="minor">
+            <a:schemeClr val="tx1"/>
+          </a:fontRef>
+        </p:style>
+      </p:cxnSp>
+      <p:cxnSp>
+        <p:nvCxnSpPr>
+          <p:cNvPr id="10" name="Straight Connector 9"/>
+          <p:cNvCxnSpPr/>
+          <p:nvPr/>
+        </p:nvCxnSpPr>
+        <p:spPr>
+          <a:xfrm flipV="1">
+            <a:off x="3769654" y="1798411"/>
+            <a:ext cx="2552133" cy="2552131"/>
+          </a:xfrm>
+          <a:prstGeom prst="line">
+            <a:avLst/>
+          </a:prstGeom>
+          <a:ln w="50800">
+            <a:solidFill>
+              <a:schemeClr val="tx1"/>
+            </a:solidFill>
+          </a:ln>
+        </p:spPr>
+        <p:style>
+          <a:lnRef idx="1">
+            <a:schemeClr val="accent1"/>
+          </a:lnRef>
+          <a:fillRef idx="0">
+            <a:schemeClr val="accent1"/>
+          </a:fillRef>
+          <a:effectRef idx="0">
+            <a:schemeClr val="accent1"/>
+          </a:effectRef>
+          <a:fontRef idx="minor">
+            <a:schemeClr val="tx1"/>
+          </a:fontRef>
+        </p:style>
+      </p:cxnSp>
+      <p:cxnSp>
+        <p:nvCxnSpPr>
+          <p:cNvPr id="12" name="Straight Connector 11"/>
+          <p:cNvCxnSpPr/>
+          <p:nvPr/>
+        </p:nvCxnSpPr>
+        <p:spPr>
+          <a:xfrm flipV="1">
+            <a:off x="5071730" y="2453833"/>
+            <a:ext cx="1891219" cy="1891221"/>
+          </a:xfrm>
+          <a:prstGeom prst="line">
+            <a:avLst/>
+          </a:prstGeom>
+          <a:ln w="50800">
+            <a:solidFill>
+              <a:schemeClr val="tx1"/>
+            </a:solidFill>
+          </a:ln>
+        </p:spPr>
+        <p:style>
+          <a:lnRef idx="1">
+            <a:schemeClr val="accent1"/>
+          </a:lnRef>
+          <a:fillRef idx="0">
+            <a:schemeClr val="accent1"/>
+          </a:fillRef>
+          <a:effectRef idx="0">
+            <a:schemeClr val="accent1"/>
+          </a:effectRef>
+          <a:fontRef idx="minor">
+            <a:schemeClr val="tx1"/>
+          </a:fontRef>
+        </p:style>
+      </p:cxnSp>
+      <mc:AlternateContent xmlns:mc="http://schemas.openxmlformats.org/markup-compatibility/2006">
+        <mc:Choice xmlns:a14="http://schemas.microsoft.com/office/drawing/2010/main" Requires="a14">
+          <p:sp>
+            <p:nvSpPr>
+              <p:cNvPr id="21" name="TextBox 20"/>
+              <p:cNvSpPr txBox="1"/>
+              <p:nvPr/>
+            </p:nvSpPr>
+            <p:spPr>
+              <a:xfrm>
+                <a:off x="5521510" y="4360061"/>
+                <a:ext cx="791627" cy="369332"/>
+              </a:xfrm>
+              <a:prstGeom prst="rect">
+                <a:avLst/>
+              </a:prstGeom>
+              <a:noFill/>
+            </p:spPr>
+            <p:txBody>
+              <a:bodyPr wrap="none" lIns="0" tIns="0" rIns="0" bIns="0" rtlCol="0">
+                <a:spAutoFit/>
+              </a:bodyPr>
+              <a:lstStyle/>
+              <a:p>
+                <a14:m>
+                  <m:oMathPara xmlns:m="http://schemas.openxmlformats.org/officeDocument/2006/math">
+                    <m:oMathParaPr>
+                      <m:jc m:val="centerGroup"/>
+                    </m:oMathParaPr>
+                    <m:oMath xmlns:m="http://schemas.openxmlformats.org/officeDocument/2006/math">
+                      <m:r>
+                        <a:rPr lang="en-US" sz="2400" b="0" i="1" smtClean="0">
+                          <a:latin typeface="Cambria Math" charset="0"/>
+                        </a:rPr>
+                        <m:t>𝑟</m:t>
+                      </m:r>
+                      <m:r>
+                        <a:rPr lang="en-US" sz="2400" b="0" i="1" smtClean="0">
+                          <a:latin typeface="Cambria Math" charset="0"/>
+                        </a:rPr>
+                        <m:t>=1</m:t>
+                      </m:r>
+                    </m:oMath>
+                  </m:oMathPara>
+                </a14:m>
+                <a:endParaRPr lang="en-US" sz="2400" dirty="0"/>
+              </a:p>
+            </p:txBody>
+          </p:sp>
+        </mc:Choice>
+        <mc:Fallback>
+          <p:sp>
+            <p:nvSpPr>
+              <p:cNvPr id="21" name="TextBox 20"/>
+              <p:cNvSpPr txBox="1">
+                <a:spLocks noRot="1" noChangeAspect="1" noMove="1" noResize="1" noEditPoints="1" noAdjustHandles="1" noChangeArrowheads="1" noChangeShapeType="1" noTextEdit="1"/>
+              </p:cNvSpPr>
+              <p:nvPr/>
+            </p:nvSpPr>
+            <p:spPr>
+              <a:xfrm>
+                <a:off x="5521510" y="4360061"/>
+                <a:ext cx="791627" cy="369332"/>
+              </a:xfrm>
+              <a:prstGeom prst="rect">
+                <a:avLst/>
+              </a:prstGeom>
+              <a:blipFill rotWithShape="0">
+                <a:blip r:embed="rId2"/>
+                <a:stretch>
+                  <a:fillRect l="-5385" r="-8462" b="-6557"/>
+                </a:stretch>
+              </a:blipFill>
+            </p:spPr>
+            <p:txBody>
+              <a:bodyPr/>
+              <a:lstStyle/>
+              <a:p>
+                <a:r>
+                  <a:rPr lang="en-US">
+                    <a:noFill/>
+                  </a:rPr>
+                  <a:t> </a:t>
+                </a:r>
+              </a:p>
+            </p:txBody>
+          </p:sp>
+        </mc:Fallback>
+      </mc:AlternateContent>
+      <p:cxnSp>
+        <p:nvCxnSpPr>
+          <p:cNvPr id="26" name="Straight Connector 25"/>
+          <p:cNvCxnSpPr/>
+          <p:nvPr/>
+        </p:nvCxnSpPr>
+        <p:spPr>
+          <a:xfrm flipV="1">
+            <a:off x="5768585" y="2814054"/>
+            <a:ext cx="1529719" cy="1529718"/>
+          </a:xfrm>
+          <a:prstGeom prst="line">
+            <a:avLst/>
+          </a:prstGeom>
+          <a:ln w="50800">
+            <a:solidFill>
+              <a:schemeClr val="tx1"/>
+            </a:solidFill>
+          </a:ln>
+        </p:spPr>
+        <p:style>
+          <a:lnRef idx="1">
+            <a:schemeClr val="accent1"/>
+          </a:lnRef>
+          <a:fillRef idx="0">
+            <a:schemeClr val="accent1"/>
+          </a:fillRef>
+          <a:effectRef idx="0">
+            <a:schemeClr val="accent1"/>
+          </a:effectRef>
+          <a:fontRef idx="minor">
+            <a:schemeClr val="tx1"/>
+          </a:fontRef>
+        </p:style>
+      </p:cxnSp>
+      <p:cxnSp>
+        <p:nvCxnSpPr>
+          <p:cNvPr id="30" name="Straight Connector 29"/>
+          <p:cNvCxnSpPr/>
+          <p:nvPr/>
+        </p:nvCxnSpPr>
+        <p:spPr>
+          <a:xfrm flipV="1">
+            <a:off x="7536543" y="3675341"/>
+            <a:ext cx="672929" cy="672928"/>
+          </a:xfrm>
+          <a:prstGeom prst="line">
+            <a:avLst/>
+          </a:prstGeom>
+          <a:ln w="50800">
+            <a:solidFill>
+              <a:schemeClr val="tx1"/>
+            </a:solidFill>
+          </a:ln>
+        </p:spPr>
+        <p:style>
+          <a:lnRef idx="1">
+            <a:schemeClr val="accent1"/>
+          </a:lnRef>
+          <a:fillRef idx="0">
+            <a:schemeClr val="accent1"/>
+          </a:fillRef>
+          <a:effectRef idx="0">
+            <a:schemeClr val="accent1"/>
+          </a:effectRef>
+          <a:fontRef idx="minor">
+            <a:schemeClr val="tx1"/>
+          </a:fontRef>
+        </p:style>
+      </p:cxnSp>
+      <p:cxnSp>
+        <p:nvCxnSpPr>
+          <p:cNvPr id="17" name="Straight Connector 16"/>
+          <p:cNvCxnSpPr/>
+          <p:nvPr/>
+        </p:nvCxnSpPr>
+        <p:spPr>
+          <a:xfrm>
+            <a:off x="4310977" y="3793827"/>
+            <a:ext cx="560509" cy="560509"/>
+          </a:xfrm>
+          <a:prstGeom prst="line">
+            <a:avLst/>
+          </a:prstGeom>
+          <a:ln w="50800">
+            <a:solidFill>
+              <a:schemeClr val="tx1"/>
+            </a:solidFill>
+          </a:ln>
+        </p:spPr>
+        <p:style>
+          <a:lnRef idx="1">
+            <a:schemeClr val="accent1"/>
+          </a:lnRef>
+          <a:fillRef idx="0">
+            <a:schemeClr val="accent1"/>
+          </a:fillRef>
+          <a:effectRef idx="0">
+            <a:schemeClr val="accent1"/>
+          </a:effectRef>
+          <a:fontRef idx="minor">
+            <a:schemeClr val="tx1"/>
+          </a:fontRef>
+        </p:style>
+      </p:cxnSp>
+      <p:cxnSp>
+        <p:nvCxnSpPr>
+          <p:cNvPr id="19" name="Straight Connector 18"/>
+          <p:cNvCxnSpPr/>
+          <p:nvPr/>
+        </p:nvCxnSpPr>
+        <p:spPr>
+          <a:xfrm>
+            <a:off x="7859392" y="4008721"/>
+            <a:ext cx="345615" cy="345615"/>
+          </a:xfrm>
+          <a:prstGeom prst="line">
+            <a:avLst/>
+          </a:prstGeom>
+          <a:ln w="50800">
+            <a:solidFill>
+              <a:schemeClr val="tx1"/>
+            </a:solidFill>
+          </a:ln>
+        </p:spPr>
+        <p:style>
+          <a:lnRef idx="1">
+            <a:schemeClr val="accent1"/>
+          </a:lnRef>
+          <a:fillRef idx="0">
+            <a:schemeClr val="accent1"/>
+          </a:fillRef>
+          <a:effectRef idx="0">
+            <a:schemeClr val="accent1"/>
+          </a:effectRef>
+          <a:fontRef idx="minor">
+            <a:schemeClr val="tx1"/>
+          </a:fontRef>
+        </p:style>
+      </p:cxnSp>
+      <p:cxnSp>
+        <p:nvCxnSpPr>
+          <p:cNvPr id="27" name="Straight Connector 26"/>
+          <p:cNvCxnSpPr/>
+          <p:nvPr/>
+        </p:nvCxnSpPr>
+        <p:spPr>
+          <a:xfrm>
+            <a:off x="6520350" y="3578913"/>
+            <a:ext cx="777954" cy="777954"/>
+          </a:xfrm>
+          <a:prstGeom prst="line">
+            <a:avLst/>
+          </a:prstGeom>
+          <a:ln w="50800">
+            <a:solidFill>
+              <a:schemeClr val="tx1"/>
+            </a:solidFill>
+          </a:ln>
+        </p:spPr>
+        <p:style>
+          <a:lnRef idx="1">
+            <a:schemeClr val="accent1"/>
+          </a:lnRef>
+          <a:fillRef idx="0">
+            <a:schemeClr val="accent1"/>
+          </a:fillRef>
+          <a:effectRef idx="0">
+            <a:schemeClr val="accent1"/>
+          </a:effectRef>
+          <a:fontRef idx="minor">
+            <a:schemeClr val="tx1"/>
+          </a:fontRef>
+        </p:style>
+      </p:cxnSp>
+    </p:spTree>
+    <p:extLst>
+      <p:ext uri="{BB962C8B-B14F-4D97-AF65-F5344CB8AC3E}">
+        <p14:creationId xmlns:p14="http://schemas.microsoft.com/office/powerpoint/2010/main" val="779719330"/>
       </p:ext>
     </p:extLst>
   </p:cSld>

</xml_diff>

<commit_message>
Added figures for ranking vs. ordering
</commit_message>
<xml_diff>
--- a/figures/FOR_PAPER/model_figures.pptx
+++ b/figures/FOR_PAPER/model_figures.pptx
@@ -9,6 +9,10 @@
     <p:sldId id="257" r:id="rId3"/>
     <p:sldId id="258" r:id="rId4"/>
     <p:sldId id="259" r:id="rId5"/>
+    <p:sldId id="260" r:id="rId6"/>
+    <p:sldId id="261" r:id="rId7"/>
+    <p:sldId id="262" r:id="rId8"/>
+    <p:sldId id="263" r:id="rId9"/>
   </p:sldIdLst>
   <p:sldSz cx="12192000" cy="6858000"/>
   <p:notesSz cx="6858000" cy="9144000"/>
@@ -120,6 +124,14 @@
             <p14:sldId id="257"/>
             <p14:sldId id="258"/>
             <p14:sldId id="259"/>
+          </p14:sldIdLst>
+        </p14:section>
+        <p14:section name="(c) (Un)Ranked and (Un)Ordered Trees" id="{09A54724-97C0-8B44-BFD4-AADFC12D8C9E}">
+          <p14:sldIdLst>
+            <p14:sldId id="260"/>
+            <p14:sldId id="261"/>
+            <p14:sldId id="262"/>
+            <p14:sldId id="263"/>
           </p14:sldIdLst>
         </p14:section>
       </p14:sectionLst>
@@ -3705,7 +3717,7 @@
         <p:spPr>
           <a:xfrm>
             <a:off x="5805680" y="1434665"/>
-            <a:ext cx="223284" cy="369332"/>
+            <a:ext cx="223284" cy="400110"/>
           </a:xfrm>
           <a:prstGeom prst="rect">
             <a:avLst/>
@@ -3720,10 +3732,10 @@
           <a:p>
             <a:pPr algn="ctr"/>
             <a:r>
-              <a:rPr lang="en-US" smtClean="0"/>
+              <a:rPr lang="en-US" sz="2000" dirty="0" smtClean="0"/>
               <a:t>0</a:t>
             </a:r>
-            <a:endParaRPr lang="en-US"/>
+            <a:endParaRPr lang="en-US" sz="2000" dirty="0"/>
           </a:p>
         </p:txBody>
       </p:sp>
@@ -3736,7 +3748,7 @@
         <p:spPr>
           <a:xfrm>
             <a:off x="6446690" y="2040168"/>
-            <a:ext cx="223284" cy="369332"/>
+            <a:ext cx="223284" cy="400110"/>
           </a:xfrm>
           <a:prstGeom prst="rect">
             <a:avLst/>
@@ -3751,10 +3763,10 @@
           <a:p>
             <a:pPr algn="ctr"/>
             <a:r>
-              <a:rPr lang="en-US" smtClean="0"/>
+              <a:rPr lang="en-US" sz="2000" dirty="0" smtClean="0"/>
               <a:t>1</a:t>
             </a:r>
-            <a:endParaRPr lang="en-US"/>
+            <a:endParaRPr lang="en-US" sz="2000" dirty="0"/>
           </a:p>
         </p:txBody>
       </p:sp>
@@ -3767,7 +3779,7 @@
         <p:spPr>
           <a:xfrm>
             <a:off x="7072638" y="2689915"/>
-            <a:ext cx="223284" cy="369332"/>
+            <a:ext cx="223284" cy="400110"/>
           </a:xfrm>
           <a:prstGeom prst="rect">
             <a:avLst/>
@@ -3782,10 +3794,10 @@
           <a:p>
             <a:pPr algn="ctr"/>
             <a:r>
-              <a:rPr lang="en-US" smtClean="0"/>
+              <a:rPr lang="en-US" sz="2000" dirty="0" smtClean="0"/>
               <a:t>2</a:t>
             </a:r>
-            <a:endParaRPr lang="en-US"/>
+            <a:endParaRPr lang="en-US" sz="2000" dirty="0"/>
           </a:p>
         </p:txBody>
       </p:sp>
@@ -3798,7 +3810,7 @@
         <p:spPr>
           <a:xfrm>
             <a:off x="6295696" y="3431632"/>
-            <a:ext cx="223284" cy="369332"/>
+            <a:ext cx="223284" cy="400110"/>
           </a:xfrm>
           <a:prstGeom prst="rect">
             <a:avLst/>
@@ -3813,10 +3825,10 @@
           <a:p>
             <a:pPr algn="ctr"/>
             <a:r>
-              <a:rPr lang="en-US" smtClean="0"/>
+              <a:rPr lang="en-US" sz="2000" dirty="0" smtClean="0"/>
               <a:t>3</a:t>
             </a:r>
-            <a:endParaRPr lang="en-US"/>
+            <a:endParaRPr lang="en-US" sz="2000" dirty="0"/>
           </a:p>
         </p:txBody>
       </p:sp>
@@ -5657,6 +5669,3957 @@
     <p:extLst>
       <p:ext uri="{BB962C8B-B14F-4D97-AF65-F5344CB8AC3E}">
         <p14:creationId xmlns:p14="http://schemas.microsoft.com/office/powerpoint/2010/main" val="779719330"/>
+      </p:ext>
+    </p:extLst>
+  </p:cSld>
+  <p:clrMapOvr>
+    <a:masterClrMapping/>
+  </p:clrMapOvr>
+</p:sld>
+</file>
+
+<file path=ppt/slides/slide5.xml><?xml version="1.0" encoding="utf-8"?>
+<p:sld xmlns:a="http://schemas.openxmlformats.org/drawingml/2006/main" xmlns:r="http://schemas.openxmlformats.org/officeDocument/2006/relationships" xmlns:p="http://schemas.openxmlformats.org/presentationml/2006/main">
+  <p:cSld>
+    <p:spTree>
+      <p:nvGrpSpPr>
+        <p:cNvPr id="1" name=""/>
+        <p:cNvGrpSpPr/>
+        <p:nvPr/>
+      </p:nvGrpSpPr>
+      <p:grpSpPr>
+        <a:xfrm>
+          <a:off x="0" y="0"/>
+          <a:ext cx="0" cy="0"/>
+          <a:chOff x="0" y="0"/>
+          <a:chExt cx="0" cy="0"/>
+        </a:xfrm>
+      </p:grpSpPr>
+      <p:cxnSp>
+        <p:nvCxnSpPr>
+          <p:cNvPr id="7" name="Straight Connector 6"/>
+          <p:cNvCxnSpPr/>
+          <p:nvPr/>
+        </p:nvCxnSpPr>
+        <p:spPr>
+          <a:xfrm flipV="1">
+            <a:off x="477481" y="2119588"/>
+            <a:ext cx="1609128" cy="1609127"/>
+          </a:xfrm>
+          <a:prstGeom prst="line">
+            <a:avLst/>
+          </a:prstGeom>
+          <a:ln w="50800">
+            <a:solidFill>
+              <a:schemeClr val="tx1"/>
+            </a:solidFill>
+          </a:ln>
+        </p:spPr>
+        <p:style>
+          <a:lnRef idx="1">
+            <a:schemeClr val="accent1"/>
+          </a:lnRef>
+          <a:fillRef idx="0">
+            <a:schemeClr val="accent1"/>
+          </a:fillRef>
+          <a:effectRef idx="0">
+            <a:schemeClr val="accent1"/>
+          </a:effectRef>
+          <a:fontRef idx="minor">
+            <a:schemeClr val="tx1"/>
+          </a:fontRef>
+        </p:style>
+      </p:cxnSp>
+      <p:cxnSp>
+        <p:nvCxnSpPr>
+          <p:cNvPr id="8" name="Straight Connector 7"/>
+          <p:cNvCxnSpPr/>
+          <p:nvPr/>
+        </p:nvCxnSpPr>
+        <p:spPr>
+          <a:xfrm>
+            <a:off x="2086609" y="2119587"/>
+            <a:ext cx="1610526" cy="1610526"/>
+          </a:xfrm>
+          <a:prstGeom prst="line">
+            <a:avLst/>
+          </a:prstGeom>
+          <a:ln w="50800">
+            <a:solidFill>
+              <a:schemeClr val="tx1"/>
+            </a:solidFill>
+          </a:ln>
+        </p:spPr>
+        <p:style>
+          <a:lnRef idx="1">
+            <a:schemeClr val="accent1"/>
+          </a:lnRef>
+          <a:fillRef idx="0">
+            <a:schemeClr val="accent1"/>
+          </a:fillRef>
+          <a:effectRef idx="0">
+            <a:schemeClr val="accent1"/>
+          </a:effectRef>
+          <a:fontRef idx="minor">
+            <a:schemeClr val="tx1"/>
+          </a:fontRef>
+        </p:style>
+      </p:cxnSp>
+      <p:cxnSp>
+        <p:nvCxnSpPr>
+          <p:cNvPr id="26" name="Straight Connector 25"/>
+          <p:cNvCxnSpPr/>
+          <p:nvPr/>
+        </p:nvCxnSpPr>
+        <p:spPr>
+          <a:xfrm flipV="1">
+            <a:off x="1847382" y="2787147"/>
+            <a:ext cx="941569" cy="941568"/>
+          </a:xfrm>
+          <a:prstGeom prst="line">
+            <a:avLst/>
+          </a:prstGeom>
+          <a:ln w="50800">
+            <a:solidFill>
+              <a:schemeClr val="tx1"/>
+            </a:solidFill>
+          </a:ln>
+        </p:spPr>
+        <p:style>
+          <a:lnRef idx="1">
+            <a:schemeClr val="accent1"/>
+          </a:lnRef>
+          <a:fillRef idx="0">
+            <a:schemeClr val="accent1"/>
+          </a:fillRef>
+          <a:effectRef idx="0">
+            <a:schemeClr val="accent1"/>
+          </a:effectRef>
+          <a:fontRef idx="minor">
+            <a:schemeClr val="tx1"/>
+          </a:fontRef>
+        </p:style>
+      </p:cxnSp>
+      <p:cxnSp>
+        <p:nvCxnSpPr>
+          <p:cNvPr id="30" name="Straight Connector 29"/>
+          <p:cNvCxnSpPr/>
+          <p:nvPr/>
+        </p:nvCxnSpPr>
+        <p:spPr>
+          <a:xfrm flipV="1">
+            <a:off x="2617931" y="3185610"/>
+            <a:ext cx="547268" cy="547268"/>
+          </a:xfrm>
+          <a:prstGeom prst="line">
+            <a:avLst/>
+          </a:prstGeom>
+          <a:ln w="50800">
+            <a:solidFill>
+              <a:schemeClr val="tx1"/>
+            </a:solidFill>
+          </a:ln>
+        </p:spPr>
+        <p:style>
+          <a:lnRef idx="1">
+            <a:schemeClr val="accent1"/>
+          </a:lnRef>
+          <a:fillRef idx="0">
+            <a:schemeClr val="accent1"/>
+          </a:fillRef>
+          <a:effectRef idx="0">
+            <a:schemeClr val="accent1"/>
+          </a:effectRef>
+          <a:fontRef idx="minor">
+            <a:schemeClr val="tx1"/>
+          </a:fontRef>
+        </p:style>
+      </p:cxnSp>
+      <p:cxnSp>
+        <p:nvCxnSpPr>
+          <p:cNvPr id="33" name="Straight Connector 32"/>
+          <p:cNvCxnSpPr/>
+          <p:nvPr/>
+        </p:nvCxnSpPr>
+        <p:spPr>
+          <a:xfrm flipV="1">
+            <a:off x="1162133" y="2450306"/>
+            <a:ext cx="1275647" cy="1275644"/>
+          </a:xfrm>
+          <a:prstGeom prst="line">
+            <a:avLst/>
+          </a:prstGeom>
+          <a:ln w="50800">
+            <a:solidFill>
+              <a:schemeClr val="tx1"/>
+            </a:solidFill>
+          </a:ln>
+        </p:spPr>
+        <p:style>
+          <a:lnRef idx="1">
+            <a:schemeClr val="accent1"/>
+          </a:lnRef>
+          <a:fillRef idx="0">
+            <a:schemeClr val="accent1"/>
+          </a:fillRef>
+          <a:effectRef idx="0">
+            <a:schemeClr val="accent1"/>
+          </a:effectRef>
+          <a:fontRef idx="minor">
+            <a:schemeClr val="tx1"/>
+          </a:fontRef>
+        </p:style>
+      </p:cxnSp>
+      <p:cxnSp>
+        <p:nvCxnSpPr>
+          <p:cNvPr id="39" name="Straight Connector 38"/>
+          <p:cNvCxnSpPr/>
+          <p:nvPr/>
+        </p:nvCxnSpPr>
+        <p:spPr>
+          <a:xfrm flipV="1">
+            <a:off x="4470664" y="2119588"/>
+            <a:ext cx="1609128" cy="1609127"/>
+          </a:xfrm>
+          <a:prstGeom prst="line">
+            <a:avLst/>
+          </a:prstGeom>
+          <a:ln w="50800">
+            <a:solidFill>
+              <a:schemeClr val="tx1"/>
+            </a:solidFill>
+          </a:ln>
+        </p:spPr>
+        <p:style>
+          <a:lnRef idx="1">
+            <a:schemeClr val="accent1"/>
+          </a:lnRef>
+          <a:fillRef idx="0">
+            <a:schemeClr val="accent1"/>
+          </a:fillRef>
+          <a:effectRef idx="0">
+            <a:schemeClr val="accent1"/>
+          </a:effectRef>
+          <a:fontRef idx="minor">
+            <a:schemeClr val="tx1"/>
+          </a:fontRef>
+        </p:style>
+      </p:cxnSp>
+      <p:cxnSp>
+        <p:nvCxnSpPr>
+          <p:cNvPr id="40" name="Straight Connector 39"/>
+          <p:cNvCxnSpPr/>
+          <p:nvPr/>
+        </p:nvCxnSpPr>
+        <p:spPr>
+          <a:xfrm>
+            <a:off x="6079792" y="2119587"/>
+            <a:ext cx="1610526" cy="1610526"/>
+          </a:xfrm>
+          <a:prstGeom prst="line">
+            <a:avLst/>
+          </a:prstGeom>
+          <a:ln w="50800">
+            <a:solidFill>
+              <a:schemeClr val="tx1"/>
+            </a:solidFill>
+          </a:ln>
+        </p:spPr>
+        <p:style>
+          <a:lnRef idx="1">
+            <a:schemeClr val="accent1"/>
+          </a:lnRef>
+          <a:fillRef idx="0">
+            <a:schemeClr val="accent1"/>
+          </a:fillRef>
+          <a:effectRef idx="0">
+            <a:schemeClr val="accent1"/>
+          </a:effectRef>
+          <a:fontRef idx="minor">
+            <a:schemeClr val="tx1"/>
+          </a:fontRef>
+        </p:style>
+      </p:cxnSp>
+      <p:cxnSp>
+        <p:nvCxnSpPr>
+          <p:cNvPr id="41" name="Straight Connector 40"/>
+          <p:cNvCxnSpPr/>
+          <p:nvPr/>
+        </p:nvCxnSpPr>
+        <p:spPr>
+          <a:xfrm flipV="1">
+            <a:off x="5840565" y="2787147"/>
+            <a:ext cx="941569" cy="941568"/>
+          </a:xfrm>
+          <a:prstGeom prst="line">
+            <a:avLst/>
+          </a:prstGeom>
+          <a:ln w="50800">
+            <a:solidFill>
+              <a:schemeClr val="tx1"/>
+            </a:solidFill>
+          </a:ln>
+        </p:spPr>
+        <p:style>
+          <a:lnRef idx="1">
+            <a:schemeClr val="accent1"/>
+          </a:lnRef>
+          <a:fillRef idx="0">
+            <a:schemeClr val="accent1"/>
+          </a:fillRef>
+          <a:effectRef idx="0">
+            <a:schemeClr val="accent1"/>
+          </a:effectRef>
+          <a:fontRef idx="minor">
+            <a:schemeClr val="tx1"/>
+          </a:fontRef>
+        </p:style>
+      </p:cxnSp>
+      <p:cxnSp>
+        <p:nvCxnSpPr>
+          <p:cNvPr id="42" name="Straight Connector 41"/>
+          <p:cNvCxnSpPr/>
+          <p:nvPr/>
+        </p:nvCxnSpPr>
+        <p:spPr>
+          <a:xfrm flipV="1">
+            <a:off x="6611114" y="3185610"/>
+            <a:ext cx="547268" cy="547268"/>
+          </a:xfrm>
+          <a:prstGeom prst="line">
+            <a:avLst/>
+          </a:prstGeom>
+          <a:ln w="50800">
+            <a:solidFill>
+              <a:schemeClr val="tx1"/>
+            </a:solidFill>
+          </a:ln>
+        </p:spPr>
+        <p:style>
+          <a:lnRef idx="1">
+            <a:schemeClr val="accent1"/>
+          </a:lnRef>
+          <a:fillRef idx="0">
+            <a:schemeClr val="accent1"/>
+          </a:fillRef>
+          <a:effectRef idx="0">
+            <a:schemeClr val="accent1"/>
+          </a:effectRef>
+          <a:fontRef idx="minor">
+            <a:schemeClr val="tx1"/>
+          </a:fontRef>
+        </p:style>
+      </p:cxnSp>
+      <p:cxnSp>
+        <p:nvCxnSpPr>
+          <p:cNvPr id="44" name="Straight Connector 43"/>
+          <p:cNvCxnSpPr/>
+          <p:nvPr/>
+        </p:nvCxnSpPr>
+        <p:spPr>
+          <a:xfrm flipV="1">
+            <a:off x="8433482" y="2123751"/>
+            <a:ext cx="1609128" cy="1609127"/>
+          </a:xfrm>
+          <a:prstGeom prst="line">
+            <a:avLst/>
+          </a:prstGeom>
+          <a:ln w="50800">
+            <a:solidFill>
+              <a:schemeClr val="tx1"/>
+            </a:solidFill>
+          </a:ln>
+        </p:spPr>
+        <p:style>
+          <a:lnRef idx="1">
+            <a:schemeClr val="accent1"/>
+          </a:lnRef>
+          <a:fillRef idx="0">
+            <a:schemeClr val="accent1"/>
+          </a:fillRef>
+          <a:effectRef idx="0">
+            <a:schemeClr val="accent1"/>
+          </a:effectRef>
+          <a:fontRef idx="minor">
+            <a:schemeClr val="tx1"/>
+          </a:fontRef>
+        </p:style>
+      </p:cxnSp>
+      <p:cxnSp>
+        <p:nvCxnSpPr>
+          <p:cNvPr id="45" name="Straight Connector 44"/>
+          <p:cNvCxnSpPr/>
+          <p:nvPr/>
+        </p:nvCxnSpPr>
+        <p:spPr>
+          <a:xfrm>
+            <a:off x="10042610" y="2123750"/>
+            <a:ext cx="1610526" cy="1610526"/>
+          </a:xfrm>
+          <a:prstGeom prst="line">
+            <a:avLst/>
+          </a:prstGeom>
+          <a:ln w="50800">
+            <a:solidFill>
+              <a:schemeClr val="tx1"/>
+            </a:solidFill>
+          </a:ln>
+        </p:spPr>
+        <p:style>
+          <a:lnRef idx="1">
+            <a:schemeClr val="accent1"/>
+          </a:lnRef>
+          <a:fillRef idx="0">
+            <a:schemeClr val="accent1"/>
+          </a:fillRef>
+          <a:effectRef idx="0">
+            <a:schemeClr val="accent1"/>
+          </a:effectRef>
+          <a:fontRef idx="minor">
+            <a:schemeClr val="tx1"/>
+          </a:fontRef>
+        </p:style>
+      </p:cxnSp>
+      <p:cxnSp>
+        <p:nvCxnSpPr>
+          <p:cNvPr id="47" name="Straight Connector 46"/>
+          <p:cNvCxnSpPr/>
+          <p:nvPr/>
+        </p:nvCxnSpPr>
+        <p:spPr>
+          <a:xfrm flipV="1">
+            <a:off x="10573932" y="3189773"/>
+            <a:ext cx="547268" cy="547268"/>
+          </a:xfrm>
+          <a:prstGeom prst="line">
+            <a:avLst/>
+          </a:prstGeom>
+          <a:ln w="50800">
+            <a:solidFill>
+              <a:schemeClr val="tx1"/>
+            </a:solidFill>
+          </a:ln>
+        </p:spPr>
+        <p:style>
+          <a:lnRef idx="1">
+            <a:schemeClr val="accent1"/>
+          </a:lnRef>
+          <a:fillRef idx="0">
+            <a:schemeClr val="accent1"/>
+          </a:fillRef>
+          <a:effectRef idx="0">
+            <a:schemeClr val="accent1"/>
+          </a:effectRef>
+          <a:fontRef idx="minor">
+            <a:schemeClr val="tx1"/>
+          </a:fontRef>
+        </p:style>
+      </p:cxnSp>
+      <p:cxnSp>
+        <p:nvCxnSpPr>
+          <p:cNvPr id="48" name="Straight Connector 47"/>
+          <p:cNvCxnSpPr/>
+          <p:nvPr/>
+        </p:nvCxnSpPr>
+        <p:spPr>
+          <a:xfrm flipV="1">
+            <a:off x="9118134" y="2454469"/>
+            <a:ext cx="1275647" cy="1275644"/>
+          </a:xfrm>
+          <a:prstGeom prst="line">
+            <a:avLst/>
+          </a:prstGeom>
+          <a:ln w="50800">
+            <a:solidFill>
+              <a:schemeClr val="tx1"/>
+            </a:solidFill>
+          </a:ln>
+        </p:spPr>
+        <p:style>
+          <a:lnRef idx="1">
+            <a:schemeClr val="accent1"/>
+          </a:lnRef>
+          <a:fillRef idx="0">
+            <a:schemeClr val="accent1"/>
+          </a:fillRef>
+          <a:effectRef idx="0">
+            <a:schemeClr val="accent1"/>
+          </a:effectRef>
+          <a:fontRef idx="minor">
+            <a:schemeClr val="tx1"/>
+          </a:fontRef>
+        </p:style>
+      </p:cxnSp>
+      <p:cxnSp>
+        <p:nvCxnSpPr>
+          <p:cNvPr id="49" name="Straight Connector 48"/>
+          <p:cNvCxnSpPr/>
+          <p:nvPr/>
+        </p:nvCxnSpPr>
+        <p:spPr>
+          <a:xfrm>
+            <a:off x="5019890" y="3185610"/>
+            <a:ext cx="547268" cy="547268"/>
+          </a:xfrm>
+          <a:prstGeom prst="line">
+            <a:avLst/>
+          </a:prstGeom>
+          <a:ln w="50800">
+            <a:solidFill>
+              <a:schemeClr val="tx1"/>
+            </a:solidFill>
+          </a:ln>
+        </p:spPr>
+        <p:style>
+          <a:lnRef idx="1">
+            <a:schemeClr val="accent1"/>
+          </a:lnRef>
+          <a:fillRef idx="0">
+            <a:schemeClr val="accent1"/>
+          </a:fillRef>
+          <a:effectRef idx="0">
+            <a:schemeClr val="accent1"/>
+          </a:effectRef>
+          <a:fontRef idx="minor">
+            <a:schemeClr val="tx1"/>
+          </a:fontRef>
+        </p:style>
+      </p:cxnSp>
+      <p:cxnSp>
+        <p:nvCxnSpPr>
+          <p:cNvPr id="52" name="Straight Connector 51"/>
+          <p:cNvCxnSpPr/>
+          <p:nvPr/>
+        </p:nvCxnSpPr>
+        <p:spPr>
+          <a:xfrm>
+            <a:off x="9778528" y="3088128"/>
+            <a:ext cx="640330" cy="640330"/>
+          </a:xfrm>
+          <a:prstGeom prst="line">
+            <a:avLst/>
+          </a:prstGeom>
+          <a:ln w="50800">
+            <a:solidFill>
+              <a:schemeClr val="tx1"/>
+            </a:solidFill>
+          </a:ln>
+        </p:spPr>
+        <p:style>
+          <a:lnRef idx="1">
+            <a:schemeClr val="accent1"/>
+          </a:lnRef>
+          <a:fillRef idx="0">
+            <a:schemeClr val="accent1"/>
+          </a:fillRef>
+          <a:effectRef idx="0">
+            <a:schemeClr val="accent1"/>
+          </a:effectRef>
+          <a:fontRef idx="minor">
+            <a:schemeClr val="tx1"/>
+          </a:fontRef>
+        </p:style>
+      </p:cxnSp>
+      <p:sp>
+        <p:nvSpPr>
+          <p:cNvPr id="54" name="TextBox 53"/>
+          <p:cNvSpPr txBox="1"/>
+          <p:nvPr/>
+        </p:nvSpPr>
+        <p:spPr>
+          <a:xfrm>
+            <a:off x="476083" y="3762009"/>
+            <a:ext cx="3221051" cy="400110"/>
+          </a:xfrm>
+          <a:prstGeom prst="rect">
+            <a:avLst/>
+          </a:prstGeom>
+          <a:noFill/>
+        </p:spPr>
+        <p:txBody>
+          <a:bodyPr wrap="square" rtlCol="0">
+            <a:spAutoFit/>
+          </a:bodyPr>
+          <a:lstStyle/>
+          <a:p>
+            <a:pPr algn="ctr"/>
+            <a:r>
+              <a:rPr lang="en-US" sz="2000" dirty="0" smtClean="0"/>
+              <a:t>Topology 1</a:t>
+            </a:r>
+            <a:endParaRPr lang="en-US" sz="2000" dirty="0"/>
+          </a:p>
+        </p:txBody>
+      </p:sp>
+      <p:sp>
+        <p:nvSpPr>
+          <p:cNvPr id="55" name="TextBox 54"/>
+          <p:cNvSpPr txBox="1"/>
+          <p:nvPr/>
+        </p:nvSpPr>
+        <p:spPr>
+          <a:xfrm>
+            <a:off x="4470664" y="3762009"/>
+            <a:ext cx="3219654" cy="400110"/>
+          </a:xfrm>
+          <a:prstGeom prst="rect">
+            <a:avLst/>
+          </a:prstGeom>
+          <a:noFill/>
+        </p:spPr>
+        <p:txBody>
+          <a:bodyPr wrap="square" rtlCol="0">
+            <a:spAutoFit/>
+          </a:bodyPr>
+          <a:lstStyle/>
+          <a:p>
+            <a:pPr algn="ctr"/>
+            <a:r>
+              <a:rPr lang="en-US" sz="2000" dirty="0" smtClean="0"/>
+              <a:t>Topology 2</a:t>
+            </a:r>
+            <a:endParaRPr lang="en-US" sz="2000" dirty="0"/>
+          </a:p>
+        </p:txBody>
+      </p:sp>
+      <p:sp>
+        <p:nvSpPr>
+          <p:cNvPr id="56" name="TextBox 55"/>
+          <p:cNvSpPr txBox="1"/>
+          <p:nvPr/>
+        </p:nvSpPr>
+        <p:spPr>
+          <a:xfrm>
+            <a:off x="8433482" y="3762009"/>
+            <a:ext cx="3219654" cy="400110"/>
+          </a:xfrm>
+          <a:prstGeom prst="rect">
+            <a:avLst/>
+          </a:prstGeom>
+          <a:noFill/>
+        </p:spPr>
+        <p:txBody>
+          <a:bodyPr wrap="square" rtlCol="0">
+            <a:spAutoFit/>
+          </a:bodyPr>
+          <a:lstStyle/>
+          <a:p>
+            <a:pPr algn="ctr"/>
+            <a:r>
+              <a:rPr lang="en-US" sz="2000" dirty="0" smtClean="0"/>
+              <a:t>Topology 3</a:t>
+            </a:r>
+            <a:endParaRPr lang="en-US" sz="2000" dirty="0"/>
+          </a:p>
+        </p:txBody>
+      </p:sp>
+      <p:sp>
+        <p:nvSpPr>
+          <p:cNvPr id="57" name="Rectangle 56"/>
+          <p:cNvSpPr/>
+          <p:nvPr/>
+        </p:nvSpPr>
+        <p:spPr>
+          <a:xfrm>
+            <a:off x="4158852" y="1955800"/>
+            <a:ext cx="3816748" cy="2206319"/>
+          </a:xfrm>
+          <a:prstGeom prst="rect">
+            <a:avLst/>
+          </a:prstGeom>
+          <a:noFill/>
+          <a:ln w="50800">
+            <a:solidFill>
+              <a:srgbClr val="00B0F0"/>
+            </a:solidFill>
+          </a:ln>
+        </p:spPr>
+        <p:style>
+          <a:lnRef idx="2">
+            <a:schemeClr val="accent1">
+              <a:shade val="50000"/>
+            </a:schemeClr>
+          </a:lnRef>
+          <a:fillRef idx="1">
+            <a:schemeClr val="accent1"/>
+          </a:fillRef>
+          <a:effectRef idx="0">
+            <a:schemeClr val="accent1"/>
+          </a:effectRef>
+          <a:fontRef idx="minor">
+            <a:schemeClr val="lt1"/>
+          </a:fontRef>
+        </p:style>
+        <p:txBody>
+          <a:bodyPr rtlCol="0" anchor="ctr"/>
+          <a:lstStyle/>
+          <a:p>
+            <a:pPr algn="ctr"/>
+            <a:endParaRPr lang="en-US"/>
+          </a:p>
+        </p:txBody>
+      </p:sp>
+    </p:spTree>
+    <p:extLst>
+      <p:ext uri="{BB962C8B-B14F-4D97-AF65-F5344CB8AC3E}">
+        <p14:creationId xmlns:p14="http://schemas.microsoft.com/office/powerpoint/2010/main" val="1521115219"/>
+      </p:ext>
+    </p:extLst>
+  </p:cSld>
+  <p:clrMapOvr>
+    <a:masterClrMapping/>
+  </p:clrMapOvr>
+</p:sld>
+</file>
+
+<file path=ppt/slides/slide6.xml><?xml version="1.0" encoding="utf-8"?>
+<p:sld xmlns:a="http://schemas.openxmlformats.org/drawingml/2006/main" xmlns:r="http://schemas.openxmlformats.org/officeDocument/2006/relationships" xmlns:p="http://schemas.openxmlformats.org/presentationml/2006/main">
+  <p:cSld>
+    <p:spTree>
+      <p:nvGrpSpPr>
+        <p:cNvPr id="1" name=""/>
+        <p:cNvGrpSpPr/>
+        <p:nvPr/>
+      </p:nvGrpSpPr>
+      <p:grpSpPr>
+        <a:xfrm>
+          <a:off x="0" y="0"/>
+          <a:ext cx="0" cy="0"/>
+          <a:chOff x="0" y="0"/>
+          <a:chExt cx="0" cy="0"/>
+        </a:xfrm>
+      </p:grpSpPr>
+      <p:cxnSp>
+        <p:nvCxnSpPr>
+          <p:cNvPr id="39" name="Straight Connector 38"/>
+          <p:cNvCxnSpPr/>
+          <p:nvPr/>
+        </p:nvCxnSpPr>
+        <p:spPr>
+          <a:xfrm flipV="1">
+            <a:off x="4470664" y="2119588"/>
+            <a:ext cx="1609128" cy="1609127"/>
+          </a:xfrm>
+          <a:prstGeom prst="line">
+            <a:avLst/>
+          </a:prstGeom>
+          <a:ln w="50800">
+            <a:solidFill>
+              <a:schemeClr val="tx1"/>
+            </a:solidFill>
+          </a:ln>
+        </p:spPr>
+        <p:style>
+          <a:lnRef idx="1">
+            <a:schemeClr val="accent1"/>
+          </a:lnRef>
+          <a:fillRef idx="0">
+            <a:schemeClr val="accent1"/>
+          </a:fillRef>
+          <a:effectRef idx="0">
+            <a:schemeClr val="accent1"/>
+          </a:effectRef>
+          <a:fontRef idx="minor">
+            <a:schemeClr val="tx1"/>
+          </a:fontRef>
+        </p:style>
+      </p:cxnSp>
+      <p:cxnSp>
+        <p:nvCxnSpPr>
+          <p:cNvPr id="40" name="Straight Connector 39"/>
+          <p:cNvCxnSpPr/>
+          <p:nvPr/>
+        </p:nvCxnSpPr>
+        <p:spPr>
+          <a:xfrm>
+            <a:off x="6079792" y="2119587"/>
+            <a:ext cx="1610526" cy="1610526"/>
+          </a:xfrm>
+          <a:prstGeom prst="line">
+            <a:avLst/>
+          </a:prstGeom>
+          <a:ln w="50800">
+            <a:solidFill>
+              <a:schemeClr val="tx1"/>
+            </a:solidFill>
+          </a:ln>
+        </p:spPr>
+        <p:style>
+          <a:lnRef idx="1">
+            <a:schemeClr val="accent1"/>
+          </a:lnRef>
+          <a:fillRef idx="0">
+            <a:schemeClr val="accent1"/>
+          </a:fillRef>
+          <a:effectRef idx="0">
+            <a:schemeClr val="accent1"/>
+          </a:effectRef>
+          <a:fontRef idx="minor">
+            <a:schemeClr val="tx1"/>
+          </a:fontRef>
+        </p:style>
+      </p:cxnSp>
+      <p:cxnSp>
+        <p:nvCxnSpPr>
+          <p:cNvPr id="41" name="Straight Connector 40"/>
+          <p:cNvCxnSpPr/>
+          <p:nvPr/>
+        </p:nvCxnSpPr>
+        <p:spPr>
+          <a:xfrm flipV="1">
+            <a:off x="5840565" y="2787147"/>
+            <a:ext cx="941569" cy="941568"/>
+          </a:xfrm>
+          <a:prstGeom prst="line">
+            <a:avLst/>
+          </a:prstGeom>
+          <a:ln w="50800">
+            <a:solidFill>
+              <a:schemeClr val="tx1"/>
+            </a:solidFill>
+          </a:ln>
+        </p:spPr>
+        <p:style>
+          <a:lnRef idx="1">
+            <a:schemeClr val="accent1"/>
+          </a:lnRef>
+          <a:fillRef idx="0">
+            <a:schemeClr val="accent1"/>
+          </a:fillRef>
+          <a:effectRef idx="0">
+            <a:schemeClr val="accent1"/>
+          </a:effectRef>
+          <a:fontRef idx="minor">
+            <a:schemeClr val="tx1"/>
+          </a:fontRef>
+        </p:style>
+      </p:cxnSp>
+      <p:cxnSp>
+        <p:nvCxnSpPr>
+          <p:cNvPr id="42" name="Straight Connector 41"/>
+          <p:cNvCxnSpPr/>
+          <p:nvPr/>
+        </p:nvCxnSpPr>
+        <p:spPr>
+          <a:xfrm flipV="1">
+            <a:off x="6982304" y="3380794"/>
+            <a:ext cx="349056" cy="349056"/>
+          </a:xfrm>
+          <a:prstGeom prst="line">
+            <a:avLst/>
+          </a:prstGeom>
+          <a:ln w="50800">
+            <a:solidFill>
+              <a:schemeClr val="tx1"/>
+            </a:solidFill>
+          </a:ln>
+        </p:spPr>
+        <p:style>
+          <a:lnRef idx="1">
+            <a:schemeClr val="accent1"/>
+          </a:lnRef>
+          <a:fillRef idx="0">
+            <a:schemeClr val="accent1"/>
+          </a:fillRef>
+          <a:effectRef idx="0">
+            <a:schemeClr val="accent1"/>
+          </a:effectRef>
+          <a:fontRef idx="minor">
+            <a:schemeClr val="tx1"/>
+          </a:fontRef>
+        </p:style>
+      </p:cxnSp>
+      <p:cxnSp>
+        <p:nvCxnSpPr>
+          <p:cNvPr id="49" name="Straight Connector 48"/>
+          <p:cNvCxnSpPr/>
+          <p:nvPr/>
+        </p:nvCxnSpPr>
+        <p:spPr>
+          <a:xfrm>
+            <a:off x="5101555" y="3081325"/>
+            <a:ext cx="643227" cy="643227"/>
+          </a:xfrm>
+          <a:prstGeom prst="line">
+            <a:avLst/>
+          </a:prstGeom>
+          <a:ln w="50800">
+            <a:solidFill>
+              <a:schemeClr val="tx1"/>
+            </a:solidFill>
+          </a:ln>
+        </p:spPr>
+        <p:style>
+          <a:lnRef idx="1">
+            <a:schemeClr val="accent1"/>
+          </a:lnRef>
+          <a:fillRef idx="0">
+            <a:schemeClr val="accent1"/>
+          </a:fillRef>
+          <a:effectRef idx="0">
+            <a:schemeClr val="accent1"/>
+          </a:effectRef>
+          <a:fontRef idx="minor">
+            <a:schemeClr val="tx1"/>
+          </a:fontRef>
+        </p:style>
+      </p:cxnSp>
+      <p:sp>
+        <p:nvSpPr>
+          <p:cNvPr id="54" name="TextBox 53"/>
+          <p:cNvSpPr txBox="1"/>
+          <p:nvPr/>
+        </p:nvSpPr>
+        <p:spPr>
+          <a:xfrm>
+            <a:off x="476083" y="3762009"/>
+            <a:ext cx="3221051" cy="400110"/>
+          </a:xfrm>
+          <a:prstGeom prst="rect">
+            <a:avLst/>
+          </a:prstGeom>
+          <a:noFill/>
+        </p:spPr>
+        <p:txBody>
+          <a:bodyPr wrap="square" rtlCol="0">
+            <a:spAutoFit/>
+          </a:bodyPr>
+          <a:lstStyle/>
+          <a:p>
+            <a:pPr algn="ctr"/>
+            <a:r>
+              <a:rPr lang="en-US" sz="2000" dirty="0" smtClean="0"/>
+              <a:t>Ranking 1</a:t>
+            </a:r>
+            <a:endParaRPr lang="en-US" sz="2000" dirty="0"/>
+          </a:p>
+        </p:txBody>
+      </p:sp>
+      <p:sp>
+        <p:nvSpPr>
+          <p:cNvPr id="55" name="TextBox 54"/>
+          <p:cNvSpPr txBox="1"/>
+          <p:nvPr/>
+        </p:nvSpPr>
+        <p:spPr>
+          <a:xfrm>
+            <a:off x="4470664" y="3762009"/>
+            <a:ext cx="3219654" cy="400110"/>
+          </a:xfrm>
+          <a:prstGeom prst="rect">
+            <a:avLst/>
+          </a:prstGeom>
+          <a:noFill/>
+        </p:spPr>
+        <p:txBody>
+          <a:bodyPr wrap="square" rtlCol="0">
+            <a:spAutoFit/>
+          </a:bodyPr>
+          <a:lstStyle/>
+          <a:p>
+            <a:pPr algn="ctr"/>
+            <a:r>
+              <a:rPr lang="en-US" sz="2000" dirty="0" smtClean="0"/>
+              <a:t>Ranking 2</a:t>
+            </a:r>
+            <a:endParaRPr lang="en-US" sz="2000" dirty="0"/>
+          </a:p>
+        </p:txBody>
+      </p:sp>
+      <p:sp>
+        <p:nvSpPr>
+          <p:cNvPr id="56" name="TextBox 55"/>
+          <p:cNvSpPr txBox="1"/>
+          <p:nvPr/>
+        </p:nvSpPr>
+        <p:spPr>
+          <a:xfrm>
+            <a:off x="8433482" y="3762009"/>
+            <a:ext cx="3219654" cy="400110"/>
+          </a:xfrm>
+          <a:prstGeom prst="rect">
+            <a:avLst/>
+          </a:prstGeom>
+          <a:noFill/>
+        </p:spPr>
+        <p:txBody>
+          <a:bodyPr wrap="square" rtlCol="0">
+            <a:spAutoFit/>
+          </a:bodyPr>
+          <a:lstStyle/>
+          <a:p>
+            <a:pPr algn="ctr"/>
+            <a:r>
+              <a:rPr lang="en-US" sz="2000" dirty="0" smtClean="0"/>
+              <a:t>Ranking 3</a:t>
+            </a:r>
+            <a:endParaRPr lang="en-US" sz="2000" dirty="0"/>
+          </a:p>
+        </p:txBody>
+      </p:sp>
+      <p:cxnSp>
+        <p:nvCxnSpPr>
+          <p:cNvPr id="21" name="Straight Connector 20"/>
+          <p:cNvCxnSpPr/>
+          <p:nvPr/>
+        </p:nvCxnSpPr>
+        <p:spPr>
+          <a:xfrm flipV="1">
+            <a:off x="476083" y="2123751"/>
+            <a:ext cx="1609128" cy="1609127"/>
+          </a:xfrm>
+          <a:prstGeom prst="line">
+            <a:avLst/>
+          </a:prstGeom>
+          <a:ln w="50800">
+            <a:solidFill>
+              <a:schemeClr val="tx1"/>
+            </a:solidFill>
+          </a:ln>
+        </p:spPr>
+        <p:style>
+          <a:lnRef idx="1">
+            <a:schemeClr val="accent1"/>
+          </a:lnRef>
+          <a:fillRef idx="0">
+            <a:schemeClr val="accent1"/>
+          </a:fillRef>
+          <a:effectRef idx="0">
+            <a:schemeClr val="accent1"/>
+          </a:effectRef>
+          <a:fontRef idx="minor">
+            <a:schemeClr val="tx1"/>
+          </a:fontRef>
+        </p:style>
+      </p:cxnSp>
+      <p:cxnSp>
+        <p:nvCxnSpPr>
+          <p:cNvPr id="22" name="Straight Connector 21"/>
+          <p:cNvCxnSpPr/>
+          <p:nvPr/>
+        </p:nvCxnSpPr>
+        <p:spPr>
+          <a:xfrm>
+            <a:off x="2085211" y="2123750"/>
+            <a:ext cx="1610526" cy="1610526"/>
+          </a:xfrm>
+          <a:prstGeom prst="line">
+            <a:avLst/>
+          </a:prstGeom>
+          <a:ln w="50800">
+            <a:solidFill>
+              <a:schemeClr val="tx1"/>
+            </a:solidFill>
+          </a:ln>
+        </p:spPr>
+        <p:style>
+          <a:lnRef idx="1">
+            <a:schemeClr val="accent1"/>
+          </a:lnRef>
+          <a:fillRef idx="0">
+            <a:schemeClr val="accent1"/>
+          </a:fillRef>
+          <a:effectRef idx="0">
+            <a:schemeClr val="accent1"/>
+          </a:effectRef>
+          <a:fontRef idx="minor">
+            <a:schemeClr val="tx1"/>
+          </a:fontRef>
+        </p:style>
+      </p:cxnSp>
+      <p:cxnSp>
+        <p:nvCxnSpPr>
+          <p:cNvPr id="23" name="Straight Connector 22"/>
+          <p:cNvCxnSpPr/>
+          <p:nvPr/>
+        </p:nvCxnSpPr>
+        <p:spPr>
+          <a:xfrm flipV="1">
+            <a:off x="1375827" y="2559859"/>
+            <a:ext cx="1166116" cy="1166115"/>
+          </a:xfrm>
+          <a:prstGeom prst="line">
+            <a:avLst/>
+          </a:prstGeom>
+          <a:ln w="50800">
+            <a:solidFill>
+              <a:schemeClr val="tx1"/>
+            </a:solidFill>
+          </a:ln>
+        </p:spPr>
+        <p:style>
+          <a:lnRef idx="1">
+            <a:schemeClr val="accent1"/>
+          </a:lnRef>
+          <a:fillRef idx="0">
+            <a:schemeClr val="accent1"/>
+          </a:fillRef>
+          <a:effectRef idx="0">
+            <a:schemeClr val="accent1"/>
+          </a:effectRef>
+          <a:fontRef idx="minor">
+            <a:schemeClr val="tx1"/>
+          </a:fontRef>
+        </p:style>
+      </p:cxnSp>
+      <p:cxnSp>
+        <p:nvCxnSpPr>
+          <p:cNvPr id="24" name="Straight Connector 23"/>
+          <p:cNvCxnSpPr/>
+          <p:nvPr/>
+        </p:nvCxnSpPr>
+        <p:spPr>
+          <a:xfrm flipV="1">
+            <a:off x="2076758" y="2916325"/>
+            <a:ext cx="804065" cy="804065"/>
+          </a:xfrm>
+          <a:prstGeom prst="line">
+            <a:avLst/>
+          </a:prstGeom>
+          <a:ln w="50800">
+            <a:solidFill>
+              <a:schemeClr val="tx1"/>
+            </a:solidFill>
+          </a:ln>
+        </p:spPr>
+        <p:style>
+          <a:lnRef idx="1">
+            <a:schemeClr val="accent1"/>
+          </a:lnRef>
+          <a:fillRef idx="0">
+            <a:schemeClr val="accent1"/>
+          </a:fillRef>
+          <a:effectRef idx="0">
+            <a:schemeClr val="accent1"/>
+          </a:effectRef>
+          <a:fontRef idx="minor">
+            <a:schemeClr val="tx1"/>
+          </a:fontRef>
+        </p:style>
+      </p:cxnSp>
+      <p:cxnSp>
+        <p:nvCxnSpPr>
+          <p:cNvPr id="25" name="Straight Connector 24"/>
+          <p:cNvCxnSpPr/>
+          <p:nvPr/>
+        </p:nvCxnSpPr>
+        <p:spPr>
+          <a:xfrm>
+            <a:off x="852993" y="3363393"/>
+            <a:ext cx="365322" cy="365322"/>
+          </a:xfrm>
+          <a:prstGeom prst="line">
+            <a:avLst/>
+          </a:prstGeom>
+          <a:ln w="50800">
+            <a:solidFill>
+              <a:schemeClr val="tx1"/>
+            </a:solidFill>
+          </a:ln>
+        </p:spPr>
+        <p:style>
+          <a:lnRef idx="1">
+            <a:schemeClr val="accent1"/>
+          </a:lnRef>
+          <a:fillRef idx="0">
+            <a:schemeClr val="accent1"/>
+          </a:fillRef>
+          <a:effectRef idx="0">
+            <a:schemeClr val="accent1"/>
+          </a:effectRef>
+          <a:fontRef idx="minor">
+            <a:schemeClr val="tx1"/>
+          </a:fontRef>
+        </p:style>
+      </p:cxnSp>
+      <p:cxnSp>
+        <p:nvCxnSpPr>
+          <p:cNvPr id="27" name="Straight Connector 26"/>
+          <p:cNvCxnSpPr/>
+          <p:nvPr/>
+        </p:nvCxnSpPr>
+        <p:spPr>
+          <a:xfrm flipV="1">
+            <a:off x="8433482" y="2126516"/>
+            <a:ext cx="1609128" cy="1609127"/>
+          </a:xfrm>
+          <a:prstGeom prst="line">
+            <a:avLst/>
+          </a:prstGeom>
+          <a:ln w="50800">
+            <a:solidFill>
+              <a:schemeClr val="tx1"/>
+            </a:solidFill>
+          </a:ln>
+        </p:spPr>
+        <p:style>
+          <a:lnRef idx="1">
+            <a:schemeClr val="accent1"/>
+          </a:lnRef>
+          <a:fillRef idx="0">
+            <a:schemeClr val="accent1"/>
+          </a:fillRef>
+          <a:effectRef idx="0">
+            <a:schemeClr val="accent1"/>
+          </a:effectRef>
+          <a:fontRef idx="minor">
+            <a:schemeClr val="tx1"/>
+          </a:fontRef>
+        </p:style>
+      </p:cxnSp>
+      <p:cxnSp>
+        <p:nvCxnSpPr>
+          <p:cNvPr id="28" name="Straight Connector 27"/>
+          <p:cNvCxnSpPr/>
+          <p:nvPr/>
+        </p:nvCxnSpPr>
+        <p:spPr>
+          <a:xfrm>
+            <a:off x="10042610" y="2126515"/>
+            <a:ext cx="1610526" cy="1610526"/>
+          </a:xfrm>
+          <a:prstGeom prst="line">
+            <a:avLst/>
+          </a:prstGeom>
+          <a:ln w="50800">
+            <a:solidFill>
+              <a:schemeClr val="tx1"/>
+            </a:solidFill>
+          </a:ln>
+        </p:spPr>
+        <p:style>
+          <a:lnRef idx="1">
+            <a:schemeClr val="accent1"/>
+          </a:lnRef>
+          <a:fillRef idx="0">
+            <a:schemeClr val="accent1"/>
+          </a:fillRef>
+          <a:effectRef idx="0">
+            <a:schemeClr val="accent1"/>
+          </a:effectRef>
+          <a:fontRef idx="minor">
+            <a:schemeClr val="tx1"/>
+          </a:fontRef>
+        </p:style>
+      </p:cxnSp>
+      <p:cxnSp>
+        <p:nvCxnSpPr>
+          <p:cNvPr id="29" name="Straight Connector 28"/>
+          <p:cNvCxnSpPr/>
+          <p:nvPr/>
+        </p:nvCxnSpPr>
+        <p:spPr>
+          <a:xfrm flipV="1">
+            <a:off x="10474325" y="3127680"/>
+            <a:ext cx="597111" cy="597108"/>
+          </a:xfrm>
+          <a:prstGeom prst="line">
+            <a:avLst/>
+          </a:prstGeom>
+          <a:ln w="50800">
+            <a:solidFill>
+              <a:schemeClr val="tx1"/>
+            </a:solidFill>
+          </a:ln>
+        </p:spPr>
+        <p:style>
+          <a:lnRef idx="1">
+            <a:schemeClr val="accent1"/>
+          </a:lnRef>
+          <a:fillRef idx="0">
+            <a:schemeClr val="accent1"/>
+          </a:fillRef>
+          <a:effectRef idx="0">
+            <a:schemeClr val="accent1"/>
+          </a:effectRef>
+          <a:fontRef idx="minor">
+            <a:schemeClr val="tx1"/>
+          </a:fontRef>
+        </p:style>
+      </p:cxnSp>
+      <p:cxnSp>
+        <p:nvCxnSpPr>
+          <p:cNvPr id="31" name="Straight Connector 30"/>
+          <p:cNvCxnSpPr/>
+          <p:nvPr/>
+        </p:nvCxnSpPr>
+        <p:spPr>
+          <a:xfrm flipV="1">
+            <a:off x="10975533" y="3380795"/>
+            <a:ext cx="344975" cy="344974"/>
+          </a:xfrm>
+          <a:prstGeom prst="line">
+            <a:avLst/>
+          </a:prstGeom>
+          <a:ln w="50800">
+            <a:solidFill>
+              <a:schemeClr val="tx1"/>
+            </a:solidFill>
+          </a:ln>
+        </p:spPr>
+        <p:style>
+          <a:lnRef idx="1">
+            <a:schemeClr val="accent1"/>
+          </a:lnRef>
+          <a:fillRef idx="0">
+            <a:schemeClr val="accent1"/>
+          </a:fillRef>
+          <a:effectRef idx="0">
+            <a:schemeClr val="accent1"/>
+          </a:effectRef>
+          <a:fontRef idx="minor">
+            <a:schemeClr val="tx1"/>
+          </a:fontRef>
+        </p:style>
+      </p:cxnSp>
+      <p:cxnSp>
+        <p:nvCxnSpPr>
+          <p:cNvPr id="32" name="Straight Connector 31"/>
+          <p:cNvCxnSpPr/>
+          <p:nvPr/>
+        </p:nvCxnSpPr>
+        <p:spPr>
+          <a:xfrm>
+            <a:off x="9358192" y="2817557"/>
+            <a:ext cx="911158" cy="911158"/>
+          </a:xfrm>
+          <a:prstGeom prst="line">
+            <a:avLst/>
+          </a:prstGeom>
+          <a:ln w="50800">
+            <a:solidFill>
+              <a:schemeClr val="tx1"/>
+            </a:solidFill>
+          </a:ln>
+        </p:spPr>
+        <p:style>
+          <a:lnRef idx="1">
+            <a:schemeClr val="accent1"/>
+          </a:lnRef>
+          <a:fillRef idx="0">
+            <a:schemeClr val="accent1"/>
+          </a:fillRef>
+          <a:effectRef idx="0">
+            <a:schemeClr val="accent1"/>
+          </a:effectRef>
+          <a:fontRef idx="minor">
+            <a:schemeClr val="tx1"/>
+          </a:fontRef>
+        </p:style>
+      </p:cxnSp>
+      <p:sp>
+        <p:nvSpPr>
+          <p:cNvPr id="37" name="TextBox 36"/>
+          <p:cNvSpPr txBox="1"/>
+          <p:nvPr/>
+        </p:nvSpPr>
+        <p:spPr>
+          <a:xfrm>
+            <a:off x="1973569" y="2133499"/>
+            <a:ext cx="223284" cy="400110"/>
+          </a:xfrm>
+          <a:prstGeom prst="rect">
+            <a:avLst/>
+          </a:prstGeom>
+          <a:noFill/>
+        </p:spPr>
+        <p:txBody>
+          <a:bodyPr wrap="square" rtlCol="0">
+            <a:spAutoFit/>
+          </a:bodyPr>
+          <a:lstStyle/>
+          <a:p>
+            <a:pPr algn="ctr"/>
+            <a:r>
+              <a:rPr lang="en-US" sz="2000" dirty="0" smtClean="0"/>
+              <a:t>0</a:t>
+            </a:r>
+            <a:endParaRPr lang="en-US" sz="2000" dirty="0"/>
+          </a:p>
+        </p:txBody>
+      </p:sp>
+      <p:sp>
+        <p:nvSpPr>
+          <p:cNvPr id="38" name="TextBox 37"/>
+          <p:cNvSpPr txBox="1"/>
+          <p:nvPr/>
+        </p:nvSpPr>
+        <p:spPr>
+          <a:xfrm>
+            <a:off x="6658935" y="2794075"/>
+            <a:ext cx="223284" cy="400110"/>
+          </a:xfrm>
+          <a:prstGeom prst="rect">
+            <a:avLst/>
+          </a:prstGeom>
+          <a:noFill/>
+        </p:spPr>
+        <p:txBody>
+          <a:bodyPr wrap="square" rtlCol="0">
+            <a:spAutoFit/>
+          </a:bodyPr>
+          <a:lstStyle/>
+          <a:p>
+            <a:pPr algn="ctr"/>
+            <a:r>
+              <a:rPr lang="en-US" sz="2000" dirty="0" smtClean="0"/>
+              <a:t>1</a:t>
+            </a:r>
+            <a:endParaRPr lang="en-US" sz="2000" dirty="0"/>
+          </a:p>
+        </p:txBody>
+      </p:sp>
+      <p:sp>
+        <p:nvSpPr>
+          <p:cNvPr id="43" name="TextBox 42"/>
+          <p:cNvSpPr txBox="1"/>
+          <p:nvPr/>
+        </p:nvSpPr>
+        <p:spPr>
+          <a:xfrm>
+            <a:off x="2778832" y="2931079"/>
+            <a:ext cx="223284" cy="400110"/>
+          </a:xfrm>
+          <a:prstGeom prst="rect">
+            <a:avLst/>
+          </a:prstGeom>
+          <a:noFill/>
+        </p:spPr>
+        <p:txBody>
+          <a:bodyPr wrap="square" rtlCol="0">
+            <a:spAutoFit/>
+          </a:bodyPr>
+          <a:lstStyle/>
+          <a:p>
+            <a:pPr algn="ctr"/>
+            <a:r>
+              <a:rPr lang="en-US" sz="2000" dirty="0" smtClean="0"/>
+              <a:t>2</a:t>
+            </a:r>
+            <a:endParaRPr lang="en-US" sz="2000" dirty="0"/>
+          </a:p>
+        </p:txBody>
+      </p:sp>
+      <p:sp>
+        <p:nvSpPr>
+          <p:cNvPr id="46" name="TextBox 45"/>
+          <p:cNvSpPr txBox="1"/>
+          <p:nvPr/>
+        </p:nvSpPr>
+        <p:spPr>
+          <a:xfrm>
+            <a:off x="741351" y="3353231"/>
+            <a:ext cx="223284" cy="400110"/>
+          </a:xfrm>
+          <a:prstGeom prst="rect">
+            <a:avLst/>
+          </a:prstGeom>
+          <a:noFill/>
+        </p:spPr>
+        <p:txBody>
+          <a:bodyPr wrap="square" rtlCol="0">
+            <a:spAutoFit/>
+          </a:bodyPr>
+          <a:lstStyle/>
+          <a:p>
+            <a:pPr algn="ctr"/>
+            <a:r>
+              <a:rPr lang="en-US" sz="2000" dirty="0" smtClean="0"/>
+              <a:t>3</a:t>
+            </a:r>
+            <a:endParaRPr lang="en-US" sz="2000" dirty="0"/>
+          </a:p>
+        </p:txBody>
+      </p:sp>
+      <p:sp>
+        <p:nvSpPr>
+          <p:cNvPr id="50" name="TextBox 49"/>
+          <p:cNvSpPr txBox="1"/>
+          <p:nvPr/>
+        </p:nvSpPr>
+        <p:spPr>
+          <a:xfrm>
+            <a:off x="5971491" y="2133499"/>
+            <a:ext cx="223284" cy="400110"/>
+          </a:xfrm>
+          <a:prstGeom prst="rect">
+            <a:avLst/>
+          </a:prstGeom>
+          <a:noFill/>
+        </p:spPr>
+        <p:txBody>
+          <a:bodyPr wrap="square" rtlCol="0">
+            <a:spAutoFit/>
+          </a:bodyPr>
+          <a:lstStyle/>
+          <a:p>
+            <a:pPr algn="ctr"/>
+            <a:r>
+              <a:rPr lang="en-US" sz="2000" dirty="0" smtClean="0"/>
+              <a:t>0</a:t>
+            </a:r>
+            <a:endParaRPr lang="en-US" sz="2000" dirty="0"/>
+          </a:p>
+        </p:txBody>
+      </p:sp>
+      <p:sp>
+        <p:nvSpPr>
+          <p:cNvPr id="51" name="TextBox 50"/>
+          <p:cNvSpPr txBox="1"/>
+          <p:nvPr/>
+        </p:nvSpPr>
+        <p:spPr>
+          <a:xfrm>
+            <a:off x="2418744" y="2607766"/>
+            <a:ext cx="223284" cy="400110"/>
+          </a:xfrm>
+          <a:prstGeom prst="rect">
+            <a:avLst/>
+          </a:prstGeom>
+          <a:noFill/>
+        </p:spPr>
+        <p:txBody>
+          <a:bodyPr wrap="square" rtlCol="0">
+            <a:spAutoFit/>
+          </a:bodyPr>
+          <a:lstStyle/>
+          <a:p>
+            <a:pPr algn="ctr"/>
+            <a:r>
+              <a:rPr lang="en-US" sz="2000" dirty="0" smtClean="0"/>
+              <a:t>1</a:t>
+            </a:r>
+            <a:endParaRPr lang="en-US" sz="2000" dirty="0"/>
+          </a:p>
+        </p:txBody>
+      </p:sp>
+      <p:sp>
+        <p:nvSpPr>
+          <p:cNvPr id="53" name="TextBox 52"/>
+          <p:cNvSpPr txBox="1"/>
+          <p:nvPr/>
+        </p:nvSpPr>
+        <p:spPr>
+          <a:xfrm>
+            <a:off x="4989612" y="3111597"/>
+            <a:ext cx="223284" cy="400110"/>
+          </a:xfrm>
+          <a:prstGeom prst="rect">
+            <a:avLst/>
+          </a:prstGeom>
+          <a:noFill/>
+        </p:spPr>
+        <p:txBody>
+          <a:bodyPr wrap="square" rtlCol="0">
+            <a:spAutoFit/>
+          </a:bodyPr>
+          <a:lstStyle/>
+          <a:p>
+            <a:pPr algn="ctr"/>
+            <a:r>
+              <a:rPr lang="en-US" sz="2000" smtClean="0"/>
+              <a:t>2</a:t>
+            </a:r>
+            <a:endParaRPr lang="en-US" sz="2000" dirty="0"/>
+          </a:p>
+        </p:txBody>
+      </p:sp>
+      <p:sp>
+        <p:nvSpPr>
+          <p:cNvPr id="58" name="TextBox 57"/>
+          <p:cNvSpPr txBox="1"/>
+          <p:nvPr/>
+        </p:nvSpPr>
+        <p:spPr>
+          <a:xfrm>
+            <a:off x="7232081" y="3363393"/>
+            <a:ext cx="223284" cy="400110"/>
+          </a:xfrm>
+          <a:prstGeom prst="rect">
+            <a:avLst/>
+          </a:prstGeom>
+          <a:noFill/>
+        </p:spPr>
+        <p:txBody>
+          <a:bodyPr wrap="square" rtlCol="0">
+            <a:spAutoFit/>
+          </a:bodyPr>
+          <a:lstStyle/>
+          <a:p>
+            <a:pPr algn="ctr"/>
+            <a:r>
+              <a:rPr lang="en-US" sz="2000" smtClean="0"/>
+              <a:t>3</a:t>
+            </a:r>
+            <a:endParaRPr lang="en-US" sz="2000" dirty="0"/>
+          </a:p>
+        </p:txBody>
+      </p:sp>
+      <p:sp>
+        <p:nvSpPr>
+          <p:cNvPr id="59" name="TextBox 58"/>
+          <p:cNvSpPr txBox="1"/>
+          <p:nvPr/>
+        </p:nvSpPr>
+        <p:spPr>
+          <a:xfrm>
+            <a:off x="9930968" y="2114781"/>
+            <a:ext cx="223284" cy="400110"/>
+          </a:xfrm>
+          <a:prstGeom prst="rect">
+            <a:avLst/>
+          </a:prstGeom>
+          <a:noFill/>
+        </p:spPr>
+        <p:txBody>
+          <a:bodyPr wrap="square" rtlCol="0">
+            <a:spAutoFit/>
+          </a:bodyPr>
+          <a:lstStyle/>
+          <a:p>
+            <a:pPr algn="ctr"/>
+            <a:r>
+              <a:rPr lang="en-US" sz="2000" dirty="0" smtClean="0"/>
+              <a:t>0</a:t>
+            </a:r>
+            <a:endParaRPr lang="en-US" sz="2000" dirty="0"/>
+          </a:p>
+        </p:txBody>
+      </p:sp>
+      <p:sp>
+        <p:nvSpPr>
+          <p:cNvPr id="60" name="TextBox 59"/>
+          <p:cNvSpPr txBox="1"/>
+          <p:nvPr/>
+        </p:nvSpPr>
+        <p:spPr>
+          <a:xfrm>
+            <a:off x="9231863" y="2807821"/>
+            <a:ext cx="223284" cy="400110"/>
+          </a:xfrm>
+          <a:prstGeom prst="rect">
+            <a:avLst/>
+          </a:prstGeom>
+          <a:noFill/>
+        </p:spPr>
+        <p:txBody>
+          <a:bodyPr wrap="square" rtlCol="0">
+            <a:spAutoFit/>
+          </a:bodyPr>
+          <a:lstStyle/>
+          <a:p>
+            <a:pPr algn="ctr"/>
+            <a:r>
+              <a:rPr lang="en-US" sz="2000" dirty="0" smtClean="0"/>
+              <a:t>1</a:t>
+            </a:r>
+            <a:endParaRPr lang="en-US" sz="2000" dirty="0"/>
+          </a:p>
+        </p:txBody>
+      </p:sp>
+      <p:sp>
+        <p:nvSpPr>
+          <p:cNvPr id="61" name="TextBox 60"/>
+          <p:cNvSpPr txBox="1"/>
+          <p:nvPr/>
+        </p:nvSpPr>
+        <p:spPr>
+          <a:xfrm>
+            <a:off x="10952633" y="3133310"/>
+            <a:ext cx="223284" cy="400110"/>
+          </a:xfrm>
+          <a:prstGeom prst="rect">
+            <a:avLst/>
+          </a:prstGeom>
+          <a:noFill/>
+        </p:spPr>
+        <p:txBody>
+          <a:bodyPr wrap="square" rtlCol="0">
+            <a:spAutoFit/>
+          </a:bodyPr>
+          <a:lstStyle/>
+          <a:p>
+            <a:pPr algn="ctr"/>
+            <a:r>
+              <a:rPr lang="en-US" sz="2000" smtClean="0"/>
+              <a:t>2</a:t>
+            </a:r>
+            <a:endParaRPr lang="en-US" sz="2000" dirty="0"/>
+          </a:p>
+        </p:txBody>
+      </p:sp>
+      <p:sp>
+        <p:nvSpPr>
+          <p:cNvPr id="62" name="TextBox 61"/>
+          <p:cNvSpPr txBox="1"/>
+          <p:nvPr/>
+        </p:nvSpPr>
+        <p:spPr>
+          <a:xfrm>
+            <a:off x="11203103" y="3377227"/>
+            <a:ext cx="223284" cy="400110"/>
+          </a:xfrm>
+          <a:prstGeom prst="rect">
+            <a:avLst/>
+          </a:prstGeom>
+          <a:noFill/>
+        </p:spPr>
+        <p:txBody>
+          <a:bodyPr wrap="square" rtlCol="0">
+            <a:spAutoFit/>
+          </a:bodyPr>
+          <a:lstStyle/>
+          <a:p>
+            <a:pPr algn="ctr"/>
+            <a:r>
+              <a:rPr lang="en-US" sz="2000" smtClean="0"/>
+              <a:t>3</a:t>
+            </a:r>
+            <a:endParaRPr lang="en-US" sz="2000" dirty="0"/>
+          </a:p>
+        </p:txBody>
+      </p:sp>
+    </p:spTree>
+    <p:extLst>
+      <p:ext uri="{BB962C8B-B14F-4D97-AF65-F5344CB8AC3E}">
+        <p14:creationId xmlns:p14="http://schemas.microsoft.com/office/powerpoint/2010/main" val="1379498599"/>
+      </p:ext>
+    </p:extLst>
+  </p:cSld>
+  <p:clrMapOvr>
+    <a:masterClrMapping/>
+  </p:clrMapOvr>
+</p:sld>
+</file>
+
+<file path=ppt/slides/slide7.xml><?xml version="1.0" encoding="utf-8"?>
+<p:sld xmlns:a="http://schemas.openxmlformats.org/drawingml/2006/main" xmlns:r="http://schemas.openxmlformats.org/officeDocument/2006/relationships" xmlns:p="http://schemas.openxmlformats.org/presentationml/2006/main">
+  <p:cSld>
+    <p:spTree>
+      <p:nvGrpSpPr>
+        <p:cNvPr id="1" name=""/>
+        <p:cNvGrpSpPr/>
+        <p:nvPr/>
+      </p:nvGrpSpPr>
+      <p:grpSpPr>
+        <a:xfrm>
+          <a:off x="0" y="0"/>
+          <a:ext cx="0" cy="0"/>
+          <a:chOff x="0" y="0"/>
+          <a:chExt cx="0" cy="0"/>
+        </a:xfrm>
+      </p:grpSpPr>
+      <p:cxnSp>
+        <p:nvCxnSpPr>
+          <p:cNvPr id="39" name="Straight Connector 38"/>
+          <p:cNvCxnSpPr/>
+          <p:nvPr/>
+        </p:nvCxnSpPr>
+        <p:spPr>
+          <a:xfrm flipV="1">
+            <a:off x="6330461" y="1065704"/>
+            <a:ext cx="1609128" cy="1609127"/>
+          </a:xfrm>
+          <a:prstGeom prst="line">
+            <a:avLst/>
+          </a:prstGeom>
+          <a:ln w="50800">
+            <a:solidFill>
+              <a:schemeClr val="tx1"/>
+            </a:solidFill>
+          </a:ln>
+        </p:spPr>
+        <p:style>
+          <a:lnRef idx="1">
+            <a:schemeClr val="accent1"/>
+          </a:lnRef>
+          <a:fillRef idx="0">
+            <a:schemeClr val="accent1"/>
+          </a:fillRef>
+          <a:effectRef idx="0">
+            <a:schemeClr val="accent1"/>
+          </a:effectRef>
+          <a:fontRef idx="minor">
+            <a:schemeClr val="tx1"/>
+          </a:fontRef>
+        </p:style>
+      </p:cxnSp>
+      <p:cxnSp>
+        <p:nvCxnSpPr>
+          <p:cNvPr id="40" name="Straight Connector 39"/>
+          <p:cNvCxnSpPr/>
+          <p:nvPr/>
+        </p:nvCxnSpPr>
+        <p:spPr>
+          <a:xfrm>
+            <a:off x="7939589" y="1065703"/>
+            <a:ext cx="1610526" cy="1610526"/>
+          </a:xfrm>
+          <a:prstGeom prst="line">
+            <a:avLst/>
+          </a:prstGeom>
+          <a:ln w="50800">
+            <a:solidFill>
+              <a:schemeClr val="tx1"/>
+            </a:solidFill>
+          </a:ln>
+        </p:spPr>
+        <p:style>
+          <a:lnRef idx="1">
+            <a:schemeClr val="accent1"/>
+          </a:lnRef>
+          <a:fillRef idx="0">
+            <a:schemeClr val="accent1"/>
+          </a:fillRef>
+          <a:effectRef idx="0">
+            <a:schemeClr val="accent1"/>
+          </a:effectRef>
+          <a:fontRef idx="minor">
+            <a:schemeClr val="tx1"/>
+          </a:fontRef>
+        </p:style>
+      </p:cxnSp>
+      <p:cxnSp>
+        <p:nvCxnSpPr>
+          <p:cNvPr id="42" name="Straight Connector 41"/>
+          <p:cNvCxnSpPr/>
+          <p:nvPr/>
+        </p:nvCxnSpPr>
+        <p:spPr>
+          <a:xfrm flipV="1">
+            <a:off x="8470911" y="2131726"/>
+            <a:ext cx="547268" cy="547268"/>
+          </a:xfrm>
+          <a:prstGeom prst="line">
+            <a:avLst/>
+          </a:prstGeom>
+          <a:ln w="50800">
+            <a:solidFill>
+              <a:schemeClr val="tx1"/>
+            </a:solidFill>
+          </a:ln>
+        </p:spPr>
+        <p:style>
+          <a:lnRef idx="1">
+            <a:schemeClr val="accent1"/>
+          </a:lnRef>
+          <a:fillRef idx="0">
+            <a:schemeClr val="accent1"/>
+          </a:fillRef>
+          <a:effectRef idx="0">
+            <a:schemeClr val="accent1"/>
+          </a:effectRef>
+          <a:fontRef idx="minor">
+            <a:schemeClr val="tx1"/>
+          </a:fontRef>
+        </p:style>
+      </p:cxnSp>
+      <p:cxnSp>
+        <p:nvCxnSpPr>
+          <p:cNvPr id="49" name="Straight Connector 48"/>
+          <p:cNvCxnSpPr/>
+          <p:nvPr/>
+        </p:nvCxnSpPr>
+        <p:spPr>
+          <a:xfrm>
+            <a:off x="6879687" y="2131726"/>
+            <a:ext cx="547268" cy="547268"/>
+          </a:xfrm>
+          <a:prstGeom prst="line">
+            <a:avLst/>
+          </a:prstGeom>
+          <a:ln w="50800">
+            <a:solidFill>
+              <a:schemeClr val="tx1"/>
+            </a:solidFill>
+          </a:ln>
+        </p:spPr>
+        <p:style>
+          <a:lnRef idx="1">
+            <a:schemeClr val="accent1"/>
+          </a:lnRef>
+          <a:fillRef idx="0">
+            <a:schemeClr val="accent1"/>
+          </a:fillRef>
+          <a:effectRef idx="0">
+            <a:schemeClr val="accent1"/>
+          </a:effectRef>
+          <a:fontRef idx="minor">
+            <a:schemeClr val="tx1"/>
+          </a:fontRef>
+        </p:style>
+      </p:cxnSp>
+      <p:sp>
+        <p:nvSpPr>
+          <p:cNvPr id="54" name="TextBox 53"/>
+          <p:cNvSpPr txBox="1"/>
+          <p:nvPr/>
+        </p:nvSpPr>
+        <p:spPr>
+          <a:xfrm>
+            <a:off x="2335880" y="2708125"/>
+            <a:ext cx="3221051" cy="400110"/>
+          </a:xfrm>
+          <a:prstGeom prst="rect">
+            <a:avLst/>
+          </a:prstGeom>
+          <a:noFill/>
+        </p:spPr>
+        <p:txBody>
+          <a:bodyPr wrap="square" rtlCol="0">
+            <a:spAutoFit/>
+          </a:bodyPr>
+          <a:lstStyle/>
+          <a:p>
+            <a:pPr algn="ctr"/>
+            <a:r>
+              <a:rPr lang="en-US" sz="2000" dirty="0" smtClean="0"/>
+              <a:t>Ordering 1</a:t>
+            </a:r>
+            <a:endParaRPr lang="en-US" sz="2000" dirty="0"/>
+          </a:p>
+        </p:txBody>
+      </p:sp>
+      <p:sp>
+        <p:nvSpPr>
+          <p:cNvPr id="55" name="TextBox 54"/>
+          <p:cNvSpPr txBox="1"/>
+          <p:nvPr/>
+        </p:nvSpPr>
+        <p:spPr>
+          <a:xfrm>
+            <a:off x="6330461" y="2708125"/>
+            <a:ext cx="3219654" cy="400110"/>
+          </a:xfrm>
+          <a:prstGeom prst="rect">
+            <a:avLst/>
+          </a:prstGeom>
+          <a:noFill/>
+        </p:spPr>
+        <p:txBody>
+          <a:bodyPr wrap="square" rtlCol="0">
+            <a:spAutoFit/>
+          </a:bodyPr>
+          <a:lstStyle/>
+          <a:p>
+            <a:pPr algn="ctr"/>
+            <a:r>
+              <a:rPr lang="en-US" sz="2000" dirty="0" smtClean="0"/>
+              <a:t>Ordering 2</a:t>
+            </a:r>
+            <a:endParaRPr lang="en-US" sz="2000" dirty="0"/>
+          </a:p>
+        </p:txBody>
+      </p:sp>
+      <p:cxnSp>
+        <p:nvCxnSpPr>
+          <p:cNvPr id="28" name="Straight Connector 27"/>
+          <p:cNvCxnSpPr/>
+          <p:nvPr/>
+        </p:nvCxnSpPr>
+        <p:spPr>
+          <a:xfrm flipV="1">
+            <a:off x="2335880" y="3620563"/>
+            <a:ext cx="1609128" cy="1609127"/>
+          </a:xfrm>
+          <a:prstGeom prst="line">
+            <a:avLst/>
+          </a:prstGeom>
+          <a:ln w="50800">
+            <a:solidFill>
+              <a:schemeClr val="tx1"/>
+            </a:solidFill>
+          </a:ln>
+        </p:spPr>
+        <p:style>
+          <a:lnRef idx="1">
+            <a:schemeClr val="accent1"/>
+          </a:lnRef>
+          <a:fillRef idx="0">
+            <a:schemeClr val="accent1"/>
+          </a:fillRef>
+          <a:effectRef idx="0">
+            <a:schemeClr val="accent1"/>
+          </a:effectRef>
+          <a:fontRef idx="minor">
+            <a:schemeClr val="tx1"/>
+          </a:fontRef>
+        </p:style>
+      </p:cxnSp>
+      <p:cxnSp>
+        <p:nvCxnSpPr>
+          <p:cNvPr id="29" name="Straight Connector 28"/>
+          <p:cNvCxnSpPr/>
+          <p:nvPr/>
+        </p:nvCxnSpPr>
+        <p:spPr>
+          <a:xfrm>
+            <a:off x="3945008" y="3620562"/>
+            <a:ext cx="1610526" cy="1610526"/>
+          </a:xfrm>
+          <a:prstGeom prst="line">
+            <a:avLst/>
+          </a:prstGeom>
+          <a:ln w="50800">
+            <a:solidFill>
+              <a:schemeClr val="tx1"/>
+            </a:solidFill>
+          </a:ln>
+        </p:spPr>
+        <p:style>
+          <a:lnRef idx="1">
+            <a:schemeClr val="accent1"/>
+          </a:lnRef>
+          <a:fillRef idx="0">
+            <a:schemeClr val="accent1"/>
+          </a:fillRef>
+          <a:effectRef idx="0">
+            <a:schemeClr val="accent1"/>
+          </a:effectRef>
+          <a:fontRef idx="minor">
+            <a:schemeClr val="tx1"/>
+          </a:fontRef>
+        </p:style>
+      </p:cxnSp>
+      <p:cxnSp>
+        <p:nvCxnSpPr>
+          <p:cNvPr id="31" name="Straight Connector 30"/>
+          <p:cNvCxnSpPr/>
+          <p:nvPr/>
+        </p:nvCxnSpPr>
+        <p:spPr>
+          <a:xfrm flipV="1">
+            <a:off x="3705781" y="4288122"/>
+            <a:ext cx="941569" cy="941568"/>
+          </a:xfrm>
+          <a:prstGeom prst="line">
+            <a:avLst/>
+          </a:prstGeom>
+          <a:ln w="50800">
+            <a:solidFill>
+              <a:schemeClr val="tx1"/>
+            </a:solidFill>
+          </a:ln>
+        </p:spPr>
+        <p:style>
+          <a:lnRef idx="1">
+            <a:schemeClr val="accent1"/>
+          </a:lnRef>
+          <a:fillRef idx="0">
+            <a:schemeClr val="accent1"/>
+          </a:fillRef>
+          <a:effectRef idx="0">
+            <a:schemeClr val="accent1"/>
+          </a:effectRef>
+          <a:fontRef idx="minor">
+            <a:schemeClr val="tx1"/>
+          </a:fontRef>
+        </p:style>
+      </p:cxnSp>
+      <p:cxnSp>
+        <p:nvCxnSpPr>
+          <p:cNvPr id="34" name="Straight Connector 33"/>
+          <p:cNvCxnSpPr/>
+          <p:nvPr/>
+        </p:nvCxnSpPr>
+        <p:spPr>
+          <a:xfrm>
+            <a:off x="2885106" y="4686585"/>
+            <a:ext cx="547268" cy="547268"/>
+          </a:xfrm>
+          <a:prstGeom prst="line">
+            <a:avLst/>
+          </a:prstGeom>
+          <a:ln w="50800">
+            <a:solidFill>
+              <a:schemeClr val="tx1"/>
+            </a:solidFill>
+          </a:ln>
+        </p:spPr>
+        <p:style>
+          <a:lnRef idx="1">
+            <a:schemeClr val="accent1"/>
+          </a:lnRef>
+          <a:fillRef idx="0">
+            <a:schemeClr val="accent1"/>
+          </a:fillRef>
+          <a:effectRef idx="0">
+            <a:schemeClr val="accent1"/>
+          </a:effectRef>
+          <a:fontRef idx="minor">
+            <a:schemeClr val="tx1"/>
+          </a:fontRef>
+        </p:style>
+      </p:cxnSp>
+      <p:sp>
+        <p:nvSpPr>
+          <p:cNvPr id="35" name="TextBox 34"/>
+          <p:cNvSpPr txBox="1"/>
+          <p:nvPr/>
+        </p:nvSpPr>
+        <p:spPr>
+          <a:xfrm>
+            <a:off x="2335880" y="5262984"/>
+            <a:ext cx="3221051" cy="400110"/>
+          </a:xfrm>
+          <a:prstGeom prst="rect">
+            <a:avLst/>
+          </a:prstGeom>
+          <a:noFill/>
+        </p:spPr>
+        <p:txBody>
+          <a:bodyPr wrap="square" rtlCol="0">
+            <a:spAutoFit/>
+          </a:bodyPr>
+          <a:lstStyle/>
+          <a:p>
+            <a:pPr algn="ctr"/>
+            <a:r>
+              <a:rPr lang="en-US" sz="2000" dirty="0" smtClean="0"/>
+              <a:t>Ordering 3</a:t>
+            </a:r>
+            <a:endParaRPr lang="en-US" sz="2000" dirty="0"/>
+          </a:p>
+        </p:txBody>
+      </p:sp>
+      <p:sp>
+        <p:nvSpPr>
+          <p:cNvPr id="36" name="TextBox 35"/>
+          <p:cNvSpPr txBox="1"/>
+          <p:nvPr/>
+        </p:nvSpPr>
+        <p:spPr>
+          <a:xfrm>
+            <a:off x="6330461" y="5262984"/>
+            <a:ext cx="3219654" cy="400110"/>
+          </a:xfrm>
+          <a:prstGeom prst="rect">
+            <a:avLst/>
+          </a:prstGeom>
+          <a:noFill/>
+        </p:spPr>
+        <p:txBody>
+          <a:bodyPr wrap="square" rtlCol="0">
+            <a:spAutoFit/>
+          </a:bodyPr>
+          <a:lstStyle/>
+          <a:p>
+            <a:pPr algn="ctr"/>
+            <a:r>
+              <a:rPr lang="en-US" sz="2000" dirty="0" smtClean="0"/>
+              <a:t>Ordering 4</a:t>
+            </a:r>
+            <a:endParaRPr lang="en-US" sz="2000" dirty="0"/>
+          </a:p>
+        </p:txBody>
+      </p:sp>
+      <p:cxnSp>
+        <p:nvCxnSpPr>
+          <p:cNvPr id="38" name="Straight Connector 37"/>
+          <p:cNvCxnSpPr/>
+          <p:nvPr/>
+        </p:nvCxnSpPr>
+        <p:spPr>
+          <a:xfrm flipV="1">
+            <a:off x="2335880" y="1062643"/>
+            <a:ext cx="1609128" cy="1609127"/>
+          </a:xfrm>
+          <a:prstGeom prst="line">
+            <a:avLst/>
+          </a:prstGeom>
+          <a:ln w="50800">
+            <a:solidFill>
+              <a:schemeClr val="tx1"/>
+            </a:solidFill>
+          </a:ln>
+        </p:spPr>
+        <p:style>
+          <a:lnRef idx="1">
+            <a:schemeClr val="accent1"/>
+          </a:lnRef>
+          <a:fillRef idx="0">
+            <a:schemeClr val="accent1"/>
+          </a:fillRef>
+          <a:effectRef idx="0">
+            <a:schemeClr val="accent1"/>
+          </a:effectRef>
+          <a:fontRef idx="minor">
+            <a:schemeClr val="tx1"/>
+          </a:fontRef>
+        </p:style>
+      </p:cxnSp>
+      <p:cxnSp>
+        <p:nvCxnSpPr>
+          <p:cNvPr id="43" name="Straight Connector 42"/>
+          <p:cNvCxnSpPr/>
+          <p:nvPr/>
+        </p:nvCxnSpPr>
+        <p:spPr>
+          <a:xfrm>
+            <a:off x="3945008" y="1062642"/>
+            <a:ext cx="1610526" cy="1610526"/>
+          </a:xfrm>
+          <a:prstGeom prst="line">
+            <a:avLst/>
+          </a:prstGeom>
+          <a:ln w="50800">
+            <a:solidFill>
+              <a:schemeClr val="tx1"/>
+            </a:solidFill>
+          </a:ln>
+        </p:spPr>
+        <p:style>
+          <a:lnRef idx="1">
+            <a:schemeClr val="accent1"/>
+          </a:lnRef>
+          <a:fillRef idx="0">
+            <a:schemeClr val="accent1"/>
+          </a:fillRef>
+          <a:effectRef idx="0">
+            <a:schemeClr val="accent1"/>
+          </a:effectRef>
+          <a:fontRef idx="minor">
+            <a:schemeClr val="tx1"/>
+          </a:fontRef>
+        </p:style>
+      </p:cxnSp>
+      <p:cxnSp>
+        <p:nvCxnSpPr>
+          <p:cNvPr id="46" name="Straight Connector 45"/>
+          <p:cNvCxnSpPr/>
+          <p:nvPr/>
+        </p:nvCxnSpPr>
+        <p:spPr>
+          <a:xfrm flipV="1">
+            <a:off x="3705781" y="1730202"/>
+            <a:ext cx="941569" cy="941568"/>
+          </a:xfrm>
+          <a:prstGeom prst="line">
+            <a:avLst/>
+          </a:prstGeom>
+          <a:ln w="50800">
+            <a:solidFill>
+              <a:schemeClr val="tx1"/>
+            </a:solidFill>
+          </a:ln>
+        </p:spPr>
+        <p:style>
+          <a:lnRef idx="1">
+            <a:schemeClr val="accent1"/>
+          </a:lnRef>
+          <a:fillRef idx="0">
+            <a:schemeClr val="accent1"/>
+          </a:fillRef>
+          <a:effectRef idx="0">
+            <a:schemeClr val="accent1"/>
+          </a:effectRef>
+          <a:fontRef idx="minor">
+            <a:schemeClr val="tx1"/>
+          </a:fontRef>
+        </p:style>
+      </p:cxnSp>
+      <p:cxnSp>
+        <p:nvCxnSpPr>
+          <p:cNvPr id="50" name="Straight Connector 49"/>
+          <p:cNvCxnSpPr/>
+          <p:nvPr/>
+        </p:nvCxnSpPr>
+        <p:spPr>
+          <a:xfrm flipV="1">
+            <a:off x="4476330" y="2128665"/>
+            <a:ext cx="547268" cy="547268"/>
+          </a:xfrm>
+          <a:prstGeom prst="line">
+            <a:avLst/>
+          </a:prstGeom>
+          <a:ln w="50800">
+            <a:solidFill>
+              <a:schemeClr val="tx1"/>
+            </a:solidFill>
+          </a:ln>
+        </p:spPr>
+        <p:style>
+          <a:lnRef idx="1">
+            <a:schemeClr val="accent1"/>
+          </a:lnRef>
+          <a:fillRef idx="0">
+            <a:schemeClr val="accent1"/>
+          </a:fillRef>
+          <a:effectRef idx="0">
+            <a:schemeClr val="accent1"/>
+          </a:effectRef>
+          <a:fontRef idx="minor">
+            <a:schemeClr val="tx1"/>
+          </a:fontRef>
+        </p:style>
+      </p:cxnSp>
+      <p:cxnSp>
+        <p:nvCxnSpPr>
+          <p:cNvPr id="51" name="Straight Connector 50"/>
+          <p:cNvCxnSpPr/>
+          <p:nvPr/>
+        </p:nvCxnSpPr>
+        <p:spPr>
+          <a:xfrm>
+            <a:off x="2885106" y="2128665"/>
+            <a:ext cx="547268" cy="547268"/>
+          </a:xfrm>
+          <a:prstGeom prst="line">
+            <a:avLst/>
+          </a:prstGeom>
+          <a:ln w="50800">
+            <a:solidFill>
+              <a:schemeClr val="tx1"/>
+            </a:solidFill>
+          </a:ln>
+        </p:spPr>
+        <p:style>
+          <a:lnRef idx="1">
+            <a:schemeClr val="accent1"/>
+          </a:lnRef>
+          <a:fillRef idx="0">
+            <a:schemeClr val="accent1"/>
+          </a:fillRef>
+          <a:effectRef idx="0">
+            <a:schemeClr val="accent1"/>
+          </a:effectRef>
+          <a:fontRef idx="minor">
+            <a:schemeClr val="tx1"/>
+          </a:fontRef>
+        </p:style>
+      </p:cxnSp>
+      <p:cxnSp>
+        <p:nvCxnSpPr>
+          <p:cNvPr id="53" name="Straight Connector 52"/>
+          <p:cNvCxnSpPr/>
+          <p:nvPr/>
+        </p:nvCxnSpPr>
+        <p:spPr>
+          <a:xfrm>
+            <a:off x="7244116" y="1736265"/>
+            <a:ext cx="956369" cy="956369"/>
+          </a:xfrm>
+          <a:prstGeom prst="line">
+            <a:avLst/>
+          </a:prstGeom>
+          <a:ln w="50800">
+            <a:solidFill>
+              <a:schemeClr val="tx1"/>
+            </a:solidFill>
+          </a:ln>
+        </p:spPr>
+        <p:style>
+          <a:lnRef idx="1">
+            <a:schemeClr val="accent1"/>
+          </a:lnRef>
+          <a:fillRef idx="0">
+            <a:schemeClr val="accent1"/>
+          </a:fillRef>
+          <a:effectRef idx="0">
+            <a:schemeClr val="accent1"/>
+          </a:effectRef>
+          <a:fontRef idx="minor">
+            <a:schemeClr val="tx1"/>
+          </a:fontRef>
+        </p:style>
+      </p:cxnSp>
+      <p:cxnSp>
+        <p:nvCxnSpPr>
+          <p:cNvPr id="60" name="Straight Connector 59"/>
+          <p:cNvCxnSpPr/>
+          <p:nvPr/>
+        </p:nvCxnSpPr>
+        <p:spPr>
+          <a:xfrm>
+            <a:off x="4284284" y="4663264"/>
+            <a:ext cx="568051" cy="568051"/>
+          </a:xfrm>
+          <a:prstGeom prst="line">
+            <a:avLst/>
+          </a:prstGeom>
+          <a:ln w="50800">
+            <a:solidFill>
+              <a:schemeClr val="tx1"/>
+            </a:solidFill>
+          </a:ln>
+        </p:spPr>
+        <p:style>
+          <a:lnRef idx="1">
+            <a:schemeClr val="accent1"/>
+          </a:lnRef>
+          <a:fillRef idx="0">
+            <a:schemeClr val="accent1"/>
+          </a:fillRef>
+          <a:effectRef idx="0">
+            <a:schemeClr val="accent1"/>
+          </a:effectRef>
+          <a:fontRef idx="minor">
+            <a:schemeClr val="tx1"/>
+          </a:fontRef>
+        </p:style>
+      </p:cxnSp>
+      <p:cxnSp>
+        <p:nvCxnSpPr>
+          <p:cNvPr id="61" name="Straight Connector 60"/>
+          <p:cNvCxnSpPr/>
+          <p:nvPr/>
+        </p:nvCxnSpPr>
+        <p:spPr>
+          <a:xfrm flipV="1">
+            <a:off x="6459376" y="3621691"/>
+            <a:ext cx="1609128" cy="1609127"/>
+          </a:xfrm>
+          <a:prstGeom prst="line">
+            <a:avLst/>
+          </a:prstGeom>
+          <a:ln w="50800">
+            <a:solidFill>
+              <a:schemeClr val="tx1"/>
+            </a:solidFill>
+          </a:ln>
+        </p:spPr>
+        <p:style>
+          <a:lnRef idx="1">
+            <a:schemeClr val="accent1"/>
+          </a:lnRef>
+          <a:fillRef idx="0">
+            <a:schemeClr val="accent1"/>
+          </a:fillRef>
+          <a:effectRef idx="0">
+            <a:schemeClr val="accent1"/>
+          </a:effectRef>
+          <a:fontRef idx="minor">
+            <a:schemeClr val="tx1"/>
+          </a:fontRef>
+        </p:style>
+      </p:cxnSp>
+      <p:cxnSp>
+        <p:nvCxnSpPr>
+          <p:cNvPr id="62" name="Straight Connector 61"/>
+          <p:cNvCxnSpPr/>
+          <p:nvPr/>
+        </p:nvCxnSpPr>
+        <p:spPr>
+          <a:xfrm>
+            <a:off x="8068504" y="3621690"/>
+            <a:ext cx="1610526" cy="1610526"/>
+          </a:xfrm>
+          <a:prstGeom prst="line">
+            <a:avLst/>
+          </a:prstGeom>
+          <a:ln w="50800">
+            <a:solidFill>
+              <a:schemeClr val="tx1"/>
+            </a:solidFill>
+          </a:ln>
+        </p:spPr>
+        <p:style>
+          <a:lnRef idx="1">
+            <a:schemeClr val="accent1"/>
+          </a:lnRef>
+          <a:fillRef idx="0">
+            <a:schemeClr val="accent1"/>
+          </a:fillRef>
+          <a:effectRef idx="0">
+            <a:schemeClr val="accent1"/>
+          </a:effectRef>
+          <a:fontRef idx="minor">
+            <a:schemeClr val="tx1"/>
+          </a:fontRef>
+        </p:style>
+      </p:cxnSp>
+      <p:cxnSp>
+        <p:nvCxnSpPr>
+          <p:cNvPr id="66" name="Straight Connector 65"/>
+          <p:cNvCxnSpPr/>
+          <p:nvPr/>
+        </p:nvCxnSpPr>
+        <p:spPr>
+          <a:xfrm>
+            <a:off x="7371583" y="4301761"/>
+            <a:ext cx="938145" cy="938145"/>
+          </a:xfrm>
+          <a:prstGeom prst="line">
+            <a:avLst/>
+          </a:prstGeom>
+          <a:ln w="50800">
+            <a:solidFill>
+              <a:schemeClr val="tx1"/>
+            </a:solidFill>
+          </a:ln>
+        </p:spPr>
+        <p:style>
+          <a:lnRef idx="1">
+            <a:schemeClr val="accent1"/>
+          </a:lnRef>
+          <a:fillRef idx="0">
+            <a:schemeClr val="accent1"/>
+          </a:fillRef>
+          <a:effectRef idx="0">
+            <a:schemeClr val="accent1"/>
+          </a:effectRef>
+          <a:fontRef idx="minor">
+            <a:schemeClr val="tx1"/>
+          </a:fontRef>
+        </p:style>
+      </p:cxnSp>
+      <p:cxnSp>
+        <p:nvCxnSpPr>
+          <p:cNvPr id="67" name="Straight Connector 66"/>
+          <p:cNvCxnSpPr/>
+          <p:nvPr/>
+        </p:nvCxnSpPr>
+        <p:spPr>
+          <a:xfrm flipV="1">
+            <a:off x="7340249" y="4758906"/>
+            <a:ext cx="471340" cy="471339"/>
+          </a:xfrm>
+          <a:prstGeom prst="line">
+            <a:avLst/>
+          </a:prstGeom>
+          <a:ln w="50800">
+            <a:solidFill>
+              <a:schemeClr val="tx1"/>
+            </a:solidFill>
+          </a:ln>
+        </p:spPr>
+        <p:style>
+          <a:lnRef idx="1">
+            <a:schemeClr val="accent1"/>
+          </a:lnRef>
+          <a:fillRef idx="0">
+            <a:schemeClr val="accent1"/>
+          </a:fillRef>
+          <a:effectRef idx="0">
+            <a:schemeClr val="accent1"/>
+          </a:effectRef>
+          <a:fontRef idx="minor">
+            <a:schemeClr val="tx1"/>
+          </a:fontRef>
+        </p:style>
+      </p:cxnSp>
+      <p:cxnSp>
+        <p:nvCxnSpPr>
+          <p:cNvPr id="68" name="Straight Connector 67"/>
+          <p:cNvCxnSpPr/>
+          <p:nvPr/>
+        </p:nvCxnSpPr>
+        <p:spPr>
+          <a:xfrm flipV="1">
+            <a:off x="8744545" y="4758906"/>
+            <a:ext cx="471340" cy="471339"/>
+          </a:xfrm>
+          <a:prstGeom prst="line">
+            <a:avLst/>
+          </a:prstGeom>
+          <a:ln w="50800">
+            <a:solidFill>
+              <a:schemeClr val="tx1"/>
+            </a:solidFill>
+          </a:ln>
+        </p:spPr>
+        <p:style>
+          <a:lnRef idx="1">
+            <a:schemeClr val="accent1"/>
+          </a:lnRef>
+          <a:fillRef idx="0">
+            <a:schemeClr val="accent1"/>
+          </a:fillRef>
+          <a:effectRef idx="0">
+            <a:schemeClr val="accent1"/>
+          </a:effectRef>
+          <a:fontRef idx="minor">
+            <a:schemeClr val="tx1"/>
+          </a:fontRef>
+        </p:style>
+      </p:cxnSp>
+    </p:spTree>
+    <p:extLst>
+      <p:ext uri="{BB962C8B-B14F-4D97-AF65-F5344CB8AC3E}">
+        <p14:creationId xmlns:p14="http://schemas.microsoft.com/office/powerpoint/2010/main" val="753345598"/>
+      </p:ext>
+    </p:extLst>
+  </p:cSld>
+  <p:clrMapOvr>
+    <a:masterClrMapping/>
+  </p:clrMapOvr>
+</p:sld>
+</file>
+
+<file path=ppt/slides/slide8.xml><?xml version="1.0" encoding="utf-8"?>
+<p:sld xmlns:a="http://schemas.openxmlformats.org/drawingml/2006/main" xmlns:r="http://schemas.openxmlformats.org/officeDocument/2006/relationships" xmlns:p="http://schemas.openxmlformats.org/presentationml/2006/main">
+  <p:cSld>
+    <p:spTree>
+      <p:nvGrpSpPr>
+        <p:cNvPr id="1" name=""/>
+        <p:cNvGrpSpPr/>
+        <p:nvPr/>
+      </p:nvGrpSpPr>
+      <p:grpSpPr>
+        <a:xfrm>
+          <a:off x="0" y="0"/>
+          <a:ext cx="0" cy="0"/>
+          <a:chOff x="0" y="0"/>
+          <a:chExt cx="0" cy="0"/>
+        </a:xfrm>
+      </p:grpSpPr>
+      <p:cxnSp>
+        <p:nvCxnSpPr>
+          <p:cNvPr id="23" name="Straight Connector 22"/>
+          <p:cNvCxnSpPr/>
+          <p:nvPr/>
+        </p:nvCxnSpPr>
+        <p:spPr>
+          <a:xfrm flipV="1">
+            <a:off x="477481" y="2119588"/>
+            <a:ext cx="1609128" cy="1609127"/>
+          </a:xfrm>
+          <a:prstGeom prst="line">
+            <a:avLst/>
+          </a:prstGeom>
+          <a:ln w="50800">
+            <a:solidFill>
+              <a:schemeClr val="tx1"/>
+            </a:solidFill>
+          </a:ln>
+        </p:spPr>
+        <p:style>
+          <a:lnRef idx="1">
+            <a:schemeClr val="accent1"/>
+          </a:lnRef>
+          <a:fillRef idx="0">
+            <a:schemeClr val="accent1"/>
+          </a:fillRef>
+          <a:effectRef idx="0">
+            <a:schemeClr val="accent1"/>
+          </a:effectRef>
+          <a:fontRef idx="minor">
+            <a:schemeClr val="tx1"/>
+          </a:fontRef>
+        </p:style>
+      </p:cxnSp>
+      <p:cxnSp>
+        <p:nvCxnSpPr>
+          <p:cNvPr id="24" name="Straight Connector 23"/>
+          <p:cNvCxnSpPr/>
+          <p:nvPr/>
+        </p:nvCxnSpPr>
+        <p:spPr>
+          <a:xfrm>
+            <a:off x="2086609" y="2119587"/>
+            <a:ext cx="1610526" cy="1610526"/>
+          </a:xfrm>
+          <a:prstGeom prst="line">
+            <a:avLst/>
+          </a:prstGeom>
+          <a:ln w="50800">
+            <a:solidFill>
+              <a:schemeClr val="tx1"/>
+            </a:solidFill>
+          </a:ln>
+        </p:spPr>
+        <p:style>
+          <a:lnRef idx="1">
+            <a:schemeClr val="accent1"/>
+          </a:lnRef>
+          <a:fillRef idx="0">
+            <a:schemeClr val="accent1"/>
+          </a:fillRef>
+          <a:effectRef idx="0">
+            <a:schemeClr val="accent1"/>
+          </a:effectRef>
+          <a:fontRef idx="minor">
+            <a:schemeClr val="tx1"/>
+          </a:fontRef>
+        </p:style>
+      </p:cxnSp>
+      <p:cxnSp>
+        <p:nvCxnSpPr>
+          <p:cNvPr id="25" name="Straight Connector 24"/>
+          <p:cNvCxnSpPr/>
+          <p:nvPr/>
+        </p:nvCxnSpPr>
+        <p:spPr>
+          <a:xfrm flipV="1">
+            <a:off x="2905975" y="3330390"/>
+            <a:ext cx="403515" cy="403515"/>
+          </a:xfrm>
+          <a:prstGeom prst="line">
+            <a:avLst/>
+          </a:prstGeom>
+          <a:ln w="50800">
+            <a:solidFill>
+              <a:schemeClr val="tx1"/>
+            </a:solidFill>
+          </a:ln>
+        </p:spPr>
+        <p:style>
+          <a:lnRef idx="1">
+            <a:schemeClr val="accent1"/>
+          </a:lnRef>
+          <a:fillRef idx="0">
+            <a:schemeClr val="accent1"/>
+          </a:fillRef>
+          <a:effectRef idx="0">
+            <a:schemeClr val="accent1"/>
+          </a:effectRef>
+          <a:fontRef idx="minor">
+            <a:schemeClr val="tx1"/>
+          </a:fontRef>
+        </p:style>
+      </p:cxnSp>
+      <p:cxnSp>
+        <p:nvCxnSpPr>
+          <p:cNvPr id="27" name="Straight Connector 26"/>
+          <p:cNvCxnSpPr/>
+          <p:nvPr/>
+        </p:nvCxnSpPr>
+        <p:spPr>
+          <a:xfrm flipV="1">
+            <a:off x="1162133" y="2450306"/>
+            <a:ext cx="1275647" cy="1275644"/>
+          </a:xfrm>
+          <a:prstGeom prst="line">
+            <a:avLst/>
+          </a:prstGeom>
+          <a:ln w="50800">
+            <a:solidFill>
+              <a:schemeClr val="tx1"/>
+            </a:solidFill>
+          </a:ln>
+        </p:spPr>
+        <p:style>
+          <a:lnRef idx="1">
+            <a:schemeClr val="accent1"/>
+          </a:lnRef>
+          <a:fillRef idx="0">
+            <a:schemeClr val="accent1"/>
+          </a:fillRef>
+          <a:effectRef idx="0">
+            <a:schemeClr val="accent1"/>
+          </a:effectRef>
+          <a:fontRef idx="minor">
+            <a:schemeClr val="tx1"/>
+          </a:fontRef>
+        </p:style>
+      </p:cxnSp>
+      <p:cxnSp>
+        <p:nvCxnSpPr>
+          <p:cNvPr id="28" name="Straight Connector 27"/>
+          <p:cNvCxnSpPr/>
+          <p:nvPr/>
+        </p:nvCxnSpPr>
+        <p:spPr>
+          <a:xfrm>
+            <a:off x="1883468" y="3010225"/>
+            <a:ext cx="715725" cy="715725"/>
+          </a:xfrm>
+          <a:prstGeom prst="line">
+            <a:avLst/>
+          </a:prstGeom>
+          <a:ln w="50800">
+            <a:solidFill>
+              <a:schemeClr val="tx1"/>
+            </a:solidFill>
+          </a:ln>
+        </p:spPr>
+        <p:style>
+          <a:lnRef idx="1">
+            <a:schemeClr val="accent1"/>
+          </a:lnRef>
+          <a:fillRef idx="0">
+            <a:schemeClr val="accent1"/>
+          </a:fillRef>
+          <a:effectRef idx="0">
+            <a:schemeClr val="accent1"/>
+          </a:effectRef>
+          <a:fontRef idx="minor">
+            <a:schemeClr val="tx1"/>
+          </a:fontRef>
+        </p:style>
+      </p:cxnSp>
+      <mc:AlternateContent xmlns:mc="http://schemas.openxmlformats.org/markup-compatibility/2006">
+        <mc:Choice xmlns:a14="http://schemas.microsoft.com/office/drawing/2010/main" Requires="a14">
+          <p:sp>
+            <p:nvSpPr>
+              <p:cNvPr id="5" name="TextBox 4"/>
+              <p:cNvSpPr txBox="1"/>
+              <p:nvPr/>
+            </p:nvSpPr>
+            <p:spPr>
+              <a:xfrm>
+                <a:off x="2338385" y="2510148"/>
+                <a:ext cx="183320" cy="276999"/>
+              </a:xfrm>
+              <a:prstGeom prst="rect">
+                <a:avLst/>
+              </a:prstGeom>
+              <a:noFill/>
+            </p:spPr>
+            <p:txBody>
+              <a:bodyPr wrap="none" lIns="0" tIns="0" rIns="0" bIns="0" rtlCol="0">
+                <a:spAutoFit/>
+              </a:bodyPr>
+              <a:lstStyle/>
+              <a:p>
+                <a:pPr/>
+                <a14:m>
+                  <m:oMathPara xmlns:m="http://schemas.openxmlformats.org/officeDocument/2006/math">
+                    <m:oMathParaPr>
+                      <m:jc m:val="center"/>
+                    </m:oMathParaPr>
+                    <m:oMath xmlns:m="http://schemas.openxmlformats.org/officeDocument/2006/math">
+                      <m:r>
+                        <a:rPr lang="en-US" b="0" i="1" smtClean="0">
+                          <a:latin typeface="Cambria Math" charset="0"/>
+                        </a:rPr>
+                        <m:t>𝑥</m:t>
+                      </m:r>
+                    </m:oMath>
+                  </m:oMathPara>
+                </a14:m>
+                <a:endParaRPr lang="en-US" dirty="0"/>
+              </a:p>
+            </p:txBody>
+          </p:sp>
+        </mc:Choice>
+        <mc:Fallback>
+          <p:sp>
+            <p:nvSpPr>
+              <p:cNvPr id="5" name="TextBox 4"/>
+              <p:cNvSpPr txBox="1">
+                <a:spLocks noRot="1" noChangeAspect="1" noMove="1" noResize="1" noEditPoints="1" noAdjustHandles="1" noChangeArrowheads="1" noChangeShapeType="1" noTextEdit="1"/>
+              </p:cNvSpPr>
+              <p:nvPr/>
+            </p:nvSpPr>
+            <p:spPr>
+              <a:xfrm>
+                <a:off x="2338385" y="2510148"/>
+                <a:ext cx="183320" cy="276999"/>
+              </a:xfrm>
+              <a:prstGeom prst="rect">
+                <a:avLst/>
+              </a:prstGeom>
+              <a:blipFill rotWithShape="0">
+                <a:blip r:embed="rId2"/>
+                <a:stretch>
+                  <a:fillRect l="-20000" r="-10000"/>
+                </a:stretch>
+              </a:blipFill>
+            </p:spPr>
+            <p:txBody>
+              <a:bodyPr/>
+              <a:lstStyle/>
+              <a:p>
+                <a:r>
+                  <a:rPr lang="en-US">
+                    <a:noFill/>
+                  </a:rPr>
+                  <a:t> </a:t>
+                </a:r>
+              </a:p>
+            </p:txBody>
+          </p:sp>
+        </mc:Fallback>
+      </mc:AlternateContent>
+      <mc:AlternateContent xmlns:mc="http://schemas.openxmlformats.org/markup-compatibility/2006">
+        <mc:Choice xmlns:a14="http://schemas.microsoft.com/office/drawing/2010/main" Requires="a14">
+          <p:sp>
+            <p:nvSpPr>
+              <p:cNvPr id="32" name="TextBox 31"/>
+              <p:cNvSpPr txBox="1"/>
+              <p:nvPr/>
+            </p:nvSpPr>
+            <p:spPr>
+              <a:xfrm>
+                <a:off x="1780278" y="3047110"/>
+                <a:ext cx="186718" cy="276999"/>
+              </a:xfrm>
+              <a:prstGeom prst="rect">
+                <a:avLst/>
+              </a:prstGeom>
+              <a:noFill/>
+            </p:spPr>
+            <p:txBody>
+              <a:bodyPr wrap="none" lIns="0" tIns="0" rIns="0" bIns="0" rtlCol="0">
+                <a:spAutoFit/>
+              </a:bodyPr>
+              <a:lstStyle/>
+              <a:p>
+                <a:pPr/>
+                <a14:m>
+                  <m:oMathPara xmlns:m="http://schemas.openxmlformats.org/officeDocument/2006/math">
+                    <m:oMathParaPr>
+                      <m:jc m:val="center"/>
+                    </m:oMathParaPr>
+                    <m:oMath xmlns:m="http://schemas.openxmlformats.org/officeDocument/2006/math">
+                      <m:r>
+                        <a:rPr lang="en-US" b="0" i="1" smtClean="0">
+                          <a:latin typeface="Cambria Math" charset="0"/>
+                        </a:rPr>
+                        <m:t>𝑦</m:t>
+                      </m:r>
+                    </m:oMath>
+                  </m:oMathPara>
+                </a14:m>
+                <a:endParaRPr lang="en-US" dirty="0"/>
+              </a:p>
+            </p:txBody>
+          </p:sp>
+        </mc:Choice>
+        <mc:Fallback>
+          <p:sp>
+            <p:nvSpPr>
+              <p:cNvPr id="32" name="TextBox 31"/>
+              <p:cNvSpPr txBox="1">
+                <a:spLocks noRot="1" noChangeAspect="1" noMove="1" noResize="1" noEditPoints="1" noAdjustHandles="1" noChangeArrowheads="1" noChangeShapeType="1" noTextEdit="1"/>
+              </p:cNvSpPr>
+              <p:nvPr/>
+            </p:nvSpPr>
+            <p:spPr>
+              <a:xfrm>
+                <a:off x="1780278" y="3047110"/>
+                <a:ext cx="186718" cy="276999"/>
+              </a:xfrm>
+              <a:prstGeom prst="rect">
+                <a:avLst/>
+              </a:prstGeom>
+              <a:blipFill rotWithShape="0">
+                <a:blip r:embed="rId3"/>
+                <a:stretch>
+                  <a:fillRect l="-29032" r="-25806" b="-24444"/>
+                </a:stretch>
+              </a:blipFill>
+            </p:spPr>
+            <p:txBody>
+              <a:bodyPr/>
+              <a:lstStyle/>
+              <a:p>
+                <a:r>
+                  <a:rPr lang="en-US">
+                    <a:noFill/>
+                  </a:rPr>
+                  <a:t> </a:t>
+                </a:r>
+              </a:p>
+            </p:txBody>
+          </p:sp>
+        </mc:Fallback>
+      </mc:AlternateContent>
+      <mc:AlternateContent xmlns:mc="http://schemas.openxmlformats.org/markup-compatibility/2006">
+        <mc:Choice xmlns:a14="http://schemas.microsoft.com/office/drawing/2010/main" Requires="a14">
+          <p:sp>
+            <p:nvSpPr>
+              <p:cNvPr id="34" name="TextBox 33"/>
+              <p:cNvSpPr txBox="1"/>
+              <p:nvPr/>
+            </p:nvSpPr>
+            <p:spPr>
+              <a:xfrm>
+                <a:off x="3219857" y="3368087"/>
+                <a:ext cx="169085" cy="276999"/>
+              </a:xfrm>
+              <a:prstGeom prst="rect">
+                <a:avLst/>
+              </a:prstGeom>
+              <a:noFill/>
+            </p:spPr>
+            <p:txBody>
+              <a:bodyPr wrap="none" lIns="0" tIns="0" rIns="0" bIns="0" rtlCol="0">
+                <a:spAutoFit/>
+              </a:bodyPr>
+              <a:lstStyle/>
+              <a:p>
+                <a:pPr/>
+                <a14:m>
+                  <m:oMathPara xmlns:m="http://schemas.openxmlformats.org/officeDocument/2006/math">
+                    <m:oMathParaPr>
+                      <m:jc m:val="center"/>
+                    </m:oMathParaPr>
+                    <m:oMath xmlns:m="http://schemas.openxmlformats.org/officeDocument/2006/math">
+                      <m:r>
+                        <a:rPr lang="en-US" b="0" i="1" smtClean="0">
+                          <a:latin typeface="Cambria Math" charset="0"/>
+                        </a:rPr>
+                        <m:t>𝑧</m:t>
+                      </m:r>
+                    </m:oMath>
+                  </m:oMathPara>
+                </a14:m>
+                <a:endParaRPr lang="en-US" dirty="0"/>
+              </a:p>
+            </p:txBody>
+          </p:sp>
+        </mc:Choice>
+        <mc:Fallback>
+          <p:sp>
+            <p:nvSpPr>
+              <p:cNvPr id="34" name="TextBox 33"/>
+              <p:cNvSpPr txBox="1">
+                <a:spLocks noRot="1" noChangeAspect="1" noMove="1" noResize="1" noEditPoints="1" noAdjustHandles="1" noChangeArrowheads="1" noChangeShapeType="1" noTextEdit="1"/>
+              </p:cNvSpPr>
+              <p:nvPr/>
+            </p:nvSpPr>
+            <p:spPr>
+              <a:xfrm>
+                <a:off x="3219857" y="3368087"/>
+                <a:ext cx="169085" cy="276999"/>
+              </a:xfrm>
+              <a:prstGeom prst="rect">
+                <a:avLst/>
+              </a:prstGeom>
+              <a:blipFill rotWithShape="0">
+                <a:blip r:embed="rId4"/>
+                <a:stretch>
+                  <a:fillRect l="-17857" r="-14286"/>
+                </a:stretch>
+              </a:blipFill>
+            </p:spPr>
+            <p:txBody>
+              <a:bodyPr/>
+              <a:lstStyle/>
+              <a:p>
+                <a:r>
+                  <a:rPr lang="en-US">
+                    <a:noFill/>
+                  </a:rPr>
+                  <a:t> </a:t>
+                </a:r>
+              </a:p>
+            </p:txBody>
+          </p:sp>
+        </mc:Fallback>
+      </mc:AlternateContent>
+      <p:cxnSp>
+        <p:nvCxnSpPr>
+          <p:cNvPr id="53" name="Straight Connector 52"/>
+          <p:cNvCxnSpPr/>
+          <p:nvPr/>
+        </p:nvCxnSpPr>
+        <p:spPr>
+          <a:xfrm flipV="1">
+            <a:off x="4470664" y="2122353"/>
+            <a:ext cx="1609128" cy="1609127"/>
+          </a:xfrm>
+          <a:prstGeom prst="line">
+            <a:avLst/>
+          </a:prstGeom>
+          <a:ln w="50800">
+            <a:solidFill>
+              <a:schemeClr val="tx1"/>
+            </a:solidFill>
+          </a:ln>
+        </p:spPr>
+        <p:style>
+          <a:lnRef idx="1">
+            <a:schemeClr val="accent1"/>
+          </a:lnRef>
+          <a:fillRef idx="0">
+            <a:schemeClr val="accent1"/>
+          </a:fillRef>
+          <a:effectRef idx="0">
+            <a:schemeClr val="accent1"/>
+          </a:effectRef>
+          <a:fontRef idx="minor">
+            <a:schemeClr val="tx1"/>
+          </a:fontRef>
+        </p:style>
+      </p:cxnSp>
+      <p:cxnSp>
+        <p:nvCxnSpPr>
+          <p:cNvPr id="58" name="Straight Connector 57"/>
+          <p:cNvCxnSpPr/>
+          <p:nvPr/>
+        </p:nvCxnSpPr>
+        <p:spPr>
+          <a:xfrm>
+            <a:off x="6079792" y="2122352"/>
+            <a:ext cx="1610526" cy="1610526"/>
+          </a:xfrm>
+          <a:prstGeom prst="line">
+            <a:avLst/>
+          </a:prstGeom>
+          <a:ln w="50800">
+            <a:solidFill>
+              <a:schemeClr val="tx1"/>
+            </a:solidFill>
+          </a:ln>
+        </p:spPr>
+        <p:style>
+          <a:lnRef idx="1">
+            <a:schemeClr val="accent1"/>
+          </a:lnRef>
+          <a:fillRef idx="0">
+            <a:schemeClr val="accent1"/>
+          </a:fillRef>
+          <a:effectRef idx="0">
+            <a:schemeClr val="accent1"/>
+          </a:effectRef>
+          <a:fontRef idx="minor">
+            <a:schemeClr val="tx1"/>
+          </a:fontRef>
+        </p:style>
+      </p:cxnSp>
+      <p:cxnSp>
+        <p:nvCxnSpPr>
+          <p:cNvPr id="59" name="Straight Connector 58"/>
+          <p:cNvCxnSpPr/>
+          <p:nvPr/>
+        </p:nvCxnSpPr>
+        <p:spPr>
+          <a:xfrm flipV="1">
+            <a:off x="6229578" y="3010226"/>
+            <a:ext cx="718998" cy="718997"/>
+          </a:xfrm>
+          <a:prstGeom prst="line">
+            <a:avLst/>
+          </a:prstGeom>
+          <a:ln w="50800">
+            <a:solidFill>
+              <a:schemeClr val="tx1"/>
+            </a:solidFill>
+          </a:ln>
+        </p:spPr>
+        <p:style>
+          <a:lnRef idx="1">
+            <a:schemeClr val="accent1"/>
+          </a:lnRef>
+          <a:fillRef idx="0">
+            <a:schemeClr val="accent1"/>
+          </a:fillRef>
+          <a:effectRef idx="0">
+            <a:schemeClr val="accent1"/>
+          </a:effectRef>
+          <a:fontRef idx="minor">
+            <a:schemeClr val="tx1"/>
+          </a:fontRef>
+        </p:style>
+      </p:cxnSp>
+      <p:cxnSp>
+        <p:nvCxnSpPr>
+          <p:cNvPr id="60" name="Straight Connector 59"/>
+          <p:cNvCxnSpPr/>
+          <p:nvPr/>
+        </p:nvCxnSpPr>
+        <p:spPr>
+          <a:xfrm flipV="1">
+            <a:off x="5155316" y="2453071"/>
+            <a:ext cx="1275647" cy="1275644"/>
+          </a:xfrm>
+          <a:prstGeom prst="line">
+            <a:avLst/>
+          </a:prstGeom>
+          <a:ln w="50800">
+            <a:solidFill>
+              <a:schemeClr val="tx1"/>
+            </a:solidFill>
+          </a:ln>
+        </p:spPr>
+        <p:style>
+          <a:lnRef idx="1">
+            <a:schemeClr val="accent1"/>
+          </a:lnRef>
+          <a:fillRef idx="0">
+            <a:schemeClr val="accent1"/>
+          </a:fillRef>
+          <a:effectRef idx="0">
+            <a:schemeClr val="accent1"/>
+          </a:effectRef>
+          <a:fontRef idx="minor">
+            <a:schemeClr val="tx1"/>
+          </a:fontRef>
+        </p:style>
+      </p:cxnSp>
+      <p:cxnSp>
+        <p:nvCxnSpPr>
+          <p:cNvPr id="61" name="Straight Connector 60"/>
+          <p:cNvCxnSpPr/>
+          <p:nvPr/>
+        </p:nvCxnSpPr>
+        <p:spPr>
+          <a:xfrm>
+            <a:off x="5566952" y="3299294"/>
+            <a:ext cx="428915" cy="428915"/>
+          </a:xfrm>
+          <a:prstGeom prst="line">
+            <a:avLst/>
+          </a:prstGeom>
+          <a:ln w="50800">
+            <a:solidFill>
+              <a:schemeClr val="tx1"/>
+            </a:solidFill>
+          </a:ln>
+        </p:spPr>
+        <p:style>
+          <a:lnRef idx="1">
+            <a:schemeClr val="accent1"/>
+          </a:lnRef>
+          <a:fillRef idx="0">
+            <a:schemeClr val="accent1"/>
+          </a:fillRef>
+          <a:effectRef idx="0">
+            <a:schemeClr val="accent1"/>
+          </a:effectRef>
+          <a:fontRef idx="minor">
+            <a:schemeClr val="tx1"/>
+          </a:fontRef>
+        </p:style>
+      </p:cxnSp>
+      <mc:AlternateContent xmlns:mc="http://schemas.openxmlformats.org/markup-compatibility/2006">
+        <mc:Choice xmlns:a14="http://schemas.microsoft.com/office/drawing/2010/main" Requires="a14">
+          <p:sp>
+            <p:nvSpPr>
+              <p:cNvPr id="62" name="TextBox 61"/>
+              <p:cNvSpPr txBox="1"/>
+              <p:nvPr/>
+            </p:nvSpPr>
+            <p:spPr>
+              <a:xfrm>
+                <a:off x="6331568" y="2512913"/>
+                <a:ext cx="183320" cy="276999"/>
+              </a:xfrm>
+              <a:prstGeom prst="rect">
+                <a:avLst/>
+              </a:prstGeom>
+              <a:noFill/>
+            </p:spPr>
+            <p:txBody>
+              <a:bodyPr wrap="none" lIns="0" tIns="0" rIns="0" bIns="0" rtlCol="0">
+                <a:spAutoFit/>
+              </a:bodyPr>
+              <a:lstStyle/>
+              <a:p>
+                <a:pPr/>
+                <a14:m>
+                  <m:oMathPara xmlns:m="http://schemas.openxmlformats.org/officeDocument/2006/math">
+                    <m:oMathParaPr>
+                      <m:jc m:val="center"/>
+                    </m:oMathParaPr>
+                    <m:oMath xmlns:m="http://schemas.openxmlformats.org/officeDocument/2006/math">
+                      <m:r>
+                        <a:rPr lang="en-US" b="0" i="1" smtClean="0">
+                          <a:latin typeface="Cambria Math" charset="0"/>
+                        </a:rPr>
+                        <m:t>𝑥</m:t>
+                      </m:r>
+                    </m:oMath>
+                  </m:oMathPara>
+                </a14:m>
+                <a:endParaRPr lang="en-US" dirty="0"/>
+              </a:p>
+            </p:txBody>
+          </p:sp>
+        </mc:Choice>
+        <mc:Fallback>
+          <p:sp>
+            <p:nvSpPr>
+              <p:cNvPr id="62" name="TextBox 61"/>
+              <p:cNvSpPr txBox="1">
+                <a:spLocks noRot="1" noChangeAspect="1" noMove="1" noResize="1" noEditPoints="1" noAdjustHandles="1" noChangeArrowheads="1" noChangeShapeType="1" noTextEdit="1"/>
+              </p:cNvSpPr>
+              <p:nvPr/>
+            </p:nvSpPr>
+            <p:spPr>
+              <a:xfrm>
+                <a:off x="6331568" y="2512913"/>
+                <a:ext cx="183320" cy="276999"/>
+              </a:xfrm>
+              <a:prstGeom prst="rect">
+                <a:avLst/>
+              </a:prstGeom>
+              <a:blipFill rotWithShape="0">
+                <a:blip r:embed="rId5"/>
+                <a:stretch>
+                  <a:fillRect l="-20000" r="-10000"/>
+                </a:stretch>
+              </a:blipFill>
+            </p:spPr>
+            <p:txBody>
+              <a:bodyPr/>
+              <a:lstStyle/>
+              <a:p>
+                <a:r>
+                  <a:rPr lang="en-US">
+                    <a:noFill/>
+                  </a:rPr>
+                  <a:t> </a:t>
+                </a:r>
+              </a:p>
+            </p:txBody>
+          </p:sp>
+        </mc:Fallback>
+      </mc:AlternateContent>
+      <mc:AlternateContent xmlns:mc="http://schemas.openxmlformats.org/markup-compatibility/2006">
+        <mc:Choice xmlns:a14="http://schemas.microsoft.com/office/drawing/2010/main" Requires="a14">
+          <p:sp>
+            <p:nvSpPr>
+              <p:cNvPr id="63" name="TextBox 62"/>
+              <p:cNvSpPr txBox="1"/>
+              <p:nvPr/>
+            </p:nvSpPr>
+            <p:spPr>
+              <a:xfrm>
+                <a:off x="5481978" y="3368086"/>
+                <a:ext cx="186718" cy="276999"/>
+              </a:xfrm>
+              <a:prstGeom prst="rect">
+                <a:avLst/>
+              </a:prstGeom>
+              <a:noFill/>
+            </p:spPr>
+            <p:txBody>
+              <a:bodyPr wrap="none" lIns="0" tIns="0" rIns="0" bIns="0" rtlCol="0">
+                <a:spAutoFit/>
+              </a:bodyPr>
+              <a:lstStyle/>
+              <a:p>
+                <a:pPr/>
+                <a14:m>
+                  <m:oMathPara xmlns:m="http://schemas.openxmlformats.org/officeDocument/2006/math">
+                    <m:oMathParaPr>
+                      <m:jc m:val="center"/>
+                    </m:oMathParaPr>
+                    <m:oMath xmlns:m="http://schemas.openxmlformats.org/officeDocument/2006/math">
+                      <m:r>
+                        <a:rPr lang="en-US" b="0" i="1" smtClean="0">
+                          <a:latin typeface="Cambria Math" charset="0"/>
+                        </a:rPr>
+                        <m:t>𝑦</m:t>
+                      </m:r>
+                    </m:oMath>
+                  </m:oMathPara>
+                </a14:m>
+                <a:endParaRPr lang="en-US" dirty="0"/>
+              </a:p>
+            </p:txBody>
+          </p:sp>
+        </mc:Choice>
+        <mc:Fallback>
+          <p:sp>
+            <p:nvSpPr>
+              <p:cNvPr id="63" name="TextBox 62"/>
+              <p:cNvSpPr txBox="1">
+                <a:spLocks noRot="1" noChangeAspect="1" noMove="1" noResize="1" noEditPoints="1" noAdjustHandles="1" noChangeArrowheads="1" noChangeShapeType="1" noTextEdit="1"/>
+              </p:cNvSpPr>
+              <p:nvPr/>
+            </p:nvSpPr>
+            <p:spPr>
+              <a:xfrm>
+                <a:off x="5481978" y="3368086"/>
+                <a:ext cx="186718" cy="276999"/>
+              </a:xfrm>
+              <a:prstGeom prst="rect">
+                <a:avLst/>
+              </a:prstGeom>
+              <a:blipFill rotWithShape="0">
+                <a:blip r:embed="rId3"/>
+                <a:stretch>
+                  <a:fillRect l="-29032" r="-25806" b="-24444"/>
+                </a:stretch>
+              </a:blipFill>
+            </p:spPr>
+            <p:txBody>
+              <a:bodyPr/>
+              <a:lstStyle/>
+              <a:p>
+                <a:r>
+                  <a:rPr lang="en-US">
+                    <a:noFill/>
+                  </a:rPr>
+                  <a:t> </a:t>
+                </a:r>
+              </a:p>
+            </p:txBody>
+          </p:sp>
+        </mc:Fallback>
+      </mc:AlternateContent>
+      <mc:AlternateContent xmlns:mc="http://schemas.openxmlformats.org/markup-compatibility/2006">
+        <mc:Choice xmlns:a14="http://schemas.microsoft.com/office/drawing/2010/main" Requires="a14">
+          <p:sp>
+            <p:nvSpPr>
+              <p:cNvPr id="64" name="TextBox 63"/>
+              <p:cNvSpPr txBox="1"/>
+              <p:nvPr/>
+            </p:nvSpPr>
+            <p:spPr>
+              <a:xfrm>
+                <a:off x="6878261" y="3040876"/>
+                <a:ext cx="169085" cy="276999"/>
+              </a:xfrm>
+              <a:prstGeom prst="rect">
+                <a:avLst/>
+              </a:prstGeom>
+              <a:noFill/>
+            </p:spPr>
+            <p:txBody>
+              <a:bodyPr wrap="none" lIns="0" tIns="0" rIns="0" bIns="0" rtlCol="0">
+                <a:spAutoFit/>
+              </a:bodyPr>
+              <a:lstStyle/>
+              <a:p>
+                <a:pPr/>
+                <a14:m>
+                  <m:oMathPara xmlns:m="http://schemas.openxmlformats.org/officeDocument/2006/math">
+                    <m:oMathParaPr>
+                      <m:jc m:val="center"/>
+                    </m:oMathParaPr>
+                    <m:oMath xmlns:m="http://schemas.openxmlformats.org/officeDocument/2006/math">
+                      <m:r>
+                        <a:rPr lang="en-US" b="0" i="1" smtClean="0">
+                          <a:latin typeface="Cambria Math" charset="0"/>
+                        </a:rPr>
+                        <m:t>𝑧</m:t>
+                      </m:r>
+                    </m:oMath>
+                  </m:oMathPara>
+                </a14:m>
+                <a:endParaRPr lang="en-US" dirty="0"/>
+              </a:p>
+            </p:txBody>
+          </p:sp>
+        </mc:Choice>
+        <mc:Fallback>
+          <p:sp>
+            <p:nvSpPr>
+              <p:cNvPr id="64" name="TextBox 63"/>
+              <p:cNvSpPr txBox="1">
+                <a:spLocks noRot="1" noChangeAspect="1" noMove="1" noResize="1" noEditPoints="1" noAdjustHandles="1" noChangeArrowheads="1" noChangeShapeType="1" noTextEdit="1"/>
+              </p:cNvSpPr>
+              <p:nvPr/>
+            </p:nvSpPr>
+            <p:spPr>
+              <a:xfrm>
+                <a:off x="6878261" y="3040876"/>
+                <a:ext cx="169085" cy="276999"/>
+              </a:xfrm>
+              <a:prstGeom prst="rect">
+                <a:avLst/>
+              </a:prstGeom>
+              <a:blipFill rotWithShape="0">
+                <a:blip r:embed="rId4"/>
+                <a:stretch>
+                  <a:fillRect l="-17857" r="-14286"/>
+                </a:stretch>
+              </a:blipFill>
+            </p:spPr>
+            <p:txBody>
+              <a:bodyPr/>
+              <a:lstStyle/>
+              <a:p>
+                <a:r>
+                  <a:rPr lang="en-US">
+                    <a:noFill/>
+                  </a:rPr>
+                  <a:t> </a:t>
+                </a:r>
+              </a:p>
+            </p:txBody>
+          </p:sp>
+        </mc:Fallback>
+      </mc:AlternateContent>
+      <p:cxnSp>
+        <p:nvCxnSpPr>
+          <p:cNvPr id="65" name="Straight Connector 64"/>
+          <p:cNvCxnSpPr/>
+          <p:nvPr/>
+        </p:nvCxnSpPr>
+        <p:spPr>
+          <a:xfrm flipV="1">
+            <a:off x="8431310" y="2118561"/>
+            <a:ext cx="1609128" cy="1609127"/>
+          </a:xfrm>
+          <a:prstGeom prst="line">
+            <a:avLst/>
+          </a:prstGeom>
+          <a:ln w="50800">
+            <a:solidFill>
+              <a:schemeClr val="tx1"/>
+            </a:solidFill>
+          </a:ln>
+        </p:spPr>
+        <p:style>
+          <a:lnRef idx="1">
+            <a:schemeClr val="accent1"/>
+          </a:lnRef>
+          <a:fillRef idx="0">
+            <a:schemeClr val="accent1"/>
+          </a:fillRef>
+          <a:effectRef idx="0">
+            <a:schemeClr val="accent1"/>
+          </a:effectRef>
+          <a:fontRef idx="minor">
+            <a:schemeClr val="tx1"/>
+          </a:fontRef>
+        </p:style>
+      </p:cxnSp>
+      <p:cxnSp>
+        <p:nvCxnSpPr>
+          <p:cNvPr id="66" name="Straight Connector 65"/>
+          <p:cNvCxnSpPr/>
+          <p:nvPr/>
+        </p:nvCxnSpPr>
+        <p:spPr>
+          <a:xfrm>
+            <a:off x="10040438" y="2118560"/>
+            <a:ext cx="1610526" cy="1610526"/>
+          </a:xfrm>
+          <a:prstGeom prst="line">
+            <a:avLst/>
+          </a:prstGeom>
+          <a:ln w="50800">
+            <a:solidFill>
+              <a:schemeClr val="tx1"/>
+            </a:solidFill>
+          </a:ln>
+        </p:spPr>
+        <p:style>
+          <a:lnRef idx="1">
+            <a:schemeClr val="accent1"/>
+          </a:lnRef>
+          <a:fillRef idx="0">
+            <a:schemeClr val="accent1"/>
+          </a:fillRef>
+          <a:effectRef idx="0">
+            <a:schemeClr val="accent1"/>
+          </a:effectRef>
+          <a:fontRef idx="minor">
+            <a:schemeClr val="tx1"/>
+          </a:fontRef>
+        </p:style>
+      </p:cxnSp>
+      <p:cxnSp>
+        <p:nvCxnSpPr>
+          <p:cNvPr id="67" name="Straight Connector 66"/>
+          <p:cNvCxnSpPr/>
+          <p:nvPr/>
+        </p:nvCxnSpPr>
+        <p:spPr>
+          <a:xfrm flipV="1">
+            <a:off x="10859804" y="3329363"/>
+            <a:ext cx="403515" cy="403515"/>
+          </a:xfrm>
+          <a:prstGeom prst="line">
+            <a:avLst/>
+          </a:prstGeom>
+          <a:ln w="50800">
+            <a:solidFill>
+              <a:schemeClr val="tx1"/>
+            </a:solidFill>
+          </a:ln>
+        </p:spPr>
+        <p:style>
+          <a:lnRef idx="1">
+            <a:schemeClr val="accent1"/>
+          </a:lnRef>
+          <a:fillRef idx="0">
+            <a:schemeClr val="accent1"/>
+          </a:fillRef>
+          <a:effectRef idx="0">
+            <a:schemeClr val="accent1"/>
+          </a:effectRef>
+          <a:fontRef idx="minor">
+            <a:schemeClr val="tx1"/>
+          </a:fontRef>
+        </p:style>
+      </p:cxnSp>
+      <p:cxnSp>
+        <p:nvCxnSpPr>
+          <p:cNvPr id="68" name="Straight Connector 67"/>
+          <p:cNvCxnSpPr/>
+          <p:nvPr/>
+        </p:nvCxnSpPr>
+        <p:spPr>
+          <a:xfrm flipV="1">
+            <a:off x="9115962" y="2449279"/>
+            <a:ext cx="1275647" cy="1275644"/>
+          </a:xfrm>
+          <a:prstGeom prst="line">
+            <a:avLst/>
+          </a:prstGeom>
+          <a:ln w="50800">
+            <a:solidFill>
+              <a:schemeClr val="tx1"/>
+            </a:solidFill>
+          </a:ln>
+        </p:spPr>
+        <p:style>
+          <a:lnRef idx="1">
+            <a:schemeClr val="accent1"/>
+          </a:lnRef>
+          <a:fillRef idx="0">
+            <a:schemeClr val="accent1"/>
+          </a:fillRef>
+          <a:effectRef idx="0">
+            <a:schemeClr val="accent1"/>
+          </a:effectRef>
+          <a:fontRef idx="minor">
+            <a:schemeClr val="tx1"/>
+          </a:fontRef>
+        </p:style>
+      </p:cxnSp>
+      <p:cxnSp>
+        <p:nvCxnSpPr>
+          <p:cNvPr id="69" name="Straight Connector 68"/>
+          <p:cNvCxnSpPr/>
+          <p:nvPr/>
+        </p:nvCxnSpPr>
+        <p:spPr>
+          <a:xfrm>
+            <a:off x="9837297" y="3009198"/>
+            <a:ext cx="715725" cy="715725"/>
+          </a:xfrm>
+          <a:prstGeom prst="line">
+            <a:avLst/>
+          </a:prstGeom>
+          <a:ln w="50800">
+            <a:solidFill>
+              <a:schemeClr val="tx1"/>
+            </a:solidFill>
+          </a:ln>
+        </p:spPr>
+        <p:style>
+          <a:lnRef idx="1">
+            <a:schemeClr val="accent1"/>
+          </a:lnRef>
+          <a:fillRef idx="0">
+            <a:schemeClr val="accent1"/>
+          </a:fillRef>
+          <a:effectRef idx="0">
+            <a:schemeClr val="accent1"/>
+          </a:effectRef>
+          <a:fontRef idx="minor">
+            <a:schemeClr val="tx1"/>
+          </a:fontRef>
+        </p:style>
+      </p:cxnSp>
+      <mc:AlternateContent xmlns:mc="http://schemas.openxmlformats.org/markup-compatibility/2006">
+        <mc:Choice xmlns:a14="http://schemas.microsoft.com/office/drawing/2010/main" Requires="a14">
+          <p:sp>
+            <p:nvSpPr>
+              <p:cNvPr id="70" name="TextBox 69"/>
+              <p:cNvSpPr txBox="1"/>
+              <p:nvPr/>
+            </p:nvSpPr>
+            <p:spPr>
+              <a:xfrm>
+                <a:off x="10292214" y="2509121"/>
+                <a:ext cx="183320" cy="276999"/>
+              </a:xfrm>
+              <a:prstGeom prst="rect">
+                <a:avLst/>
+              </a:prstGeom>
+              <a:noFill/>
+            </p:spPr>
+            <p:txBody>
+              <a:bodyPr wrap="none" lIns="0" tIns="0" rIns="0" bIns="0" rtlCol="0">
+                <a:spAutoFit/>
+              </a:bodyPr>
+              <a:lstStyle/>
+              <a:p>
+                <a:pPr/>
+                <a14:m>
+                  <m:oMathPara xmlns:m="http://schemas.openxmlformats.org/officeDocument/2006/math">
+                    <m:oMathParaPr>
+                      <m:jc m:val="center"/>
+                    </m:oMathParaPr>
+                    <m:oMath xmlns:m="http://schemas.openxmlformats.org/officeDocument/2006/math">
+                      <m:r>
+                        <a:rPr lang="en-US" b="0" i="1" smtClean="0">
+                          <a:latin typeface="Cambria Math" charset="0"/>
+                        </a:rPr>
+                        <m:t>𝑥</m:t>
+                      </m:r>
+                    </m:oMath>
+                  </m:oMathPara>
+                </a14:m>
+                <a:endParaRPr lang="en-US" dirty="0"/>
+              </a:p>
+            </p:txBody>
+          </p:sp>
+        </mc:Choice>
+        <mc:Fallback>
+          <p:sp>
+            <p:nvSpPr>
+              <p:cNvPr id="70" name="TextBox 69"/>
+              <p:cNvSpPr txBox="1">
+                <a:spLocks noRot="1" noChangeAspect="1" noMove="1" noResize="1" noEditPoints="1" noAdjustHandles="1" noChangeArrowheads="1" noChangeShapeType="1" noTextEdit="1"/>
+              </p:cNvSpPr>
+              <p:nvPr/>
+            </p:nvSpPr>
+            <p:spPr>
+              <a:xfrm>
+                <a:off x="10292214" y="2509121"/>
+                <a:ext cx="183320" cy="276999"/>
+              </a:xfrm>
+              <a:prstGeom prst="rect">
+                <a:avLst/>
+              </a:prstGeom>
+              <a:blipFill rotWithShape="0">
+                <a:blip r:embed="rId2"/>
+                <a:stretch>
+                  <a:fillRect l="-16667" r="-13333"/>
+                </a:stretch>
+              </a:blipFill>
+            </p:spPr>
+            <p:txBody>
+              <a:bodyPr/>
+              <a:lstStyle/>
+              <a:p>
+                <a:r>
+                  <a:rPr lang="en-US">
+                    <a:noFill/>
+                  </a:rPr>
+                  <a:t> </a:t>
+                </a:r>
+              </a:p>
+            </p:txBody>
+          </p:sp>
+        </mc:Fallback>
+      </mc:AlternateContent>
+      <mc:AlternateContent xmlns:mc="http://schemas.openxmlformats.org/markup-compatibility/2006">
+        <mc:Choice xmlns:a14="http://schemas.microsoft.com/office/drawing/2010/main" Requires="a14">
+          <p:sp>
+            <p:nvSpPr>
+              <p:cNvPr id="71" name="TextBox 70"/>
+              <p:cNvSpPr txBox="1"/>
+              <p:nvPr/>
+            </p:nvSpPr>
+            <p:spPr>
+              <a:xfrm>
+                <a:off x="9734107" y="3046083"/>
+                <a:ext cx="169085" cy="276999"/>
+              </a:xfrm>
+              <a:prstGeom prst="rect">
+                <a:avLst/>
+              </a:prstGeom>
+              <a:noFill/>
+            </p:spPr>
+            <p:txBody>
+              <a:bodyPr wrap="none" lIns="0" tIns="0" rIns="0" bIns="0" rtlCol="0">
+                <a:spAutoFit/>
+              </a:bodyPr>
+              <a:lstStyle/>
+              <a:p>
+                <a:pPr/>
+                <a14:m>
+                  <m:oMathPara xmlns:m="http://schemas.openxmlformats.org/officeDocument/2006/math">
+                    <m:oMathParaPr>
+                      <m:jc m:val="center"/>
+                    </m:oMathParaPr>
+                    <m:oMath xmlns:m="http://schemas.openxmlformats.org/officeDocument/2006/math">
+                      <m:r>
+                        <a:rPr lang="en-US" b="0" i="1" smtClean="0">
+                          <a:latin typeface="Cambria Math" charset="0"/>
+                        </a:rPr>
+                        <m:t>𝑧</m:t>
+                      </m:r>
+                    </m:oMath>
+                  </m:oMathPara>
+                </a14:m>
+                <a:endParaRPr lang="en-US" dirty="0"/>
+              </a:p>
+            </p:txBody>
+          </p:sp>
+        </mc:Choice>
+        <mc:Fallback>
+          <p:sp>
+            <p:nvSpPr>
+              <p:cNvPr id="71" name="TextBox 70"/>
+              <p:cNvSpPr txBox="1">
+                <a:spLocks noRot="1" noChangeAspect="1" noMove="1" noResize="1" noEditPoints="1" noAdjustHandles="1" noChangeArrowheads="1" noChangeShapeType="1" noTextEdit="1"/>
+              </p:cNvSpPr>
+              <p:nvPr/>
+            </p:nvSpPr>
+            <p:spPr>
+              <a:xfrm>
+                <a:off x="9734107" y="3046083"/>
+                <a:ext cx="169085" cy="276999"/>
+              </a:xfrm>
+              <a:prstGeom prst="rect">
+                <a:avLst/>
+              </a:prstGeom>
+              <a:blipFill rotWithShape="0">
+                <a:blip r:embed="rId4"/>
+                <a:stretch>
+                  <a:fillRect l="-21429" r="-10714"/>
+                </a:stretch>
+              </a:blipFill>
+            </p:spPr>
+            <p:txBody>
+              <a:bodyPr/>
+              <a:lstStyle/>
+              <a:p>
+                <a:r>
+                  <a:rPr lang="en-US">
+                    <a:noFill/>
+                  </a:rPr>
+                  <a:t> </a:t>
+                </a:r>
+              </a:p>
+            </p:txBody>
+          </p:sp>
+        </mc:Fallback>
+      </mc:AlternateContent>
+      <mc:AlternateContent xmlns:mc="http://schemas.openxmlformats.org/markup-compatibility/2006">
+        <mc:Choice xmlns:a14="http://schemas.microsoft.com/office/drawing/2010/main" Requires="a14">
+          <p:sp>
+            <p:nvSpPr>
+              <p:cNvPr id="72" name="TextBox 71"/>
+              <p:cNvSpPr txBox="1"/>
+              <p:nvPr/>
+            </p:nvSpPr>
+            <p:spPr>
+              <a:xfrm>
+                <a:off x="11173686" y="3367060"/>
+                <a:ext cx="186718" cy="276999"/>
+              </a:xfrm>
+              <a:prstGeom prst="rect">
+                <a:avLst/>
+              </a:prstGeom>
+              <a:noFill/>
+            </p:spPr>
+            <p:txBody>
+              <a:bodyPr wrap="none" lIns="0" tIns="0" rIns="0" bIns="0" rtlCol="0">
+                <a:spAutoFit/>
+              </a:bodyPr>
+              <a:lstStyle/>
+              <a:p>
+                <a:pPr/>
+                <a14:m>
+                  <m:oMathPara xmlns:m="http://schemas.openxmlformats.org/officeDocument/2006/math">
+                    <m:oMathParaPr>
+                      <m:jc m:val="center"/>
+                    </m:oMathParaPr>
+                    <m:oMath xmlns:m="http://schemas.openxmlformats.org/officeDocument/2006/math">
+                      <m:r>
+                        <a:rPr lang="en-US" b="0" i="1" smtClean="0">
+                          <a:latin typeface="Cambria Math" charset="0"/>
+                        </a:rPr>
+                        <m:t>𝑦</m:t>
+                      </m:r>
+                    </m:oMath>
+                  </m:oMathPara>
+                </a14:m>
+                <a:endParaRPr lang="en-US" dirty="0"/>
+              </a:p>
+            </p:txBody>
+          </p:sp>
+        </mc:Choice>
+        <mc:Fallback>
+          <p:sp>
+            <p:nvSpPr>
+              <p:cNvPr id="72" name="TextBox 71"/>
+              <p:cNvSpPr txBox="1">
+                <a:spLocks noRot="1" noChangeAspect="1" noMove="1" noResize="1" noEditPoints="1" noAdjustHandles="1" noChangeArrowheads="1" noChangeShapeType="1" noTextEdit="1"/>
+              </p:cNvSpPr>
+              <p:nvPr/>
+            </p:nvSpPr>
+            <p:spPr>
+              <a:xfrm>
+                <a:off x="11173686" y="3367060"/>
+                <a:ext cx="186718" cy="276999"/>
+              </a:xfrm>
+              <a:prstGeom prst="rect">
+                <a:avLst/>
+              </a:prstGeom>
+              <a:blipFill rotWithShape="0">
+                <a:blip r:embed="rId6"/>
+                <a:stretch>
+                  <a:fillRect l="-32258" r="-22581" b="-23913"/>
+                </a:stretch>
+              </a:blipFill>
+            </p:spPr>
+            <p:txBody>
+              <a:bodyPr/>
+              <a:lstStyle/>
+              <a:p>
+                <a:r>
+                  <a:rPr lang="en-US">
+                    <a:noFill/>
+                  </a:rPr>
+                  <a:t> </a:t>
+                </a:r>
+              </a:p>
+            </p:txBody>
+          </p:sp>
+        </mc:Fallback>
+      </mc:AlternateContent>
+      <p:cxnSp>
+        <p:nvCxnSpPr>
+          <p:cNvPr id="12" name="Straight Arrow Connector 11"/>
+          <p:cNvCxnSpPr/>
+          <p:nvPr/>
+        </p:nvCxnSpPr>
+        <p:spPr>
+          <a:xfrm>
+            <a:off x="3388942" y="2786120"/>
+            <a:ext cx="1340002" cy="0"/>
+          </a:xfrm>
+          <a:prstGeom prst="straightConnector1">
+            <a:avLst/>
+          </a:prstGeom>
+          <a:ln w="127000">
+            <a:solidFill>
+              <a:schemeClr val="tx1"/>
+            </a:solidFill>
+            <a:tailEnd type="triangle"/>
+          </a:ln>
+        </p:spPr>
+        <p:style>
+          <a:lnRef idx="1">
+            <a:schemeClr val="accent1"/>
+          </a:lnRef>
+          <a:fillRef idx="0">
+            <a:schemeClr val="accent1"/>
+          </a:fillRef>
+          <a:effectRef idx="0">
+            <a:schemeClr val="accent1"/>
+          </a:effectRef>
+          <a:fontRef idx="minor">
+            <a:schemeClr val="tx1"/>
+          </a:fontRef>
+        </p:style>
+      </p:cxnSp>
+      <p:cxnSp>
+        <p:nvCxnSpPr>
+          <p:cNvPr id="73" name="Straight Arrow Connector 72"/>
+          <p:cNvCxnSpPr/>
+          <p:nvPr/>
+        </p:nvCxnSpPr>
+        <p:spPr>
+          <a:xfrm>
+            <a:off x="7505846" y="2786120"/>
+            <a:ext cx="1340002" cy="0"/>
+          </a:xfrm>
+          <a:prstGeom prst="straightConnector1">
+            <a:avLst/>
+          </a:prstGeom>
+          <a:ln w="127000">
+            <a:solidFill>
+              <a:schemeClr val="tx1"/>
+            </a:solidFill>
+            <a:tailEnd type="triangle"/>
+          </a:ln>
+        </p:spPr>
+        <p:style>
+          <a:lnRef idx="1">
+            <a:schemeClr val="accent1"/>
+          </a:lnRef>
+          <a:fillRef idx="0">
+            <a:schemeClr val="accent1"/>
+          </a:fillRef>
+          <a:effectRef idx="0">
+            <a:schemeClr val="accent1"/>
+          </a:effectRef>
+          <a:fontRef idx="minor">
+            <a:schemeClr val="tx1"/>
+          </a:fontRef>
+        </p:style>
+      </p:cxnSp>
+    </p:spTree>
+    <p:extLst>
+      <p:ext uri="{BB962C8B-B14F-4D97-AF65-F5344CB8AC3E}">
+        <p14:creationId xmlns:p14="http://schemas.microsoft.com/office/powerpoint/2010/main" val="795260445"/>
       </p:ext>
     </p:extLst>
   </p:cSld>

</xml_diff>